<commit_message>
New presentation; 2 slides left
</commit_message>
<xml_diff>
--- a/Презентация бакалаврской SPEECH.pptx
+++ b/Презентация бакалаврской SPEECH.pptx
@@ -5,7 +5,7 @@
     <p:sldMasterId id="2147483648" r:id="rId1"/>
   </p:sldMasterIdLst>
   <p:notesMasterIdLst>
-    <p:notesMasterId r:id="rId20"/>
+    <p:notesMasterId r:id="rId16"/>
   </p:notesMasterIdLst>
   <p:sldIdLst>
     <p:sldId id="256" r:id="rId2"/>
@@ -13,19 +13,15 @@
     <p:sldId id="259" r:id="rId4"/>
     <p:sldId id="260" r:id="rId5"/>
     <p:sldId id="267" r:id="rId6"/>
-    <p:sldId id="266" r:id="rId7"/>
-    <p:sldId id="268" r:id="rId8"/>
-    <p:sldId id="271" r:id="rId9"/>
-    <p:sldId id="272" r:id="rId10"/>
-    <p:sldId id="278" r:id="rId11"/>
-    <p:sldId id="279" r:id="rId12"/>
-    <p:sldId id="280" r:id="rId13"/>
-    <p:sldId id="273" r:id="rId14"/>
-    <p:sldId id="269" r:id="rId15"/>
-    <p:sldId id="274" r:id="rId16"/>
-    <p:sldId id="275" r:id="rId17"/>
-    <p:sldId id="276" r:id="rId18"/>
-    <p:sldId id="263" r:id="rId19"/>
+    <p:sldId id="268" r:id="rId7"/>
+    <p:sldId id="271" r:id="rId8"/>
+    <p:sldId id="281" r:id="rId9"/>
+    <p:sldId id="273" r:id="rId10"/>
+    <p:sldId id="282" r:id="rId11"/>
+    <p:sldId id="269" r:id="rId12"/>
+    <p:sldId id="274" r:id="rId13"/>
+    <p:sldId id="283" r:id="rId14"/>
+    <p:sldId id="263" r:id="rId15"/>
   </p:sldIdLst>
   <p:sldSz cx="12192000" cy="6858000"/>
   <p:notesSz cx="6858000" cy="9144000"/>
@@ -214,7 +210,7 @@
           <a:p>
             <a:fld id="{6B464B02-90B2-4731-B2BE-E94748D81C5F}" type="datetimeFigureOut">
               <a:rPr lang="ru-RU" smtClean="0"/>
-              <a:t>02.06.2016</a:t>
+              <a:t>06.06.2016</a:t>
             </a:fld>
             <a:endParaRPr lang="ru-RU"/>
           </a:p>
@@ -551,11 +547,19 @@
             </a:r>
             <a:r>
               <a:rPr lang="en-US" baseline="0" dirty="0" smtClean="0"/>
-              <a:t>Siri, Cortana</a:t>
+              <a:t>Siri, </a:t>
+            </a:r>
+            <a:r>
+              <a:rPr lang="en-US" baseline="0" dirty="0" smtClean="0"/>
+              <a:t>Cortana</a:t>
             </a:r>
             <a:r>
               <a:rPr lang="ru-RU" baseline="0" dirty="0" smtClean="0"/>
-              <a:t>) и голосовые меню </a:t>
+              <a:t>, Дуся) </a:t>
+            </a:r>
+            <a:r>
+              <a:rPr lang="ru-RU" baseline="0" dirty="0" smtClean="0"/>
+              <a:t>и голосовые меню </a:t>
             </a:r>
             <a:r>
               <a:rPr lang="en-US" baseline="0" dirty="0" smtClean="0"/>
@@ -571,8 +575,25 @@
             </a:r>
             <a:r>
               <a:rPr lang="ru-RU" baseline="0" dirty="0" smtClean="0"/>
-              <a:t>В их основе лежит передача речи и приём речевой информации.</a:t>
-            </a:r>
+              <a:t>В их основе </a:t>
+            </a:r>
+            <a:r>
+              <a:rPr lang="ru-RU" baseline="0" dirty="0" smtClean="0"/>
+              <a:t>зачастую лежит не только распознавание речи, но и её передача для последующей обработки. </a:t>
+            </a:r>
+            <a:r>
+              <a:rPr lang="en-US" baseline="0" dirty="0" smtClean="0"/>
+              <a:t>[</a:t>
+            </a:r>
+            <a:r>
+              <a:rPr lang="ru-RU" baseline="0" dirty="0" smtClean="0"/>
+              <a:t>В частности – на стороне сервера ИИ синтезирует речь для ответа. Другой пример – сохранение для самообучения; к примеру, Дуся сохраняет неизвестные ей запросы пользователей, чтобы использовать их в последующем.</a:t>
+            </a:r>
+            <a:r>
+              <a:rPr lang="en-US" baseline="0" dirty="0" smtClean="0"/>
+              <a:t>]</a:t>
+            </a:r>
+            <a:endParaRPr lang="ru-RU" baseline="0" dirty="0" smtClean="0"/>
           </a:p>
           <a:p>
             <a:pPr marL="0" marR="0" indent="0" algn="l" defTabSz="914400" rtl="0" eaLnBrk="1" fontAlgn="auto" latinLnBrk="0" hangingPunct="1">
@@ -602,7 +623,7 @@
                 <a:ea typeface="+mn-ea"/>
                 <a:cs typeface="+mn-cs"/>
               </a:rPr>
-              <a:t>Одна</a:t>
+              <a:t>Поэтому одна</a:t>
             </a:r>
             <a:r>
               <a:rPr lang="ru-RU" sz="1200" kern="1200" baseline="0" dirty="0" smtClean="0">
@@ -614,7 +635,19 @@
                 <a:ea typeface="+mn-ea"/>
                 <a:cs typeface="+mn-cs"/>
               </a:rPr>
-              <a:t> из главных проблем наряду с распознаванием речи – это то, что </a:t>
+              <a:t> </a:t>
+            </a:r>
+            <a:r>
+              <a:rPr lang="ru-RU" sz="1200" kern="1200" baseline="0" dirty="0" smtClean="0">
+                <a:solidFill>
+                  <a:schemeClr val="tx1"/>
+                </a:solidFill>
+                <a:effectLst/>
+                <a:latin typeface="+mn-lt"/>
+                <a:ea typeface="+mn-ea"/>
+                <a:cs typeface="+mn-cs"/>
+              </a:rPr>
+              <a:t>из главных проблем наряду с распознаванием речи – это то, что </a:t>
             </a:r>
             <a:r>
               <a:rPr lang="ru-RU" sz="1200" kern="1200" dirty="0" smtClean="0">
@@ -749,17 +782,19 @@
           <a:p>
             <a:r>
               <a:rPr lang="ru-RU" dirty="0" smtClean="0"/>
-              <a:t>1/А(</a:t>
-            </a:r>
-            <a:r>
-              <a:rPr lang="en-US" dirty="0" smtClean="0"/>
-              <a:t>z)</a:t>
-            </a:r>
+              <a:t>Слайд для перехода от речевого кодирования к помехоустойчивому.</a:t>
+            </a:r>
+          </a:p>
+          <a:p>
             <a:r>
               <a:rPr lang="ru-RU" dirty="0" smtClean="0"/>
-              <a:t> – синтезирующий фильтр с линейным предсказанием</a:t>
-            </a:r>
-            <a:endParaRPr lang="ru-RU" dirty="0"/>
+              <a:t>Речевое</a:t>
+            </a:r>
+            <a:r>
+              <a:rPr lang="ru-RU" baseline="0" dirty="0" smtClean="0"/>
+              <a:t> кодирование не является помехозащищённым, поэтому требуется ввести защиту от помех. Следует заметить, что в простейшем случае защита от ошибок заключается только в обнаружении ошибки.</a:t>
+            </a:r>
+            <a:endParaRPr lang="ru-RU" dirty="0" smtClean="0"/>
           </a:p>
         </p:txBody>
       </p:sp>
@@ -789,7 +824,7 @@
     </p:spTree>
     <p:extLst>
       <p:ext uri="{BB962C8B-B14F-4D97-AF65-F5344CB8AC3E}">
-        <p14:creationId xmlns:p14="http://schemas.microsoft.com/office/powerpoint/2010/main" val="4274305723"/>
+        <p14:creationId xmlns:p14="http://schemas.microsoft.com/office/powerpoint/2010/main" val="3677460795"/>
       </p:ext>
     </p:extLst>
   </p:cSld>
@@ -843,7 +878,37 @@
           <a:bodyPr/>
           <a:lstStyle/>
           <a:p>
-            <a:endParaRPr lang="ru-RU" dirty="0"/>
+            <a:r>
+              <a:rPr lang="ru-RU" baseline="0" dirty="0" smtClean="0"/>
+              <a:t>В ходе исследования </a:t>
+            </a:r>
+            <a:r>
+              <a:rPr lang="ru-RU" baseline="0" dirty="0" smtClean="0"/>
+              <a:t>из всех рассмотренных методов помехоустойчивого </a:t>
+            </a:r>
+            <a:r>
+              <a:rPr lang="ru-RU" baseline="0" dirty="0" smtClean="0"/>
+              <a:t>кодирования были выбраны и реализованы следующие методы, </a:t>
+            </a:r>
+            <a:r>
+              <a:rPr lang="ru-RU" baseline="0" dirty="0" smtClean="0"/>
+              <a:t>т.к. </a:t>
+            </a:r>
+            <a:r>
+              <a:rPr lang="ru-RU" baseline="0" dirty="0" smtClean="0"/>
+              <a:t>они отвечали </a:t>
+            </a:r>
+            <a:r>
+              <a:rPr lang="ru-RU" baseline="0" dirty="0" smtClean="0"/>
+              <a:t>следующим критериям: могут находить и исправлять ошибки; простота реализации; применяются в существующих каналах связи</a:t>
+            </a:r>
+            <a:r>
+              <a:rPr lang="ru-RU" baseline="0" dirty="0" smtClean="0"/>
+              <a:t>.</a:t>
+            </a:r>
+          </a:p>
+          <a:p>
+            <a:endParaRPr lang="ru-RU" baseline="0" dirty="0" smtClean="0"/>
           </a:p>
         </p:txBody>
       </p:sp>
@@ -873,7 +938,7 @@
     </p:spTree>
     <p:extLst>
       <p:ext uri="{BB962C8B-B14F-4D97-AF65-F5344CB8AC3E}">
-        <p14:creationId xmlns:p14="http://schemas.microsoft.com/office/powerpoint/2010/main" val="369841976"/>
+        <p14:creationId xmlns:p14="http://schemas.microsoft.com/office/powerpoint/2010/main" val="3698052141"/>
       </p:ext>
     </p:extLst>
   </p:cSld>
@@ -929,41 +994,38 @@
           <a:p>
             <a:r>
               <a:rPr lang="ru-RU" dirty="0" smtClean="0"/>
-              <a:t>Учитывая всё вышесказанное,</a:t>
+              <a:t>Основной вопрос, который встаёт при выборе метода помехоустойчивого кодирования</a:t>
             </a:r>
             <a:r>
               <a:rPr lang="ru-RU" baseline="0" dirty="0" smtClean="0"/>
-              <a:t> здесь приведена структура </a:t>
-            </a:r>
-            <a:r>
-              <a:rPr lang="ru-RU" dirty="0" smtClean="0"/>
-              <a:t>типичного речевого кодера.</a:t>
-            </a:r>
-          </a:p>
-          <a:p>
-            <a:r>
-              <a:rPr lang="ru-RU" dirty="0" smtClean="0"/>
-              <a:t>Подводя итог проведённому блиц-обзору</a:t>
+              <a:t> – это (показать на слайд и зачитать).</a:t>
+            </a:r>
+          </a:p>
+          <a:p>
+            <a:r>
+              <a:rPr lang="ru-RU" sz="1200" kern="1200" dirty="0" smtClean="0">
+                <a:solidFill>
+                  <a:schemeClr val="tx1"/>
+                </a:solidFill>
+                <a:effectLst/>
+                <a:latin typeface="+mn-lt"/>
+                <a:ea typeface="+mn-ea"/>
+                <a:cs typeface="+mn-cs"/>
+              </a:rPr>
+              <a:t>Для ответа на данный вопрос в первую очередь следует рассчитать вероятность возникновения ошибки при передаче информации. </a:t>
             </a:r>
             <a:r>
               <a:rPr lang="ru-RU" baseline="0" dirty="0" smtClean="0"/>
-              <a:t> существующих кодеков можно сказать следующее</a:t>
-            </a:r>
-            <a:r>
-              <a:rPr lang="ru-RU" dirty="0" smtClean="0"/>
-              <a:t>: существующие речевые кодеки отличаются только форматом представления данных и алгоритмами расчёта параметров речевого сигнала, имея при этом общую структуру.</a:t>
-            </a:r>
-          </a:p>
-          <a:p>
-            <a:r>
-              <a:rPr lang="ru-RU" dirty="0" smtClean="0"/>
-              <a:t>Как следствие, мы можем сказать, ЧТО должен уметь делать речевой кодек, но при этом ответ на вопрос КАК остаётся на усмотрение разработчика. </a:t>
-            </a:r>
-          </a:p>
-          <a:p>
-            <a:endParaRPr lang="ru-RU" dirty="0" smtClean="0"/>
-          </a:p>
-          <a:p>
+              <a:t>Ранее уже проводились исследования, связанные </a:t>
+            </a:r>
+            <a:r>
+              <a:rPr lang="ru-RU" baseline="0" dirty="0" smtClean="0"/>
+              <a:t>с расчётом вероятности возникновения ошибки в канале связи (источники (с 13 по 16) указаны в бакалаврской работе; в частности, данные исследования проводились академией Федеральной Службы Охраны РФ в 2013 году). </a:t>
+            </a:r>
+            <a:r>
+              <a:rPr lang="ru-RU" baseline="0" dirty="0" smtClean="0"/>
+              <a:t> После изучения данных исследований, стало известно, что вероятность возникновения ошибки в канале связи составляет около 1% (с округлением в большую сторону).</a:t>
+            </a:r>
             <a:endParaRPr lang="ru-RU" dirty="0"/>
           </a:p>
         </p:txBody>
@@ -994,7 +1056,7 @@
     </p:spTree>
     <p:extLst>
       <p:ext uri="{BB962C8B-B14F-4D97-AF65-F5344CB8AC3E}">
-        <p14:creationId xmlns:p14="http://schemas.microsoft.com/office/powerpoint/2010/main" val="689873442"/>
+        <p14:creationId xmlns:p14="http://schemas.microsoft.com/office/powerpoint/2010/main" val="473621430"/>
       </p:ext>
     </p:extLst>
   </p:cSld>
@@ -1050,7 +1112,54 @@
           <a:p>
             <a:r>
               <a:rPr lang="ru-RU" dirty="0" smtClean="0"/>
-              <a:t>Исходя из сказанного, для разработки речевого кодека были использованы интерфейсы и, как следствие, набор модулей, реализующих речевой кодек, состоит из них. Следует заметить: реализация речевого кодека – это нетривиальная задача. Применяя данную библиотеку, сторонний разработчик будет знать, ЧТО ему требуется реализовать для создания речевого кодека. КАК – пусть решает он сам.</a:t>
+              <a:t>Эффективность речевого кодека оценивается по трём критериям: требуемая полоса пропускания, скорость работы и усреднённая субъективная оценка. Т.к. последние 2 критерия не всегда можно рассчитать однозначно, в основу данной методологии легло требование к </a:t>
+            </a:r>
+            <a:r>
+              <a:rPr lang="ru-RU" baseline="0" dirty="0" smtClean="0"/>
+              <a:t>полосе пропускания.</a:t>
+            </a:r>
+          </a:p>
+          <a:p>
+            <a:pPr marL="228600" indent="-228600">
+              <a:buAutoNum type="arabicParenR"/>
+            </a:pPr>
+            <a:r>
+              <a:rPr lang="ru-RU" baseline="0" dirty="0" smtClean="0"/>
+              <a:t>Сначала </a:t>
+            </a:r>
+            <a:r>
+              <a:rPr lang="ru-RU" baseline="0" smtClean="0"/>
+              <a:t>предлагается получить </a:t>
+            </a:r>
+            <a:r>
+              <a:rPr lang="ru-RU" baseline="0" dirty="0" smtClean="0"/>
+              <a:t>вероятность возникновения ошибки в имеющемся канале связи (рассчитать или узнать её, если данная информация имеется в спецификации к каналу связи/была рассчитана ранее).</a:t>
+            </a:r>
+          </a:p>
+          <a:p>
+            <a:pPr marL="228600" indent="-228600">
+              <a:buAutoNum type="arabicParenR"/>
+            </a:pPr>
+            <a:r>
+              <a:rPr lang="ru-RU" baseline="0" dirty="0" smtClean="0"/>
+              <a:t>Выбор метода защиты от помех – исходя из того, чтобы мы могли передать </a:t>
+            </a:r>
+            <a:r>
+              <a:rPr lang="en-US" baseline="0" dirty="0" smtClean="0"/>
+              <a:t>max </a:t>
+            </a:r>
+            <a:r>
+              <a:rPr lang="ru-RU" baseline="0" dirty="0" smtClean="0"/>
+              <a:t>информации.</a:t>
+            </a:r>
+          </a:p>
+          <a:p>
+            <a:pPr marL="228600" indent="-228600">
+              <a:buAutoNum type="arabicParenR"/>
+            </a:pPr>
+            <a:r>
+              <a:rPr lang="ru-RU" baseline="0" dirty="0" smtClean="0"/>
+              <a:t>В зависимости от доступного размера для полезной информации, можно определится с кодеком: просто передача фонемы, передача основных параметров речевого сигнала или же полный набор параметров.</a:t>
             </a:r>
             <a:endParaRPr lang="ru-RU" dirty="0"/>
           </a:p>
@@ -1082,7 +1191,7 @@
     </p:spTree>
     <p:extLst>
       <p:ext uri="{BB962C8B-B14F-4D97-AF65-F5344CB8AC3E}">
-        <p14:creationId xmlns:p14="http://schemas.microsoft.com/office/powerpoint/2010/main" val="3713118775"/>
+        <p14:creationId xmlns:p14="http://schemas.microsoft.com/office/powerpoint/2010/main" val="548964393"/>
       </p:ext>
     </p:extLst>
   </p:cSld>
@@ -1136,10 +1245,7 @@
           <a:bodyPr/>
           <a:lstStyle/>
           <a:p>
-            <a:r>
-              <a:rPr lang="ru-RU" baseline="0" dirty="0" smtClean="0"/>
-              <a:t>После завершения речевого кодирования мы должны сделать полученный код помехозащищённым. Для этого применяются следующие методы(показать на слайд).  Они были выбраны по ходу исследования из всех рассмотренных методов помехоустойчивого кодирования, т.к. отвечали следующим критериям: могут находить и исправлять ошибки; простота реализации; применяются в существующих каналах связи.</a:t>
-            </a:r>
+            <a:endParaRPr lang="ru-RU" dirty="0"/>
           </a:p>
         </p:txBody>
       </p:sp>
@@ -1161,444 +1267,6 @@
             <a:fld id="{4791C3C5-CCA8-4B2B-8706-EB937A244A85}" type="slidenum">
               <a:rPr lang="ru-RU" smtClean="0"/>
               <a:t>14</a:t>
-            </a:fld>
-            <a:endParaRPr lang="ru-RU"/>
-          </a:p>
-        </p:txBody>
-      </p:sp>
-    </p:spTree>
-    <p:extLst>
-      <p:ext uri="{BB962C8B-B14F-4D97-AF65-F5344CB8AC3E}">
-        <p14:creationId xmlns:p14="http://schemas.microsoft.com/office/powerpoint/2010/main" val="3698052141"/>
-      </p:ext>
-    </p:extLst>
-  </p:cSld>
-  <p:clrMapOvr>
-    <a:masterClrMapping/>
-  </p:clrMapOvr>
-</p:notes>
-</file>
-
-<file path=ppt/notesSlides/notesSlide15.xml><?xml version="1.0" encoding="utf-8"?>
-<p:notes xmlns:a="http://schemas.openxmlformats.org/drawingml/2006/main" xmlns:r="http://schemas.openxmlformats.org/officeDocument/2006/relationships" xmlns:p="http://schemas.openxmlformats.org/presentationml/2006/main">
-  <p:cSld>
-    <p:spTree>
-      <p:nvGrpSpPr>
-        <p:cNvPr id="1" name=""/>
-        <p:cNvGrpSpPr/>
-        <p:nvPr/>
-      </p:nvGrpSpPr>
-      <p:grpSpPr>
-        <a:xfrm>
-          <a:off x="0" y="0"/>
-          <a:ext cx="0" cy="0"/>
-          <a:chOff x="0" y="0"/>
-          <a:chExt cx="0" cy="0"/>
-        </a:xfrm>
-      </p:grpSpPr>
-      <p:sp>
-        <p:nvSpPr>
-          <p:cNvPr id="2" name="Образ слайда 1"/>
-          <p:cNvSpPr>
-            <a:spLocks noGrp="1" noRot="1" noChangeAspect="1"/>
-          </p:cNvSpPr>
-          <p:nvPr>
-            <p:ph type="sldImg"/>
-          </p:nvPr>
-        </p:nvSpPr>
-        <p:spPr/>
-      </p:sp>
-      <p:sp>
-        <p:nvSpPr>
-          <p:cNvPr id="3" name="Заметки 2"/>
-          <p:cNvSpPr>
-            <a:spLocks noGrp="1"/>
-          </p:cNvSpPr>
-          <p:nvPr>
-            <p:ph type="body" idx="1"/>
-          </p:nvPr>
-        </p:nvSpPr>
-        <p:spPr/>
-        <p:txBody>
-          <a:bodyPr/>
-          <a:lstStyle/>
-          <a:p>
-            <a:r>
-              <a:rPr lang="ru-RU" dirty="0" smtClean="0"/>
-              <a:t>Основной вопрос, который встаёт при выборе метода помехоустойчивого кодирования</a:t>
-            </a:r>
-            <a:r>
-              <a:rPr lang="ru-RU" baseline="0" dirty="0" smtClean="0"/>
-              <a:t> – это (показать на слайд и зачитать).</a:t>
-            </a:r>
-          </a:p>
-          <a:p>
-            <a:r>
-              <a:rPr lang="ru-RU" sz="1200" kern="1200" dirty="0" smtClean="0">
-                <a:solidFill>
-                  <a:schemeClr val="tx1"/>
-                </a:solidFill>
-                <a:effectLst/>
-                <a:latin typeface="+mn-lt"/>
-                <a:ea typeface="+mn-ea"/>
-                <a:cs typeface="+mn-cs"/>
-              </a:rPr>
-              <a:t>Для ответа на данный вопрос в первую очередь следует рассчитать вероятность возникновения ошибки при передаче информации. </a:t>
-            </a:r>
-            <a:r>
-              <a:rPr lang="ru-RU" baseline="0" dirty="0" smtClean="0"/>
-              <a:t>Ранее проводилось много исследований, связанных с расчётом вероятности возникновения ошибки в канале связи (источники (с 13 по 16) указаны в бакалаврской работе; в частности, данные исследования проводились академией Федеральной Службы Охраны РФ в 2013 году). </a:t>
-            </a:r>
-            <a:endParaRPr lang="ru-RU" dirty="0"/>
-          </a:p>
-        </p:txBody>
-      </p:sp>
-      <p:sp>
-        <p:nvSpPr>
-          <p:cNvPr id="4" name="Номер слайда 3"/>
-          <p:cNvSpPr>
-            <a:spLocks noGrp="1"/>
-          </p:cNvSpPr>
-          <p:nvPr>
-            <p:ph type="sldNum" sz="quarter" idx="10"/>
-          </p:nvPr>
-        </p:nvSpPr>
-        <p:spPr/>
-        <p:txBody>
-          <a:bodyPr/>
-          <a:lstStyle/>
-          <a:p>
-            <a:fld id="{4791C3C5-CCA8-4B2B-8706-EB937A244A85}" type="slidenum">
-              <a:rPr lang="ru-RU" smtClean="0"/>
-              <a:t>15</a:t>
-            </a:fld>
-            <a:endParaRPr lang="ru-RU"/>
-          </a:p>
-        </p:txBody>
-      </p:sp>
-    </p:spTree>
-    <p:extLst>
-      <p:ext uri="{BB962C8B-B14F-4D97-AF65-F5344CB8AC3E}">
-        <p14:creationId xmlns:p14="http://schemas.microsoft.com/office/powerpoint/2010/main" val="473621430"/>
-      </p:ext>
-    </p:extLst>
-  </p:cSld>
-  <p:clrMapOvr>
-    <a:masterClrMapping/>
-  </p:clrMapOvr>
-</p:notes>
-</file>
-
-<file path=ppt/notesSlides/notesSlide16.xml><?xml version="1.0" encoding="utf-8"?>
-<p:notes xmlns:a="http://schemas.openxmlformats.org/drawingml/2006/main" xmlns:r="http://schemas.openxmlformats.org/officeDocument/2006/relationships" xmlns:p="http://schemas.openxmlformats.org/presentationml/2006/main">
-  <p:cSld>
-    <p:spTree>
-      <p:nvGrpSpPr>
-        <p:cNvPr id="1" name=""/>
-        <p:cNvGrpSpPr/>
-        <p:nvPr/>
-      </p:nvGrpSpPr>
-      <p:grpSpPr>
-        <a:xfrm>
-          <a:off x="0" y="0"/>
-          <a:ext cx="0" cy="0"/>
-          <a:chOff x="0" y="0"/>
-          <a:chExt cx="0" cy="0"/>
-        </a:xfrm>
-      </p:grpSpPr>
-      <p:sp>
-        <p:nvSpPr>
-          <p:cNvPr id="2" name="Образ слайда 1"/>
-          <p:cNvSpPr>
-            <a:spLocks noGrp="1" noRot="1" noChangeAspect="1"/>
-          </p:cNvSpPr>
-          <p:nvPr>
-            <p:ph type="sldImg"/>
-          </p:nvPr>
-        </p:nvSpPr>
-        <p:spPr/>
-      </p:sp>
-      <p:sp>
-        <p:nvSpPr>
-          <p:cNvPr id="3" name="Заметки 2"/>
-          <p:cNvSpPr>
-            <a:spLocks noGrp="1"/>
-          </p:cNvSpPr>
-          <p:nvPr>
-            <p:ph type="body" idx="1"/>
-          </p:nvPr>
-        </p:nvSpPr>
-        <p:spPr/>
-        <p:txBody>
-          <a:bodyPr/>
-          <a:lstStyle/>
-          <a:p>
-            <a:r>
-              <a:rPr lang="ru-RU" dirty="0" smtClean="0"/>
-              <a:t>При расчёте вероятности</a:t>
-            </a:r>
-            <a:r>
-              <a:rPr lang="ru-RU" baseline="0" dirty="0" smtClean="0"/>
-              <a:t> возникновения ошибки следует учитывать следующие факторы (показать на слайд и зачитать). Учесть все источники ошибки невозможно, поэтому в расчётах присутствует определённая погрешность. </a:t>
-            </a:r>
-          </a:p>
-          <a:p>
-            <a:r>
-              <a:rPr lang="ru-RU" dirty="0" smtClean="0"/>
-              <a:t>С</a:t>
-            </a:r>
-            <a:r>
-              <a:rPr lang="ru-RU" baseline="0" dirty="0" smtClean="0"/>
-              <a:t> её учётом вероятность приёма ошибочного символа в канале связи без помехоустойчивого кодирования составляет…</a:t>
-            </a:r>
-            <a:endParaRPr lang="ru-RU" dirty="0"/>
-          </a:p>
-        </p:txBody>
-      </p:sp>
-      <p:sp>
-        <p:nvSpPr>
-          <p:cNvPr id="4" name="Номер слайда 3"/>
-          <p:cNvSpPr>
-            <a:spLocks noGrp="1"/>
-          </p:cNvSpPr>
-          <p:nvPr>
-            <p:ph type="sldNum" sz="quarter" idx="10"/>
-          </p:nvPr>
-        </p:nvSpPr>
-        <p:spPr/>
-        <p:txBody>
-          <a:bodyPr/>
-          <a:lstStyle/>
-          <a:p>
-            <a:fld id="{4791C3C5-CCA8-4B2B-8706-EB937A244A85}" type="slidenum">
-              <a:rPr lang="ru-RU" smtClean="0"/>
-              <a:t>16</a:t>
-            </a:fld>
-            <a:endParaRPr lang="ru-RU"/>
-          </a:p>
-        </p:txBody>
-      </p:sp>
-    </p:spTree>
-    <p:extLst>
-      <p:ext uri="{BB962C8B-B14F-4D97-AF65-F5344CB8AC3E}">
-        <p14:creationId xmlns:p14="http://schemas.microsoft.com/office/powerpoint/2010/main" val="531855635"/>
-      </p:ext>
-    </p:extLst>
-  </p:cSld>
-  <p:clrMapOvr>
-    <a:masterClrMapping/>
-  </p:clrMapOvr>
-</p:notes>
-</file>
-
-<file path=ppt/notesSlides/notesSlide17.xml><?xml version="1.0" encoding="utf-8"?>
-<p:notes xmlns:a="http://schemas.openxmlformats.org/drawingml/2006/main" xmlns:r="http://schemas.openxmlformats.org/officeDocument/2006/relationships" xmlns:p="http://schemas.openxmlformats.org/presentationml/2006/main">
-  <p:cSld>
-    <p:spTree>
-      <p:nvGrpSpPr>
-        <p:cNvPr id="1" name=""/>
-        <p:cNvGrpSpPr/>
-        <p:nvPr/>
-      </p:nvGrpSpPr>
-      <p:grpSpPr>
-        <a:xfrm>
-          <a:off x="0" y="0"/>
-          <a:ext cx="0" cy="0"/>
-          <a:chOff x="0" y="0"/>
-          <a:chExt cx="0" cy="0"/>
-        </a:xfrm>
-      </p:grpSpPr>
-      <p:sp>
-        <p:nvSpPr>
-          <p:cNvPr id="2" name="Образ слайда 1"/>
-          <p:cNvSpPr>
-            <a:spLocks noGrp="1" noRot="1" noChangeAspect="1"/>
-          </p:cNvSpPr>
-          <p:nvPr>
-            <p:ph type="sldImg"/>
-          </p:nvPr>
-        </p:nvSpPr>
-        <p:spPr/>
-      </p:sp>
-      <p:sp>
-        <p:nvSpPr>
-          <p:cNvPr id="3" name="Заметки 2"/>
-          <p:cNvSpPr>
-            <a:spLocks noGrp="1"/>
-          </p:cNvSpPr>
-          <p:nvPr>
-            <p:ph type="body" idx="1"/>
-          </p:nvPr>
-        </p:nvSpPr>
-        <p:spPr/>
-        <p:txBody>
-          <a:bodyPr/>
-          <a:lstStyle/>
-          <a:p>
-            <a:r>
-              <a:rPr lang="ru-RU" dirty="0" smtClean="0"/>
-              <a:t>…примерно 1% (для большинства исследуемых каналов; с округлением в большую сторону).</a:t>
-            </a:r>
-          </a:p>
-          <a:p>
-            <a:r>
-              <a:rPr lang="ru-RU" dirty="0" smtClean="0"/>
-              <a:t>На самом деле это довольно много. Если взять стандарт </a:t>
-            </a:r>
-            <a:r>
-              <a:rPr lang="en-US" dirty="0" err="1" smtClean="0"/>
-              <a:t>iLBC</a:t>
-            </a:r>
-            <a:r>
-              <a:rPr lang="en-US" dirty="0" smtClean="0"/>
-              <a:t>, </a:t>
-            </a:r>
-            <a:r>
-              <a:rPr lang="ru-RU" dirty="0" smtClean="0"/>
-              <a:t>то</a:t>
-            </a:r>
-            <a:r>
-              <a:rPr lang="ru-RU" baseline="0" dirty="0" smtClean="0"/>
-              <a:t> у него один из режимов передачи данных составляет 13.33 кбит/с: длина пакета в таком режиме составляет 400 бит. Всего за секунду разговора будет передано </a:t>
-            </a:r>
-            <a:r>
-              <a:rPr lang="en-US" baseline="0" dirty="0" smtClean="0"/>
-              <a:t>~34 </a:t>
-            </a:r>
-            <a:r>
-              <a:rPr lang="ru-RU" baseline="0" dirty="0" smtClean="0"/>
-              <a:t>пакета, и в каждом из них будут ошибки.</a:t>
-            </a:r>
-          </a:p>
-          <a:p>
-            <a:r>
-              <a:rPr lang="ru-RU" baseline="0" dirty="0" smtClean="0"/>
-              <a:t>По предлагаемой методологии выбора метода помехоустойчивого кодирования в данном случае можно предложить использовать только </a:t>
-            </a:r>
-            <a:r>
-              <a:rPr lang="ru-RU" baseline="0" dirty="0" err="1" smtClean="0"/>
-              <a:t>свёрточный</a:t>
-            </a:r>
-            <a:r>
-              <a:rPr lang="ru-RU" baseline="0" dirty="0" smtClean="0"/>
-              <a:t> код в сочетании с интерливингом: мы будем иметь не более 4 ошибок на 400 бит, что легко поправится любым из предложенных </a:t>
-            </a:r>
-            <a:r>
-              <a:rPr lang="ru-RU" baseline="0" dirty="0" err="1" smtClean="0"/>
-              <a:t>свёрточных</a:t>
-            </a:r>
-            <a:r>
-              <a:rPr lang="ru-RU" baseline="0" dirty="0" smtClean="0"/>
-              <a:t> кодов (применение блочных кодов будет излишним).</a:t>
-            </a:r>
-          </a:p>
-          <a:p>
-            <a:endParaRPr lang="ru-RU" baseline="0" dirty="0" smtClean="0"/>
-          </a:p>
-        </p:txBody>
-      </p:sp>
-      <p:sp>
-        <p:nvSpPr>
-          <p:cNvPr id="4" name="Номер слайда 3"/>
-          <p:cNvSpPr>
-            <a:spLocks noGrp="1"/>
-          </p:cNvSpPr>
-          <p:nvPr>
-            <p:ph type="sldNum" sz="quarter" idx="10"/>
-          </p:nvPr>
-        </p:nvSpPr>
-        <p:spPr/>
-        <p:txBody>
-          <a:bodyPr/>
-          <a:lstStyle/>
-          <a:p>
-            <a:fld id="{4791C3C5-CCA8-4B2B-8706-EB937A244A85}" type="slidenum">
-              <a:rPr lang="ru-RU" smtClean="0"/>
-              <a:t>17</a:t>
-            </a:fld>
-            <a:endParaRPr lang="ru-RU"/>
-          </a:p>
-        </p:txBody>
-      </p:sp>
-    </p:spTree>
-    <p:extLst>
-      <p:ext uri="{BB962C8B-B14F-4D97-AF65-F5344CB8AC3E}">
-        <p14:creationId xmlns:p14="http://schemas.microsoft.com/office/powerpoint/2010/main" val="787201166"/>
-      </p:ext>
-    </p:extLst>
-  </p:cSld>
-  <p:clrMapOvr>
-    <a:masterClrMapping/>
-  </p:clrMapOvr>
-</p:notes>
-</file>
-
-<file path=ppt/notesSlides/notesSlide18.xml><?xml version="1.0" encoding="utf-8"?>
-<p:notes xmlns:a="http://schemas.openxmlformats.org/drawingml/2006/main" xmlns:r="http://schemas.openxmlformats.org/officeDocument/2006/relationships" xmlns:p="http://schemas.openxmlformats.org/presentationml/2006/main">
-  <p:cSld>
-    <p:spTree>
-      <p:nvGrpSpPr>
-        <p:cNvPr id="1" name=""/>
-        <p:cNvGrpSpPr/>
-        <p:nvPr/>
-      </p:nvGrpSpPr>
-      <p:grpSpPr>
-        <a:xfrm>
-          <a:off x="0" y="0"/>
-          <a:ext cx="0" cy="0"/>
-          <a:chOff x="0" y="0"/>
-          <a:chExt cx="0" cy="0"/>
-        </a:xfrm>
-      </p:grpSpPr>
-      <p:sp>
-        <p:nvSpPr>
-          <p:cNvPr id="2" name="Образ слайда 1"/>
-          <p:cNvSpPr>
-            <a:spLocks noGrp="1" noRot="1" noChangeAspect="1"/>
-          </p:cNvSpPr>
-          <p:nvPr>
-            <p:ph type="sldImg"/>
-          </p:nvPr>
-        </p:nvSpPr>
-        <p:spPr/>
-      </p:sp>
-      <p:sp>
-        <p:nvSpPr>
-          <p:cNvPr id="3" name="Заметки 2"/>
-          <p:cNvSpPr>
-            <a:spLocks noGrp="1"/>
-          </p:cNvSpPr>
-          <p:nvPr>
-            <p:ph type="body" idx="1"/>
-          </p:nvPr>
-        </p:nvSpPr>
-        <p:spPr/>
-        <p:txBody>
-          <a:bodyPr/>
-          <a:lstStyle/>
-          <a:p>
-            <a:endParaRPr lang="ru-RU" dirty="0"/>
-          </a:p>
-        </p:txBody>
-      </p:sp>
-      <p:sp>
-        <p:nvSpPr>
-          <p:cNvPr id="4" name="Номер слайда 3"/>
-          <p:cNvSpPr>
-            <a:spLocks noGrp="1"/>
-          </p:cNvSpPr>
-          <p:nvPr>
-            <p:ph type="sldNum" sz="quarter" idx="10"/>
-          </p:nvPr>
-        </p:nvSpPr>
-        <p:spPr/>
-        <p:txBody>
-          <a:bodyPr/>
-          <a:lstStyle/>
-          <a:p>
-            <a:fld id="{4791C3C5-CCA8-4B2B-8706-EB937A244A85}" type="slidenum">
-              <a:rPr lang="ru-RU" smtClean="0"/>
-              <a:t>18</a:t>
             </a:fld>
             <a:endParaRPr lang="ru-RU"/>
           </a:p>
@@ -1667,8 +1335,33 @@
             </a:r>
             <a:r>
               <a:rPr lang="ru-RU" baseline="0" dirty="0" smtClean="0"/>
-              <a:t> последовательность обработки речевого сигнала при кодировании (при декодировании всё происходит в обратном порядке). </a:t>
-            </a:r>
+              <a:t> </a:t>
+            </a:r>
+            <a:r>
+              <a:rPr lang="ru-RU" baseline="0" dirty="0" smtClean="0"/>
+              <a:t>наиболее распространённую последовательность </a:t>
+            </a:r>
+            <a:r>
+              <a:rPr lang="ru-RU" baseline="0" dirty="0" smtClean="0"/>
+              <a:t>обработки речевого сигнала при кодировании (при декодировании всё происходит в обратном порядке). </a:t>
+            </a:r>
+            <a:r>
+              <a:rPr lang="ru-RU" baseline="0" dirty="0" smtClean="0"/>
+              <a:t>Следует заметить, что в отдельных случаях можно отказаться от некоторых этапов в помехоустойчивом кодировании. </a:t>
+            </a:r>
+            <a:r>
+              <a:rPr lang="en-US" baseline="0" dirty="0" smtClean="0"/>
+              <a:t>[</a:t>
+            </a:r>
+            <a:r>
+              <a:rPr lang="ru-RU" baseline="0" dirty="0" smtClean="0"/>
+              <a:t>Например при низкой вероятности возникновения ошибки можно отказаться от блочного кодирования и интерливинга</a:t>
+            </a:r>
+            <a:r>
+              <a:rPr lang="en-US" baseline="0" dirty="0" smtClean="0"/>
+              <a:t>]</a:t>
+            </a:r>
+            <a:endParaRPr lang="ru-RU" baseline="0" dirty="0" smtClean="0"/>
           </a:p>
           <a:p>
             <a:endParaRPr lang="ru-RU" baseline="0" dirty="0" smtClean="0"/>
@@ -1684,7 +1377,31 @@
                 <a:ea typeface="+mn-ea"/>
                 <a:cs typeface="+mn-cs"/>
               </a:rPr>
-              <a:t>Речевое кодирование не является помехоустойчивым, поэтому данные с речевого кодера поступают на канальный. Его задача – сделать передаваемую информацию помехоустойчивой, т.е. дать возможность приёмнику обнаружить (и, в некоторых случаях, исправить) ошибки, которые возникают при передаче информации. Помимо этого, канальное кодирование может выполнять такие функции, как добавление управляющей информации и шифрование.</a:t>
+              <a:t>Речевое кодирование не является помехоустойчивым, поэтому данные с речевого кодера поступают на </a:t>
+            </a:r>
+            <a:r>
+              <a:rPr lang="ru-RU" sz="1200" kern="1200" dirty="0" smtClean="0">
+                <a:solidFill>
+                  <a:schemeClr val="tx1"/>
+                </a:solidFill>
+                <a:effectLst/>
+                <a:latin typeface="+mn-lt"/>
+                <a:ea typeface="+mn-ea"/>
+                <a:cs typeface="+mn-cs"/>
+              </a:rPr>
+              <a:t>канальный. </a:t>
+            </a:r>
+            <a:r>
+              <a:rPr lang="ru-RU" sz="1200" kern="1200" dirty="0" smtClean="0">
+                <a:solidFill>
+                  <a:schemeClr val="tx1"/>
+                </a:solidFill>
+                <a:effectLst/>
+                <a:latin typeface="+mn-lt"/>
+                <a:ea typeface="+mn-ea"/>
+                <a:cs typeface="+mn-cs"/>
+              </a:rPr>
+              <a:t>Его задача – сделать передаваемую информацию помехоустойчивой, т.е. дать возможность приёмнику обнаружить (и, в некоторых случаях, исправить) ошибки, которые возникают при передаче информации. Помимо этого, канальное кодирование может выполнять такие функции, как добавление управляющей информации и шифрование.</a:t>
             </a:r>
             <a:endParaRPr lang="en-US" baseline="0" dirty="0" smtClean="0"/>
           </a:p>
@@ -1789,15 +1506,7 @@
             </a:r>
             <a:r>
               <a:rPr lang="ru-RU" baseline="0" dirty="0" smtClean="0"/>
-              <a:t> вариант; фонема – </a:t>
-            </a:r>
-            <a:r>
-              <a:rPr lang="ru-RU" baseline="0" dirty="0" err="1" smtClean="0"/>
-              <a:t>минимальаня</a:t>
-            </a:r>
-            <a:r>
-              <a:rPr lang="ru-RU" baseline="0" dirty="0" smtClean="0"/>
-              <a:t> смыслоразличительная единица языка, не имеющая лексического или грамматического значения)</a:t>
+              <a:t> вариант; фонема – минимальная смыслоразличительная единица языка, не имеющая лексического или грамматического значения)</a:t>
             </a:r>
             <a:r>
               <a:rPr lang="ru-RU" dirty="0" smtClean="0"/>
@@ -1813,16 +1522,13 @@
             </a:r>
             <a:r>
               <a:rPr lang="ru-RU" baseline="0" dirty="0" smtClean="0"/>
-              <a:t>, в свою очередь, определяет параметры фильтра для синтеза речевого сигнала (что позволяет сделать </a:t>
+              <a:t>, в свою очередь, определяет параметры фильтра для синтеза речевого сигнала (что позволяет сделать передаваемый сигнал более похожим на речь </a:t>
             </a:r>
             <a:r>
               <a:rPr lang="ru-RU" baseline="0" dirty="0" smtClean="0"/>
-              <a:t>передаваемый </a:t>
-            </a:r>
-            <a:r>
-              <a:rPr lang="ru-RU" baseline="0" dirty="0" smtClean="0"/>
-              <a:t>сигнал более похожим на речь человека-источника).</a:t>
-            </a:r>
+              <a:t>человека-источника: тон, интонация, тембр).</a:t>
+            </a:r>
+            <a:endParaRPr lang="ru-RU" baseline="0" dirty="0" smtClean="0"/>
           </a:p>
           <a:p>
             <a:endParaRPr lang="ru-RU" baseline="0" dirty="0" smtClean="0"/>
@@ -2023,8 +1729,37 @@
           <a:p>
             <a:r>
               <a:rPr lang="ru-RU" sz="1200" dirty="0" smtClean="0"/>
-              <a:t>Область применения – всюду, где требуется передавать речевой сигнал (голосовой чат в играх, беспроводные усилители звука). </a:t>
-            </a:r>
+              <a:t>Область применения – всюду, где требуется </a:t>
+            </a:r>
+            <a:r>
+              <a:rPr lang="ru-RU" sz="1200" dirty="0" smtClean="0"/>
+              <a:t>обрабатывать и передавать речевой </a:t>
+            </a:r>
+            <a:r>
+              <a:rPr lang="ru-RU" sz="1200" dirty="0" smtClean="0"/>
+              <a:t>сигнал </a:t>
+            </a:r>
+            <a:r>
+              <a:rPr lang="ru-RU" sz="1200" dirty="0" smtClean="0"/>
+              <a:t>(помимо упомянутых</a:t>
+            </a:r>
+            <a:r>
+              <a:rPr lang="ru-RU" sz="1200" baseline="0" dirty="0" smtClean="0"/>
+              <a:t> ранее голосовых помощников и меню - </a:t>
+            </a:r>
+            <a:r>
+              <a:rPr lang="ru-RU" sz="1200" dirty="0" smtClean="0"/>
+              <a:t>голосовой </a:t>
+            </a:r>
+            <a:r>
+              <a:rPr lang="ru-RU" sz="1200" dirty="0" smtClean="0"/>
+              <a:t>чат в играх, беспроводные усилители </a:t>
+            </a:r>
+            <a:r>
+              <a:rPr lang="ru-RU" sz="1200" dirty="0" smtClean="0"/>
+              <a:t>звука). </a:t>
+            </a:r>
+            <a:endParaRPr lang="ru-RU" sz="1200" dirty="0" smtClean="0"/>
           </a:p>
           <a:p>
             <a:r>
@@ -2043,7 +1778,11 @@
             </a:r>
             <a:r>
               <a:rPr lang="ru-RU" sz="1200" baseline="0" dirty="0" smtClean="0"/>
-              <a:t> разрабатывались исходя из того, что их можно использовать независимо друг от друга (в случае несовпадения формата входных данных предлагается применять паттерн адаптер).</a:t>
+              <a:t> разрабатывались исходя из того, что их можно использовать независимо друг от друга (в случае несовпадения формата входных данных предлагается применять паттерн адаптер</a:t>
+            </a:r>
+            <a:r>
+              <a:rPr lang="ru-RU" sz="1200" baseline="0" dirty="0" smtClean="0"/>
+              <a:t>).</a:t>
             </a:r>
           </a:p>
         </p:txBody>
@@ -2274,98 +2013,32 @@
           <a:lstStyle/>
           <a:p>
             <a:r>
-              <a:rPr lang="ru-RU" sz="1200" kern="1200" dirty="0" smtClean="0">
-                <a:solidFill>
-                  <a:schemeClr val="tx1"/>
-                </a:solidFill>
-                <a:effectLst/>
-                <a:latin typeface="+mn-lt"/>
-                <a:ea typeface="+mn-ea"/>
-                <a:cs typeface="+mn-cs"/>
-              </a:rPr>
-              <a:t>Данный слайд – напоминание того, как выглядит </a:t>
-            </a:r>
-            <a:r>
-              <a:rPr lang="ru-RU" sz="1200" kern="1200" dirty="0" err="1" smtClean="0">
-                <a:solidFill>
-                  <a:schemeClr val="tx1"/>
-                </a:solidFill>
-                <a:effectLst/>
-                <a:latin typeface="+mn-lt"/>
-                <a:ea typeface="+mn-ea"/>
-                <a:cs typeface="+mn-cs"/>
-              </a:rPr>
-              <a:t>прототипирование</a:t>
-            </a:r>
-            <a:r>
-              <a:rPr lang="ru-RU" sz="1200" kern="1200" dirty="0" smtClean="0">
-                <a:solidFill>
-                  <a:schemeClr val="tx1"/>
-                </a:solidFill>
-                <a:effectLst/>
-                <a:latin typeface="+mn-lt"/>
-                <a:ea typeface="+mn-ea"/>
-                <a:cs typeface="+mn-cs"/>
-              </a:rPr>
-              <a:t> (</a:t>
-            </a:r>
-            <a:r>
-              <a:rPr lang="ru-RU" sz="1200" i="1" kern="1200" dirty="0" smtClean="0">
-                <a:solidFill>
-                  <a:schemeClr val="tx1"/>
-                </a:solidFill>
-                <a:effectLst/>
-                <a:latin typeface="+mn-lt"/>
-                <a:ea typeface="+mn-ea"/>
-                <a:cs typeface="+mn-cs"/>
-              </a:rPr>
-              <a:t>рисунок позаимствован с первой лекции по курсу «Основы программной инженерии», лектор </a:t>
-            </a:r>
-            <a:r>
-              <a:rPr lang="ru-RU" sz="1200" i="1" kern="1200" dirty="0" err="1" smtClean="0">
-                <a:solidFill>
-                  <a:schemeClr val="tx1"/>
-                </a:solidFill>
-                <a:effectLst/>
-                <a:latin typeface="+mn-lt"/>
-                <a:ea typeface="+mn-ea"/>
-                <a:cs typeface="+mn-cs"/>
-              </a:rPr>
-              <a:t>Ицыксона</a:t>
-            </a:r>
-            <a:r>
-              <a:rPr lang="ru-RU" sz="1200" i="1" kern="1200" dirty="0" smtClean="0">
-                <a:solidFill>
-                  <a:schemeClr val="tx1"/>
-                </a:solidFill>
-                <a:effectLst/>
-                <a:latin typeface="+mn-lt"/>
-                <a:ea typeface="+mn-ea"/>
-                <a:cs typeface="+mn-cs"/>
-              </a:rPr>
-              <a:t> Владимир Михайлович</a:t>
-            </a:r>
-            <a:r>
-              <a:rPr lang="ru-RU" sz="1200" kern="1200" dirty="0" smtClean="0">
-                <a:solidFill>
-                  <a:schemeClr val="tx1"/>
-                </a:solidFill>
-                <a:effectLst/>
-                <a:latin typeface="+mn-lt"/>
-                <a:ea typeface="+mn-ea"/>
-                <a:cs typeface="+mn-cs"/>
-              </a:rPr>
-              <a:t>).</a:t>
-            </a:r>
-            <a:endParaRPr lang="ru-RU" sz="1200" kern="1200" dirty="0">
-              <a:solidFill>
-                <a:schemeClr val="tx1"/>
-              </a:solidFill>
-              <a:effectLst/>
-              <a:latin typeface="+mn-lt"/>
-              <a:ea typeface="+mn-ea"/>
-              <a:cs typeface="+mn-cs"/>
-            </a:endParaRPr>
+              <a:rPr lang="ru-RU" dirty="0" smtClean="0"/>
+              <a:t>Для начала было решено создать объект для хранения речевого сигнала: помимо уже </a:t>
+            </a:r>
+            <a:r>
+              <a:rPr lang="ru-RU" dirty="0" err="1" smtClean="0"/>
+              <a:t>упоминавшейся</a:t>
+            </a:r>
+            <a:r>
+              <a:rPr lang="ru-RU" dirty="0" smtClean="0"/>
+              <a:t> ранее фонемы, речевой сигнал можно охарактеризовать следующими основными параметрами (показать на слайд).</a:t>
+            </a:r>
+          </a:p>
+          <a:p>
+            <a:r>
+              <a:rPr lang="ru-RU" dirty="0" smtClean="0"/>
+              <a:t>Это параметры фильтра линейного предсказания и параметры сигнала возбуждения. Для справки: в стандарте </a:t>
+            </a:r>
+            <a:r>
+              <a:rPr lang="en-US" dirty="0" smtClean="0"/>
+              <a:t>GSM </a:t>
+            </a:r>
+            <a:r>
+              <a:rPr lang="ru-RU" dirty="0" smtClean="0"/>
+              <a:t>около 20 параметров речевого сигнала.</a:t>
+            </a:r>
+            <a:endParaRPr lang="ru-RU" dirty="0"/>
           </a:p>
         </p:txBody>
       </p:sp>
@@ -2395,7 +2068,7 @@
     </p:spTree>
     <p:extLst>
       <p:ext uri="{BB962C8B-B14F-4D97-AF65-F5344CB8AC3E}">
-        <p14:creationId xmlns:p14="http://schemas.microsoft.com/office/powerpoint/2010/main" val="1036726735"/>
+        <p14:creationId xmlns:p14="http://schemas.microsoft.com/office/powerpoint/2010/main" val="3187810054"/>
       </p:ext>
     </p:extLst>
   </p:cSld>
@@ -2451,52 +2124,108 @@
           <a:p>
             <a:r>
               <a:rPr lang="ru-RU" dirty="0" smtClean="0"/>
-              <a:t>Для начала было решено создать объект для хранения речевого сигнала: помимо уже </a:t>
-            </a:r>
-            <a:r>
-              <a:rPr lang="ru-RU" dirty="0" err="1" smtClean="0"/>
-              <a:t>упоминавшейся</a:t>
+              <a:t>Также существует множество стандартов речевых</a:t>
+            </a:r>
+            <a:r>
+              <a:rPr lang="ru-RU" baseline="0" dirty="0" smtClean="0"/>
+              <a:t> кодеков, наиболее популярные </a:t>
+            </a:r>
+            <a:r>
+              <a:rPr lang="ru-RU" baseline="0" dirty="0" smtClean="0"/>
+              <a:t>приведены </a:t>
+            </a:r>
+            <a:r>
+              <a:rPr lang="ru-RU" baseline="0" dirty="0" smtClean="0"/>
+              <a:t>на слайде (</a:t>
             </a:r>
             <a:r>
               <a:rPr lang="ru-RU" dirty="0" smtClean="0"/>
-              <a:t> ранее фонемы, речевой сигнал можно охарактеризовать следующими основными параметрами (показать на слайд).</a:t>
-            </a:r>
-          </a:p>
-          <a:p>
+              <a:t>показать на слайд</a:t>
+            </a:r>
+            <a:r>
+              <a:rPr lang="ru-RU" baseline="0" dirty="0" smtClean="0"/>
+              <a:t>).</a:t>
+            </a:r>
+          </a:p>
+          <a:p>
+            <a:endParaRPr lang="ru-RU" baseline="0" dirty="0" smtClean="0"/>
+          </a:p>
+          <a:p>
+            <a:r>
+              <a:rPr lang="en-US" dirty="0" smtClean="0"/>
+              <a:t>G.711 </a:t>
+            </a:r>
             <a:r>
               <a:rPr lang="ru-RU" dirty="0" smtClean="0"/>
-              <a:t>Это параметры фильтра линейного предсказания и параметры сигнала возбуждения. Для справки: в стандарте </a:t>
+              <a:t>и </a:t>
             </a:r>
             <a:r>
               <a:rPr lang="en-US" dirty="0" smtClean="0"/>
-              <a:t>GSM </a:t>
+              <a:t>G.726</a:t>
             </a:r>
             <a:r>
               <a:rPr lang="ru-RU" dirty="0" smtClean="0"/>
-              <a:t>около 20 параметров речевого сигнала.</a:t>
-            </a:r>
-          </a:p>
-          <a:p>
+              <a:t> – это стандарты для телефонии</a:t>
+            </a:r>
+            <a:r>
+              <a:rPr lang="en-US" dirty="0" smtClean="0"/>
+              <a:t>; 726 </a:t>
+            </a:r>
             <a:r>
               <a:rPr lang="ru-RU" dirty="0" smtClean="0"/>
-              <a:t>Для удобства хранения данных параметров была создана сущность </a:t>
-            </a:r>
+              <a:t>также применяется в некоторых камерах видеонаблюдения.</a:t>
+            </a:r>
+          </a:p>
+          <a:p>
+            <a:r>
+              <a:rPr lang="en-US" dirty="0" smtClean="0"/>
+              <a:t>GSM (Global System for Mobile Communications)</a:t>
+            </a:r>
+            <a:r>
+              <a:rPr lang="ru-RU" dirty="0" smtClean="0"/>
+              <a:t> – глобальный стандарт цифровой мобильной сотовой связи.</a:t>
+            </a:r>
+          </a:p>
+          <a:p>
             <a:r>
               <a:rPr lang="en-US" dirty="0" err="1" smtClean="0"/>
-              <a:t>Voice_type</a:t>
-            </a:r>
+              <a:t>iLPC</a:t>
+            </a:r>
+            <a:r>
+              <a:rPr lang="en-US" dirty="0" smtClean="0"/>
+              <a:t> (internet Low Bitrate Codec) –</a:t>
+            </a:r>
+            <a:r>
+              <a:rPr lang="en-US" baseline="0" dirty="0" smtClean="0"/>
+              <a:t> </a:t>
+            </a:r>
+            <a:r>
+              <a:rPr lang="ru-RU" baseline="0" dirty="0" smtClean="0"/>
+              <a:t>кодек для голосовой связи через интернет. Используется в </a:t>
+            </a:r>
+            <a:r>
+              <a:rPr lang="en-US" baseline="0" dirty="0" smtClean="0"/>
+              <a:t>Skype, Google Talk, Yahoo! Messenger</a:t>
+            </a:r>
+            <a:r>
+              <a:rPr lang="ru-RU" baseline="0" dirty="0" smtClean="0"/>
+              <a:t>.</a:t>
+            </a:r>
+          </a:p>
+          <a:p>
+            <a:endParaRPr lang="ru-RU" dirty="0" smtClean="0"/>
+          </a:p>
+          <a:p>
             <a:r>
               <a:rPr lang="ru-RU" dirty="0" smtClean="0"/>
-              <a:t> (и её же предлагается</a:t>
+              <a:t>Существующих стандартов по речевым кодекам крайне много, и на перечисление</a:t>
             </a:r>
             <a:r>
               <a:rPr lang="ru-RU" baseline="0" dirty="0" smtClean="0"/>
-              <a:t> использовать далее при работе с речевым сигналом)</a:t>
-            </a:r>
-            <a:r>
-              <a:rPr lang="en-US" dirty="0" smtClean="0"/>
-              <a:t>.</a:t>
-            </a:r>
+              <a:t> всех уйдёт много времени. Однако при детальном рассмотрении выясняется, что так или иначе все указанные кодеки имеют почти одинаковую структуру.</a:t>
+            </a:r>
+          </a:p>
+          <a:p>
             <a:endParaRPr lang="ru-RU" dirty="0"/>
           </a:p>
         </p:txBody>
@@ -2527,7 +2256,7 @@
     </p:spTree>
     <p:extLst>
       <p:ext uri="{BB962C8B-B14F-4D97-AF65-F5344CB8AC3E}">
-        <p14:creationId xmlns:p14="http://schemas.microsoft.com/office/powerpoint/2010/main" val="3187810054"/>
+        <p14:creationId xmlns:p14="http://schemas.microsoft.com/office/powerpoint/2010/main" val="765251595"/>
       </p:ext>
     </p:extLst>
   </p:cSld>
@@ -2581,89 +2310,74 @@
           <a:bodyPr/>
           <a:lstStyle/>
           <a:p>
+            <a:pPr marL="0" marR="0" indent="0" algn="l" defTabSz="914400" rtl="0" eaLnBrk="1" fontAlgn="auto" latinLnBrk="0" hangingPunct="1">
+              <a:lnSpc>
+                <a:spcPct val="100000"/>
+              </a:lnSpc>
+              <a:spcBef>
+                <a:spcPts val="0"/>
+              </a:spcBef>
+              <a:spcAft>
+                <a:spcPts val="0"/>
+              </a:spcAft>
+              <a:buClrTx/>
+              <a:buSzTx/>
+              <a:buFontTx/>
+              <a:buNone/>
+              <a:tabLst/>
+              <a:defRPr/>
+            </a:pPr>
             <a:r>
               <a:rPr lang="ru-RU" dirty="0" smtClean="0"/>
-              <a:t>Также существует множество стандартов речевых</a:t>
+              <a:t>Изучив структуры существующих речевых кодеров, было замечено, что </a:t>
+            </a:r>
+            <a:r>
+              <a:rPr lang="ru-RU" dirty="0" smtClean="0"/>
+              <a:t>существующие речевые кодеки отличаются только форматом представления данных и алгоритмами расчёта параметров речевого сигнала, имея при этом общую структуру.</a:t>
+            </a:r>
+          </a:p>
+          <a:p>
+            <a:pPr marL="0" marR="0" indent="0" algn="l" defTabSz="914400" rtl="0" eaLnBrk="1" fontAlgn="auto" latinLnBrk="0" hangingPunct="1">
+              <a:lnSpc>
+                <a:spcPct val="100000"/>
+              </a:lnSpc>
+              <a:spcBef>
+                <a:spcPts val="0"/>
+              </a:spcBef>
+              <a:spcAft>
+                <a:spcPts val="0"/>
+              </a:spcAft>
+              <a:buClrTx/>
+              <a:buSzTx/>
+              <a:buFontTx/>
+              <a:buNone/>
+              <a:tabLst/>
+              <a:defRPr/>
+            </a:pPr>
+            <a:r>
+              <a:rPr lang="ru-RU" dirty="0" smtClean="0"/>
+              <a:t>Исходя из этого была предложена </a:t>
             </a:r>
             <a:r>
               <a:rPr lang="ru-RU" baseline="0" dirty="0" smtClean="0"/>
-              <a:t> кодеков, наиболее популярные  приведены на слайде (</a:t>
+              <a:t>структура, удовлетворяющий большинству из рассмотренных кодеров (данная структура </a:t>
             </a:r>
             <a:r>
               <a:rPr lang="ru-RU" dirty="0" smtClean="0"/>
-              <a:t>показать на слайд</a:t>
+              <a:t>позволяет создать как вокодер, так и </a:t>
+            </a:r>
+            <a:r>
+              <a:rPr lang="ru-RU" dirty="0" err="1" smtClean="0"/>
+              <a:t>липридер</a:t>
+            </a:r>
+            <a:r>
+              <a:rPr lang="ru-RU" dirty="0" smtClean="0"/>
+              <a:t>)</a:t>
             </a:r>
             <a:r>
               <a:rPr lang="ru-RU" baseline="0" dirty="0" smtClean="0"/>
-              <a:t>).</a:t>
-            </a:r>
-          </a:p>
-          <a:p>
-            <a:endParaRPr lang="ru-RU" baseline="0" dirty="0" smtClean="0"/>
-          </a:p>
-          <a:p>
-            <a:r>
-              <a:rPr lang="en-US" dirty="0" smtClean="0"/>
-              <a:t>G.711 </a:t>
-            </a:r>
-            <a:r>
-              <a:rPr lang="ru-RU" dirty="0" smtClean="0"/>
-              <a:t>и </a:t>
-            </a:r>
-            <a:r>
-              <a:rPr lang="en-US" dirty="0" smtClean="0"/>
-              <a:t>G.726</a:t>
-            </a:r>
-            <a:r>
-              <a:rPr lang="ru-RU" dirty="0" smtClean="0"/>
-              <a:t> – это стандарты для телефонии</a:t>
-            </a:r>
-            <a:r>
-              <a:rPr lang="en-US" dirty="0" smtClean="0"/>
-              <a:t>; 726 </a:t>
-            </a:r>
-            <a:r>
-              <a:rPr lang="ru-RU" dirty="0" smtClean="0"/>
-              <a:t>также применяется в некоторых камерах видеонаблюдения.</a:t>
-            </a:r>
-          </a:p>
-          <a:p>
-            <a:r>
-              <a:rPr lang="en-US" dirty="0" smtClean="0"/>
-              <a:t>GSM (Global System for Mobile Communications)</a:t>
-            </a:r>
-            <a:r>
-              <a:rPr lang="ru-RU" dirty="0" smtClean="0"/>
-              <a:t> – глобальный стандарт цифровой мобильной сотовой связи.</a:t>
-            </a:r>
-          </a:p>
-          <a:p>
-            <a:r>
-              <a:rPr lang="en-US" dirty="0" err="1" smtClean="0"/>
-              <a:t>iLPC</a:t>
-            </a:r>
-            <a:r>
-              <a:rPr lang="en-US" dirty="0" smtClean="0"/>
-              <a:t> (internet Low Bitrate Codec) –</a:t>
-            </a:r>
-            <a:r>
-              <a:rPr lang="en-US" baseline="0" dirty="0" smtClean="0"/>
-              <a:t> </a:t>
-            </a:r>
-            <a:r>
-              <a:rPr lang="ru-RU" baseline="0" dirty="0" smtClean="0"/>
-              <a:t>кодек для голосовой связи через интернет. Используется в </a:t>
-            </a:r>
-            <a:r>
-              <a:rPr lang="en-US" baseline="0" dirty="0" smtClean="0"/>
-              <a:t>Skype, Google Talk, Yahoo! Messenger</a:t>
-            </a:r>
-            <a:r>
-              <a:rPr lang="ru-RU" baseline="0" dirty="0" smtClean="0"/>
-              <a:t>.</a:t>
-            </a:r>
-          </a:p>
-          <a:p>
+              <a:t>. </a:t>
+            </a:r>
             <a:endParaRPr lang="ru-RU" dirty="0"/>
           </a:p>
         </p:txBody>
@@ -2694,7 +2408,7 @@
     </p:spTree>
     <p:extLst>
       <p:ext uri="{BB962C8B-B14F-4D97-AF65-F5344CB8AC3E}">
-        <p14:creationId xmlns:p14="http://schemas.microsoft.com/office/powerpoint/2010/main" val="765251595"/>
+        <p14:creationId xmlns:p14="http://schemas.microsoft.com/office/powerpoint/2010/main" val="881112415"/>
       </p:ext>
     </p:extLst>
   </p:cSld>
@@ -2750,26 +2464,11 @@
           <a:p>
             <a:r>
               <a:rPr lang="ru-RU" dirty="0" smtClean="0"/>
-              <a:t>Существующих стандартов по речевым кодекам крайне много, и на перечисление</a:t>
+              <a:t>Библиотека для речевого кодирования выполнена на интерфейсах.</a:t>
             </a:r>
             <a:r>
               <a:rPr lang="ru-RU" baseline="0" dirty="0" smtClean="0"/>
-              <a:t> всех уйдёт много времени.</a:t>
-            </a:r>
-          </a:p>
-          <a:p>
-            <a:r>
-              <a:rPr lang="ru-RU" baseline="0" dirty="0" smtClean="0"/>
-              <a:t>Однако при детальном рассмотрении выясняется, что так или иначе все указанные кодеки имеют почти одинаковую структуру.</a:t>
-            </a:r>
-          </a:p>
-          <a:p>
-            <a:endParaRPr lang="ru-RU" baseline="0" dirty="0" smtClean="0"/>
-          </a:p>
-          <a:p>
-            <a:r>
-              <a:rPr lang="ru-RU" baseline="0" dirty="0" smtClean="0"/>
-              <a:t>Далее приведены структуры двух упомянутых кодеков (в упрощённом варианте и чуть более подробном).</a:t>
+              <a:t> Это позволяет разработчику определить, что ему нужно, но при этом оставляет за ним выбор алгоритмов для речевого кодека.</a:t>
             </a:r>
             <a:endParaRPr lang="ru-RU" dirty="0"/>
           </a:p>
@@ -2801,7 +2500,7 @@
     </p:spTree>
     <p:extLst>
       <p:ext uri="{BB962C8B-B14F-4D97-AF65-F5344CB8AC3E}">
-        <p14:creationId xmlns:p14="http://schemas.microsoft.com/office/powerpoint/2010/main" val="816029027"/>
+        <p14:creationId xmlns:p14="http://schemas.microsoft.com/office/powerpoint/2010/main" val="3713118775"/>
       </p:ext>
     </p:extLst>
   </p:cSld>
@@ -2942,7 +2641,7 @@
           <a:p>
             <a:fld id="{35808EDE-81D6-4ED2-9EC2-EE12FAFD0105}" type="datetime1">
               <a:rPr lang="ru-RU" smtClean="0"/>
-              <a:t>02.06.2016</a:t>
+              <a:t>06.06.2016</a:t>
             </a:fld>
             <a:endParaRPr lang="ru-RU"/>
           </a:p>
@@ -3112,7 +2811,7 @@
           <a:p>
             <a:fld id="{8D7E723E-B8D7-44C7-B10B-5D871445047E}" type="datetime1">
               <a:rPr lang="ru-RU" smtClean="0"/>
-              <a:t>02.06.2016</a:t>
+              <a:t>06.06.2016</a:t>
             </a:fld>
             <a:endParaRPr lang="ru-RU"/>
           </a:p>
@@ -3292,7 +2991,7 @@
           <a:p>
             <a:fld id="{661058EC-A844-46A5-8F45-75E4678C8451}" type="datetime1">
               <a:rPr lang="ru-RU" smtClean="0"/>
-              <a:t>02.06.2016</a:t>
+              <a:t>06.06.2016</a:t>
             </a:fld>
             <a:endParaRPr lang="ru-RU"/>
           </a:p>
@@ -3462,7 +3161,7 @@
           <a:p>
             <a:fld id="{325B380F-5040-4154-A79A-EABE362B581A}" type="datetime1">
               <a:rPr lang="ru-RU" smtClean="0"/>
-              <a:t>02.06.2016</a:t>
+              <a:t>06.06.2016</a:t>
             </a:fld>
             <a:endParaRPr lang="ru-RU"/>
           </a:p>
@@ -3718,7 +3417,7 @@
           <a:p>
             <a:fld id="{F19E9547-32E0-41CA-94F8-41F0343CA97C}" type="datetime1">
               <a:rPr lang="ru-RU" smtClean="0"/>
-              <a:t>02.06.2016</a:t>
+              <a:t>06.06.2016</a:t>
             </a:fld>
             <a:endParaRPr lang="ru-RU"/>
           </a:p>
@@ -3950,7 +3649,7 @@
           <a:p>
             <a:fld id="{DCCF254F-F95D-4A5D-B936-645B632A5E26}" type="datetime1">
               <a:rPr lang="ru-RU" smtClean="0"/>
-              <a:t>02.06.2016</a:t>
+              <a:t>06.06.2016</a:t>
             </a:fld>
             <a:endParaRPr lang="ru-RU"/>
           </a:p>
@@ -4317,7 +4016,7 @@
           <a:p>
             <a:fld id="{67620C0F-32BC-42B2-9D92-E998672D5657}" type="datetime1">
               <a:rPr lang="ru-RU" smtClean="0"/>
-              <a:t>02.06.2016</a:t>
+              <a:t>06.06.2016</a:t>
             </a:fld>
             <a:endParaRPr lang="ru-RU"/>
           </a:p>
@@ -4435,7 +4134,7 @@
           <a:p>
             <a:fld id="{8188979D-7E5B-4655-A00A-039012B814B1}" type="datetime1">
               <a:rPr lang="ru-RU" smtClean="0"/>
-              <a:t>02.06.2016</a:t>
+              <a:t>06.06.2016</a:t>
             </a:fld>
             <a:endParaRPr lang="ru-RU"/>
           </a:p>
@@ -4530,7 +4229,7 @@
           <a:p>
             <a:fld id="{85DE12EB-D260-4F93-BE2B-7843578B1D1C}" type="datetime1">
               <a:rPr lang="ru-RU" smtClean="0"/>
-              <a:t>02.06.2016</a:t>
+              <a:t>06.06.2016</a:t>
             </a:fld>
             <a:endParaRPr lang="ru-RU"/>
           </a:p>
@@ -4817,7 +4516,7 @@
           <a:p>
             <a:fld id="{D4631A5B-4F88-4815-9FD1-043099A21EC2}" type="datetime1">
               <a:rPr lang="ru-RU" smtClean="0"/>
-              <a:t>02.06.2016</a:t>
+              <a:t>06.06.2016</a:t>
             </a:fld>
             <a:endParaRPr lang="ru-RU"/>
           </a:p>
@@ -5070,7 +4769,7 @@
           <a:p>
             <a:fld id="{6CBADF4A-3D61-495C-8A0C-D9B091AC4C9E}" type="datetime1">
               <a:rPr lang="ru-RU" smtClean="0"/>
-              <a:t>02.06.2016</a:t>
+              <a:t>06.06.2016</a:t>
             </a:fld>
             <a:endParaRPr lang="ru-RU"/>
           </a:p>
@@ -5283,7 +4982,7 @@
           <a:p>
             <a:fld id="{9ECFCDF8-316B-4DE3-A74A-EE5DDE0B2E76}" type="datetime1">
               <a:rPr lang="ru-RU" smtClean="0"/>
-              <a:t>02.06.2016</a:t>
+              <a:t>06.06.2016</a:t>
             </a:fld>
             <a:endParaRPr lang="ru-RU"/>
           </a:p>
@@ -5925,57 +5624,92 @@
           <a:chExt cx="0" cy="0"/>
         </a:xfrm>
       </p:grpSpPr>
-      <p:pic>
-        <p:nvPicPr>
-          <p:cNvPr id="2050" name="Picture 2" descr="&amp;Ucy;&amp;pcy;&amp;rcy;&amp;ocy;&amp;shchcy;&amp;iecy;&amp;ncy;&amp;ncy;&amp;acy;&amp;yacy; &amp;bcy;&amp;lcy;&amp;ocy;&amp;kcy;-&amp;scy;&amp;khcy;&amp;iecy;&amp;mcy;&amp;acy; EFR-&amp;kcy;&amp;ocy;&amp;dcy;&amp;iecy;&amp;rcy;&amp;acy;"/>
-          <p:cNvPicPr>
-            <a:picLocks noChangeAspect="1" noChangeArrowheads="1"/>
-          </p:cNvPicPr>
+      <p:sp>
+        <p:nvSpPr>
+          <p:cNvPr id="2" name="Номер слайда 1"/>
+          <p:cNvSpPr>
+            <a:spLocks noGrp="1"/>
+          </p:cNvSpPr>
+          <p:nvPr>
+            <p:ph type="sldNum" sz="quarter" idx="12"/>
+          </p:nvPr>
+        </p:nvSpPr>
+        <p:spPr/>
+        <p:txBody>
+          <a:bodyPr/>
+          <a:lstStyle/>
+          <a:p>
+            <a:fld id="{467DF74C-0500-4CF2-8353-AE1D1480DAD0}" type="slidenum">
+              <a:rPr lang="ru-RU" smtClean="0"/>
+              <a:pPr/>
+              <a:t>10</a:t>
+            </a:fld>
+            <a:endParaRPr lang="ru-RU" dirty="0"/>
+          </a:p>
+        </p:txBody>
+      </p:sp>
+      <p:sp>
+        <p:nvSpPr>
+          <p:cNvPr id="4" name="Прямоугольник 3"/>
+          <p:cNvSpPr/>
           <p:nvPr/>
-        </p:nvPicPr>
-        <p:blipFill>
-          <a:blip r:embed="rId3">
-            <a:extLst>
-              <a:ext uri="{28A0092B-C50C-407E-A947-70E740481C1C}">
-                <a14:useLocalDpi xmlns:a14="http://schemas.microsoft.com/office/drawing/2010/main" val="0"/>
-              </a:ext>
-            </a:extLst>
-          </a:blip>
-          <a:srcRect/>
-          <a:stretch>
-            <a:fillRect/>
-          </a:stretch>
-        </p:blipFill>
-        <p:spPr bwMode="auto">
+        </p:nvSpPr>
+        <p:spPr>
           <a:xfrm>
-            <a:off x="2101790" y="2525870"/>
-            <a:ext cx="9064149" cy="4332130"/>
+            <a:off x="1162740" y="1911323"/>
+            <a:ext cx="10629363" cy="4247317"/>
           </a:xfrm>
           <a:prstGeom prst="rect">
             <a:avLst/>
           </a:prstGeom>
-          <a:noFill/>
-          <a:extLst>
-            <a:ext uri="{909E8E84-426E-40DD-AFC4-6F175D3DCCD1}">
-              <a14:hiddenFill xmlns:a14="http://schemas.microsoft.com/office/drawing/2010/main">
+        </p:spPr>
+        <p:txBody>
+          <a:bodyPr wrap="square">
+            <a:spAutoFit/>
+          </a:bodyPr>
+          <a:lstStyle/>
+          <a:p>
+            <a:r>
+              <a:rPr lang="ru-RU" sz="5400" dirty="0" smtClean="0"/>
+              <a:t>Не </a:t>
+            </a:r>
+            <a:r>
+              <a:rPr lang="ru-RU" sz="5400" dirty="0"/>
+              <a:t>существует настолько надёжных каналов связи, </a:t>
+            </a:r>
+            <a:r>
+              <a:rPr lang="ru-RU" sz="5400" dirty="0" smtClean="0"/>
+              <a:t>которые </a:t>
+            </a:r>
+            <a:r>
+              <a:rPr lang="ru-RU" sz="5400" dirty="0"/>
+              <a:t>могут обеспечить полное отсутствие </a:t>
+            </a:r>
+            <a:r>
+              <a:rPr lang="ru-RU" sz="5400" dirty="0">
                 <a:solidFill>
-                  <a:srgbClr val="FFFFFF"/>
+                  <a:srgbClr val="FF0000"/>
                 </a:solidFill>
-              </a14:hiddenFill>
-            </a:ext>
-          </a:extLst>
-        </p:spPr>
-      </p:pic>
-      <p:sp>
-        <p:nvSpPr>
-          <p:cNvPr id="2" name="TextBox 1"/>
+              </a:rPr>
+              <a:t>помех</a:t>
+            </a:r>
+            <a:r>
+              <a:rPr lang="ru-RU" sz="5400" dirty="0"/>
+              <a:t>, воздействующих на передаваемую речь. </a:t>
+            </a:r>
+          </a:p>
+        </p:txBody>
+      </p:sp>
+      <p:sp>
+        <p:nvSpPr>
+          <p:cNvPr id="5" name="TextBox 4"/>
           <p:cNvSpPr txBox="1"/>
           <p:nvPr/>
         </p:nvSpPr>
         <p:spPr>
           <a:xfrm>
-            <a:off x="2936383" y="618186"/>
-            <a:ext cx="7676525" cy="1323439"/>
+            <a:off x="1270163" y="-163824"/>
+            <a:ext cx="10414518" cy="1877437"/>
           </a:xfrm>
           <a:prstGeom prst="rect">
             <a:avLst/>
@@ -5989,51 +5723,28 @@
           <a:lstStyle/>
           <a:p>
             <a:r>
-              <a:rPr lang="ru-RU" sz="4000" dirty="0" smtClean="0"/>
-              <a:t>Структура речевого кодера в </a:t>
-            </a:r>
-            <a:r>
-              <a:rPr lang="en-US" sz="4000" dirty="0" smtClean="0"/>
-              <a:t>GSM </a:t>
+              <a:rPr lang="ru-RU" sz="6800" dirty="0" smtClean="0"/>
+              <a:t>Проектирование</a:t>
+            </a:r>
+            <a:r>
+              <a:rPr lang="ru-RU" sz="6600" dirty="0" smtClean="0"/>
+              <a:t> библиотек</a:t>
             </a:r>
           </a:p>
           <a:p>
             <a:pPr algn="ctr"/>
             <a:r>
-              <a:rPr lang="en-US" sz="4000" dirty="0" smtClean="0"/>
-              <a:t>(Full Rate)</a:t>
-            </a:r>
-            <a:endParaRPr lang="ru-RU" sz="4000" dirty="0"/>
-          </a:p>
-        </p:txBody>
-      </p:sp>
-      <p:sp>
-        <p:nvSpPr>
-          <p:cNvPr id="3" name="Номер слайда 2"/>
-          <p:cNvSpPr>
-            <a:spLocks noGrp="1"/>
-          </p:cNvSpPr>
-          <p:nvPr>
-            <p:ph type="sldNum" sz="quarter" idx="12"/>
-          </p:nvPr>
-        </p:nvSpPr>
-        <p:spPr/>
-        <p:txBody>
-          <a:bodyPr/>
-          <a:lstStyle/>
-          <a:p>
-            <a:fld id="{467DF74C-0500-4CF2-8353-AE1D1480DAD0}" type="slidenum">
-              <a:rPr lang="ru-RU" smtClean="0"/>
-              <a:t>10</a:t>
-            </a:fld>
-            <a:endParaRPr lang="ru-RU"/>
+              <a:rPr lang="ru-RU" sz="4800" dirty="0" smtClean="0"/>
+              <a:t>ЗАЩИТА ОТ ПОМЕХ</a:t>
+            </a:r>
+            <a:endParaRPr lang="ru-RU" sz="4800" dirty="0"/>
           </a:p>
         </p:txBody>
       </p:sp>
     </p:spTree>
     <p:extLst>
       <p:ext uri="{BB962C8B-B14F-4D97-AF65-F5344CB8AC3E}">
-        <p14:creationId xmlns:p14="http://schemas.microsoft.com/office/powerpoint/2010/main" val="2105794391"/>
+        <p14:creationId xmlns:p14="http://schemas.microsoft.com/office/powerpoint/2010/main" val="2249017416"/>
       </p:ext>
     </p:extLst>
   </p:cSld>
@@ -6062,14 +5773,14 @@
       </p:grpSpPr>
       <p:sp>
         <p:nvSpPr>
-          <p:cNvPr id="5" name="TextBox 4"/>
+          <p:cNvPr id="2" name="TextBox 1"/>
           <p:cNvSpPr txBox="1"/>
           <p:nvPr/>
         </p:nvSpPr>
         <p:spPr>
           <a:xfrm>
-            <a:off x="1193442" y="695459"/>
-            <a:ext cx="9434378" cy="707886"/>
+            <a:off x="410590" y="-127304"/>
+            <a:ext cx="11395107" cy="1815882"/>
           </a:xfrm>
           <a:prstGeom prst="rect">
             <a:avLst/>
@@ -6082,69 +5793,160 @@
           </a:bodyPr>
           <a:lstStyle/>
           <a:p>
-            <a:r>
-              <a:rPr lang="ru-RU" sz="4000" dirty="0" smtClean="0"/>
-              <a:t>Структура кодера речи по стандарту </a:t>
-            </a:r>
-            <a:r>
-              <a:rPr lang="en-US" sz="4000" dirty="0" smtClean="0"/>
-              <a:t>G.726</a:t>
-            </a:r>
-            <a:endParaRPr lang="ru-RU" sz="4000" dirty="0"/>
-          </a:p>
-        </p:txBody>
-      </p:sp>
-      <p:sp>
-        <p:nvSpPr>
-          <p:cNvPr id="2" name="Номер слайда 1"/>
-          <p:cNvSpPr>
-            <a:spLocks noGrp="1"/>
-          </p:cNvSpPr>
-          <p:nvPr>
-            <p:ph type="sldNum" sz="quarter" idx="12"/>
-          </p:nvPr>
-        </p:nvSpPr>
-        <p:spPr/>
-        <p:txBody>
-          <a:bodyPr/>
-          <a:lstStyle/>
-          <a:p>
-            <a:fld id="{467DF74C-0500-4CF2-8353-AE1D1480DAD0}" type="slidenum">
-              <a:rPr lang="ru-RU" smtClean="0"/>
-              <a:t>11</a:t>
-            </a:fld>
-            <a:endParaRPr lang="ru-RU"/>
-          </a:p>
-        </p:txBody>
-      </p:sp>
-      <p:pic>
-        <p:nvPicPr>
-          <p:cNvPr id="3" name="Рисунок 2"/>
-          <p:cNvPicPr>
-            <a:picLocks noChangeAspect="1"/>
-          </p:cNvPicPr>
+            <a:pPr algn="ctr"/>
+            <a:r>
+              <a:rPr lang="ru-RU" sz="6800" dirty="0" smtClean="0"/>
+              <a:t>Проектирование</a:t>
+            </a:r>
+            <a:r>
+              <a:rPr lang="ru-RU" sz="6600" dirty="0" smtClean="0"/>
+              <a:t> библиотек</a:t>
+            </a:r>
+          </a:p>
+          <a:p>
+            <a:pPr algn="ctr"/>
+            <a:r>
+              <a:rPr lang="ru-RU" sz="4400" dirty="0" smtClean="0"/>
+              <a:t>ЗАЩИТА ОТ </a:t>
+            </a:r>
+            <a:r>
+              <a:rPr lang="ru-RU" sz="4400" dirty="0" smtClean="0"/>
+              <a:t>ПОМЕХ: ПРЕДЛАГАЕМЫЕ МЕТОДЫ</a:t>
+            </a:r>
+            <a:endParaRPr lang="ru-RU" sz="4400" dirty="0"/>
+          </a:p>
+        </p:txBody>
+      </p:sp>
+      <p:sp>
+        <p:nvSpPr>
+          <p:cNvPr id="3" name="TextBox 2"/>
+          <p:cNvSpPr txBox="1"/>
           <p:nvPr/>
-        </p:nvPicPr>
-        <p:blipFill>
-          <a:blip r:embed="rId3"/>
-          <a:stretch>
-            <a:fillRect/>
-          </a:stretch>
-        </p:blipFill>
+        </p:nvSpPr>
         <p:spPr>
           <a:xfrm>
-            <a:off x="1171575" y="1323975"/>
-            <a:ext cx="9848850" cy="4210050"/>
+            <a:off x="3008810" y="1688578"/>
+            <a:ext cx="7426961" cy="4524315"/>
           </a:xfrm>
           <a:prstGeom prst="rect">
             <a:avLst/>
           </a:prstGeom>
+          <a:noFill/>
         </p:spPr>
-      </p:pic>
+        <p:txBody>
+          <a:bodyPr wrap="square" rtlCol="0">
+            <a:spAutoFit/>
+          </a:bodyPr>
+          <a:lstStyle/>
+          <a:p>
+            <a:r>
+              <a:rPr lang="ru-RU" sz="3200" dirty="0" smtClean="0"/>
+              <a:t>Помехоустойчивые кодеки:</a:t>
+            </a:r>
+          </a:p>
+          <a:p>
+            <a:pPr marL="285750" indent="-285750">
+              <a:buFont typeface="Arial" panose="020B0604020202020204" pitchFamily="34" charset="0"/>
+              <a:buChar char="•"/>
+            </a:pPr>
+            <a:r>
+              <a:rPr lang="ru-RU" sz="3200" dirty="0" smtClean="0"/>
+              <a:t>блочные</a:t>
+            </a:r>
+          </a:p>
+          <a:p>
+            <a:r>
+              <a:rPr lang="en-US" sz="3200" dirty="0" smtClean="0"/>
+              <a:t>	</a:t>
+            </a:r>
+            <a:r>
+              <a:rPr lang="ru-RU" sz="3200" dirty="0" smtClean="0"/>
+              <a:t>дополнение до чётности</a:t>
+            </a:r>
+          </a:p>
+          <a:p>
+            <a:r>
+              <a:rPr lang="ru-RU" sz="3200" dirty="0"/>
+              <a:t>	</a:t>
+            </a:r>
+            <a:r>
+              <a:rPr lang="ru-RU" sz="3200" dirty="0" smtClean="0"/>
+              <a:t>код Хэмминга</a:t>
+            </a:r>
+          </a:p>
+          <a:p>
+            <a:r>
+              <a:rPr lang="ru-RU" sz="3200" dirty="0"/>
+              <a:t>	</a:t>
+            </a:r>
+            <a:r>
+              <a:rPr lang="ru-RU" sz="3200" dirty="0" smtClean="0"/>
+              <a:t>циклические коды</a:t>
+            </a:r>
+          </a:p>
+          <a:p>
+            <a:pPr marL="285750" indent="-285750">
+              <a:buFont typeface="Arial" panose="020B0604020202020204" pitchFamily="34" charset="0"/>
+              <a:buChar char="•"/>
+            </a:pPr>
+            <a:r>
+              <a:rPr lang="ru-RU" sz="3200" dirty="0" err="1" smtClean="0"/>
+              <a:t>свёрточные</a:t>
+            </a:r>
+            <a:endParaRPr lang="ru-RU" sz="3200" dirty="0"/>
+          </a:p>
+          <a:p>
+            <a:r>
+              <a:rPr lang="ru-RU" sz="3200" dirty="0" smtClean="0"/>
+              <a:t>	вставка контрольных бит</a:t>
+            </a:r>
+          </a:p>
+          <a:p>
+            <a:r>
+              <a:rPr lang="ru-RU" sz="3200" dirty="0"/>
+              <a:t>	</a:t>
+            </a:r>
+            <a:r>
+              <a:rPr lang="ru-RU" sz="3200" dirty="0" smtClean="0"/>
+              <a:t>кодирование полином с задержкой</a:t>
+            </a:r>
+          </a:p>
+          <a:p>
+            <a:r>
+              <a:rPr lang="ru-RU" sz="3200" dirty="0" smtClean="0"/>
+              <a:t>Интерливинг</a:t>
+            </a:r>
+            <a:endParaRPr lang="ru-RU" sz="3200" dirty="0"/>
+          </a:p>
+        </p:txBody>
+      </p:sp>
+      <p:sp>
+        <p:nvSpPr>
+          <p:cNvPr id="4" name="Номер слайда 3"/>
+          <p:cNvSpPr>
+            <a:spLocks noGrp="1"/>
+          </p:cNvSpPr>
+          <p:nvPr>
+            <p:ph type="sldNum" sz="quarter" idx="12"/>
+          </p:nvPr>
+        </p:nvSpPr>
+        <p:spPr/>
+        <p:txBody>
+          <a:bodyPr/>
+          <a:lstStyle/>
+          <a:p>
+            <a:fld id="{467DF74C-0500-4CF2-8353-AE1D1480DAD0}" type="slidenum">
+              <a:rPr lang="ru-RU" smtClean="0"/>
+              <a:t>11</a:t>
+            </a:fld>
+            <a:endParaRPr lang="ru-RU"/>
+          </a:p>
+        </p:txBody>
+      </p:sp>
     </p:spTree>
     <p:extLst>
       <p:ext uri="{BB962C8B-B14F-4D97-AF65-F5344CB8AC3E}">
-        <p14:creationId xmlns:p14="http://schemas.microsoft.com/office/powerpoint/2010/main" val="2041384427"/>
+        <p14:creationId xmlns:p14="http://schemas.microsoft.com/office/powerpoint/2010/main" val="3392201360"/>
       </p:ext>
     </p:extLst>
   </p:cSld>
@@ -6173,396 +5975,6 @@
       </p:grpSpPr>
       <p:sp>
         <p:nvSpPr>
-          <p:cNvPr id="3" name="TextBox 2"/>
-          <p:cNvSpPr txBox="1"/>
-          <p:nvPr/>
-        </p:nvSpPr>
-        <p:spPr>
-          <a:xfrm>
-            <a:off x="3348296" y="60732"/>
-            <a:ext cx="6769867" cy="584775"/>
-          </a:xfrm>
-          <a:prstGeom prst="rect">
-            <a:avLst/>
-          </a:prstGeom>
-          <a:noFill/>
-        </p:spPr>
-        <p:txBody>
-          <a:bodyPr wrap="none" rtlCol="0">
-            <a:spAutoFit/>
-          </a:bodyPr>
-          <a:lstStyle/>
-          <a:p>
-            <a:r>
-              <a:rPr lang="ru-RU" sz="3200" b="1" dirty="0" smtClean="0"/>
-              <a:t>Структура типичного речевого кодер</a:t>
-            </a:r>
-            <a:endParaRPr lang="ru-RU" sz="3200" b="1" dirty="0"/>
-          </a:p>
-        </p:txBody>
-      </p:sp>
-      <p:sp>
-        <p:nvSpPr>
-          <p:cNvPr id="4" name="Номер слайда 3"/>
-          <p:cNvSpPr>
-            <a:spLocks noGrp="1"/>
-          </p:cNvSpPr>
-          <p:nvPr>
-            <p:ph type="sldNum" sz="quarter" idx="12"/>
-          </p:nvPr>
-        </p:nvSpPr>
-        <p:spPr/>
-        <p:txBody>
-          <a:bodyPr/>
-          <a:lstStyle/>
-          <a:p>
-            <a:fld id="{467DF74C-0500-4CF2-8353-AE1D1480DAD0}" type="slidenum">
-              <a:rPr lang="ru-RU" smtClean="0"/>
-              <a:t>12</a:t>
-            </a:fld>
-            <a:endParaRPr lang="ru-RU"/>
-          </a:p>
-        </p:txBody>
-      </p:sp>
-      <p:sp>
-        <p:nvSpPr>
-          <p:cNvPr id="5" name="TextBox 4"/>
-          <p:cNvSpPr txBox="1"/>
-          <p:nvPr/>
-        </p:nvSpPr>
-        <p:spPr>
-          <a:xfrm>
-            <a:off x="8044326" y="1143608"/>
-            <a:ext cx="4147674" cy="4801314"/>
-          </a:xfrm>
-          <a:prstGeom prst="rect">
-            <a:avLst/>
-          </a:prstGeom>
-          <a:noFill/>
-        </p:spPr>
-        <p:txBody>
-          <a:bodyPr wrap="none" rtlCol="0">
-            <a:spAutoFit/>
-          </a:bodyPr>
-          <a:lstStyle/>
-          <a:p>
-            <a:r>
-              <a:rPr lang="ru-RU" dirty="0"/>
-              <a:t>10 – блок генерации кода возбуждения</a:t>
-            </a:r>
-          </a:p>
-          <a:p>
-            <a:r>
-              <a:rPr lang="ru-RU" dirty="0"/>
-              <a:t>12 – синтезирующий фильтр с </a:t>
-            </a:r>
-            <a:endParaRPr lang="ru-RU" dirty="0" smtClean="0"/>
-          </a:p>
-          <a:p>
-            <a:r>
-              <a:rPr lang="ru-RU" dirty="0" smtClean="0"/>
-              <a:t>         линейным </a:t>
-            </a:r>
-            <a:r>
-              <a:rPr lang="ru-RU" dirty="0"/>
-              <a:t>предсказанием</a:t>
-            </a:r>
-          </a:p>
-          <a:p>
-            <a:r>
-              <a:rPr lang="ru-RU" dirty="0"/>
-              <a:t>14 – адаптивный кодовый словарь</a:t>
-            </a:r>
-          </a:p>
-          <a:p>
-            <a:r>
-              <a:rPr lang="ru-RU" dirty="0"/>
-              <a:t>16 – фиксированный кодовый словарь</a:t>
-            </a:r>
-          </a:p>
-          <a:p>
-            <a:r>
-              <a:rPr lang="ru-RU" dirty="0"/>
-              <a:t>18 – сумматор</a:t>
-            </a:r>
-          </a:p>
-          <a:p>
-            <a:r>
-              <a:rPr lang="ru-RU" dirty="0"/>
-              <a:t>20 – сумматор</a:t>
-            </a:r>
-          </a:p>
-          <a:p>
-            <a:r>
-              <a:rPr lang="ru-RU" dirty="0"/>
-              <a:t>22 – взвешивающий фильтр (</a:t>
-            </a:r>
-            <a:r>
-              <a:rPr lang="ru-RU" dirty="0" smtClean="0"/>
-              <a:t>формирует</a:t>
-            </a:r>
-          </a:p>
-          <a:p>
-            <a:r>
-              <a:rPr lang="ru-RU" dirty="0" smtClean="0"/>
-              <a:t>         вектор </a:t>
-            </a:r>
-            <a:r>
-              <a:rPr lang="ru-RU" dirty="0"/>
-              <a:t>взвешенной ошибки)</a:t>
-            </a:r>
-          </a:p>
-          <a:p>
-            <a:r>
-              <a:rPr lang="ru-RU" dirty="0"/>
-              <a:t>24 – блок для формирования меры </a:t>
-            </a:r>
-            <a:endParaRPr lang="ru-RU" dirty="0" smtClean="0"/>
-          </a:p>
-          <a:p>
-            <a:r>
-              <a:rPr lang="ru-RU" dirty="0"/>
-              <a:t>  </a:t>
-            </a:r>
-            <a:r>
-              <a:rPr lang="ru-RU" dirty="0" smtClean="0"/>
-              <a:t>       энергии </a:t>
-            </a:r>
-            <a:r>
-              <a:rPr lang="ru-RU" dirty="0"/>
-              <a:t>взвешенной ошибки</a:t>
-            </a:r>
-          </a:p>
-          <a:p>
-            <a:r>
-              <a:rPr lang="ru-RU" dirty="0"/>
-              <a:t>26 – блок минимизации вектора </a:t>
-            </a:r>
-            <a:endParaRPr lang="ru-RU" dirty="0" smtClean="0"/>
-          </a:p>
-          <a:p>
-            <a:r>
-              <a:rPr lang="ru-RU" dirty="0"/>
-              <a:t> </a:t>
-            </a:r>
-            <a:r>
-              <a:rPr lang="ru-RU" dirty="0" smtClean="0"/>
-              <a:t>        взвешенной </a:t>
-            </a:r>
-            <a:r>
-              <a:rPr lang="ru-RU" dirty="0"/>
-              <a:t>ошибки</a:t>
-            </a:r>
-          </a:p>
-          <a:p>
-            <a:r>
-              <a:rPr lang="ru-RU" dirty="0"/>
-              <a:t>28 – анализатор линейного </a:t>
-            </a:r>
-            <a:endParaRPr lang="ru-RU" dirty="0" smtClean="0"/>
-          </a:p>
-          <a:p>
-            <a:r>
-              <a:rPr lang="ru-RU" dirty="0" smtClean="0"/>
-              <a:t>         кодирования </a:t>
-            </a:r>
-            <a:r>
-              <a:rPr lang="ru-RU" dirty="0"/>
-              <a:t>с предсказанием</a:t>
-            </a:r>
-          </a:p>
-          <a:p>
-            <a:r>
-              <a:rPr lang="ru-RU" dirty="0"/>
-              <a:t>30 – элемент задержки</a:t>
-            </a:r>
-          </a:p>
-          <a:p>
-            <a:endParaRPr lang="ru-RU" dirty="0"/>
-          </a:p>
-        </p:txBody>
-      </p:sp>
-      <p:pic>
-        <p:nvPicPr>
-          <p:cNvPr id="8" name="Рисунок 7"/>
-          <p:cNvPicPr>
-            <a:picLocks noChangeAspect="1"/>
-          </p:cNvPicPr>
-          <p:nvPr/>
-        </p:nvPicPr>
-        <p:blipFill>
-          <a:blip r:embed="rId3"/>
-          <a:stretch>
-            <a:fillRect/>
-          </a:stretch>
-        </p:blipFill>
-        <p:spPr>
-          <a:xfrm>
-            <a:off x="0" y="858215"/>
-            <a:ext cx="8001000" cy="5372100"/>
-          </a:xfrm>
-          <a:prstGeom prst="rect">
-            <a:avLst/>
-          </a:prstGeom>
-        </p:spPr>
-      </p:pic>
-    </p:spTree>
-    <p:extLst>
-      <p:ext uri="{BB962C8B-B14F-4D97-AF65-F5344CB8AC3E}">
-        <p14:creationId xmlns:p14="http://schemas.microsoft.com/office/powerpoint/2010/main" val="887822207"/>
-      </p:ext>
-    </p:extLst>
-  </p:cSld>
-  <p:clrMapOvr>
-    <a:masterClrMapping/>
-  </p:clrMapOvr>
-</p:sld>
-</file>
-
-<file path=ppt/slides/slide13.xml><?xml version="1.0" encoding="utf-8"?>
-<p:sld xmlns:a="http://schemas.openxmlformats.org/drawingml/2006/main" xmlns:r="http://schemas.openxmlformats.org/officeDocument/2006/relationships" xmlns:p="http://schemas.openxmlformats.org/presentationml/2006/main">
-  <p:cSld>
-    <p:spTree>
-      <p:nvGrpSpPr>
-        <p:cNvPr id="1" name=""/>
-        <p:cNvGrpSpPr/>
-        <p:nvPr/>
-      </p:nvGrpSpPr>
-      <p:grpSpPr>
-        <a:xfrm>
-          <a:off x="0" y="0"/>
-          <a:ext cx="0" cy="0"/>
-          <a:chOff x="0" y="0"/>
-          <a:chExt cx="0" cy="0"/>
-        </a:xfrm>
-      </p:grpSpPr>
-      <p:pic>
-        <p:nvPicPr>
-          <p:cNvPr id="3" name="Рисунок 2"/>
-          <p:cNvPicPr>
-            <a:picLocks noChangeAspect="1"/>
-          </p:cNvPicPr>
-          <p:nvPr/>
-        </p:nvPicPr>
-        <p:blipFill>
-          <a:blip r:embed="rId3"/>
-          <a:stretch>
-            <a:fillRect/>
-          </a:stretch>
-        </p:blipFill>
-        <p:spPr>
-          <a:xfrm>
-            <a:off x="3425781" y="143888"/>
-            <a:ext cx="5061816" cy="5733524"/>
-          </a:xfrm>
-          <a:prstGeom prst="rect">
-            <a:avLst/>
-          </a:prstGeom>
-        </p:spPr>
-      </p:pic>
-      <p:sp>
-        <p:nvSpPr>
-          <p:cNvPr id="5" name="Скругленный прямоугольник 4"/>
-          <p:cNvSpPr/>
-          <p:nvPr/>
-        </p:nvSpPr>
-        <p:spPr>
-          <a:xfrm>
-            <a:off x="180304" y="476518"/>
-            <a:ext cx="11732654" cy="6091707"/>
-          </a:xfrm>
-          <a:prstGeom prst="roundRect">
-            <a:avLst/>
-          </a:prstGeom>
-          <a:solidFill>
-            <a:schemeClr val="accent1">
-              <a:alpha val="75000"/>
-            </a:schemeClr>
-          </a:solidFill>
-        </p:spPr>
-        <p:style>
-          <a:lnRef idx="2">
-            <a:schemeClr val="accent1">
-              <a:shade val="50000"/>
-            </a:schemeClr>
-          </a:lnRef>
-          <a:fillRef idx="1">
-            <a:schemeClr val="accent1"/>
-          </a:fillRef>
-          <a:effectRef idx="0">
-            <a:schemeClr val="accent1"/>
-          </a:effectRef>
-          <a:fontRef idx="minor">
-            <a:schemeClr val="lt1"/>
-          </a:fontRef>
-        </p:style>
-        <p:txBody>
-          <a:bodyPr rtlCol="0" anchor="ctr"/>
-          <a:lstStyle/>
-          <a:p>
-            <a:pPr lvl="0"/>
-            <a:r>
-              <a:rPr lang="ru-RU" sz="5400" dirty="0"/>
-              <a:t>Используя интерфейс, мы можем без проблем рассказать, какие действия должен уметь выполнять данный алгоритм и, следовательно, что в данной функции должно быть реализовано.</a:t>
-            </a:r>
-          </a:p>
-        </p:txBody>
-      </p:sp>
-      <p:sp>
-        <p:nvSpPr>
-          <p:cNvPr id="2" name="Номер слайда 1"/>
-          <p:cNvSpPr>
-            <a:spLocks noGrp="1"/>
-          </p:cNvSpPr>
-          <p:nvPr>
-            <p:ph type="sldNum" sz="quarter" idx="12"/>
-          </p:nvPr>
-        </p:nvSpPr>
-        <p:spPr/>
-        <p:txBody>
-          <a:bodyPr/>
-          <a:lstStyle/>
-          <a:p>
-            <a:fld id="{467DF74C-0500-4CF2-8353-AE1D1480DAD0}" type="slidenum">
-              <a:rPr lang="ru-RU" smtClean="0"/>
-              <a:t>13</a:t>
-            </a:fld>
-            <a:endParaRPr lang="ru-RU"/>
-          </a:p>
-        </p:txBody>
-      </p:sp>
-    </p:spTree>
-    <p:extLst>
-      <p:ext uri="{BB962C8B-B14F-4D97-AF65-F5344CB8AC3E}">
-        <p14:creationId xmlns:p14="http://schemas.microsoft.com/office/powerpoint/2010/main" val="3327599666"/>
-      </p:ext>
-    </p:extLst>
-  </p:cSld>
-  <p:clrMapOvr>
-    <a:masterClrMapping/>
-  </p:clrMapOvr>
-</p:sld>
-</file>
-
-<file path=ppt/slides/slide14.xml><?xml version="1.0" encoding="utf-8"?>
-<p:sld xmlns:a="http://schemas.openxmlformats.org/drawingml/2006/main" xmlns:r="http://schemas.openxmlformats.org/officeDocument/2006/relationships" xmlns:p="http://schemas.openxmlformats.org/presentationml/2006/main">
-  <p:cSld>
-    <p:spTree>
-      <p:nvGrpSpPr>
-        <p:cNvPr id="1" name=""/>
-        <p:cNvGrpSpPr/>
-        <p:nvPr/>
-      </p:nvGrpSpPr>
-      <p:grpSpPr>
-        <a:xfrm>
-          <a:off x="0" y="0"/>
-          <a:ext cx="0" cy="0"/>
-          <a:chOff x="0" y="0"/>
-          <a:chExt cx="0" cy="0"/>
-        </a:xfrm>
-      </p:grpSpPr>
-      <p:sp>
-        <p:nvSpPr>
           <p:cNvPr id="2" name="TextBox 1"/>
           <p:cNvSpPr txBox="1"/>
           <p:nvPr/>
@@ -6610,8 +6022,8 @@
         </p:nvSpPr>
         <p:spPr>
           <a:xfrm>
-            <a:off x="3008810" y="1688578"/>
-            <a:ext cx="7426961" cy="4524315"/>
+            <a:off x="1609859" y="2100702"/>
+            <a:ext cx="11182404" cy="2585323"/>
           </a:xfrm>
           <a:prstGeom prst="rect">
             <a:avLst/>
@@ -6625,209 +6037,12 @@
           <a:lstStyle/>
           <a:p>
             <a:r>
-              <a:rPr lang="ru-RU" sz="3200" dirty="0" smtClean="0"/>
-              <a:t>Помехоустойчивые кодеки:</a:t>
-            </a:r>
-          </a:p>
-          <a:p>
-            <a:pPr marL="285750" indent="-285750">
-              <a:buFont typeface="Arial" panose="020B0604020202020204" pitchFamily="34" charset="0"/>
-              <a:buChar char="•"/>
-            </a:pPr>
-            <a:r>
-              <a:rPr lang="ru-RU" sz="3200" dirty="0" smtClean="0"/>
-              <a:t>блочные</a:t>
-            </a:r>
-          </a:p>
-          <a:p>
-            <a:r>
-              <a:rPr lang="en-US" sz="3200" dirty="0" smtClean="0"/>
-              <a:t>	</a:t>
-            </a:r>
-            <a:r>
-              <a:rPr lang="ru-RU" sz="3200" dirty="0" smtClean="0"/>
-              <a:t>дополнение до чётности</a:t>
-            </a:r>
-          </a:p>
-          <a:p>
-            <a:r>
-              <a:rPr lang="ru-RU" sz="3200" dirty="0"/>
-              <a:t>	</a:t>
-            </a:r>
-            <a:r>
-              <a:rPr lang="ru-RU" sz="3200" dirty="0" smtClean="0"/>
-              <a:t>код Хэмминга</a:t>
-            </a:r>
-          </a:p>
-          <a:p>
-            <a:r>
-              <a:rPr lang="ru-RU" sz="3200" dirty="0"/>
-              <a:t>	</a:t>
-            </a:r>
-            <a:r>
-              <a:rPr lang="ru-RU" sz="3200" dirty="0" smtClean="0"/>
-              <a:t>циклические коды</a:t>
-            </a:r>
-          </a:p>
-          <a:p>
-            <a:pPr marL="285750" indent="-285750">
-              <a:buFont typeface="Arial" panose="020B0604020202020204" pitchFamily="34" charset="0"/>
-              <a:buChar char="•"/>
-            </a:pPr>
-            <a:r>
-              <a:rPr lang="ru-RU" sz="3200" dirty="0" err="1" smtClean="0"/>
-              <a:t>свёрточные</a:t>
-            </a:r>
-            <a:endParaRPr lang="ru-RU" sz="3200" dirty="0"/>
-          </a:p>
-          <a:p>
-            <a:r>
-              <a:rPr lang="ru-RU" sz="3200" dirty="0" smtClean="0"/>
-              <a:t>	вставка контрольных бит</a:t>
-            </a:r>
-          </a:p>
-          <a:p>
-            <a:r>
-              <a:rPr lang="ru-RU" sz="3200" dirty="0"/>
-              <a:t>	</a:t>
-            </a:r>
-            <a:r>
-              <a:rPr lang="ru-RU" sz="3200" dirty="0" smtClean="0"/>
-              <a:t>кодирование полином с задержкой</a:t>
-            </a:r>
-          </a:p>
-          <a:p>
-            <a:r>
-              <a:rPr lang="ru-RU" sz="3200" dirty="0" smtClean="0"/>
-              <a:t>Интерливинг</a:t>
-            </a:r>
-            <a:endParaRPr lang="ru-RU" sz="3200" dirty="0"/>
-          </a:p>
-        </p:txBody>
-      </p:sp>
-      <p:sp>
-        <p:nvSpPr>
-          <p:cNvPr id="4" name="Номер слайда 3"/>
-          <p:cNvSpPr>
-            <a:spLocks noGrp="1"/>
-          </p:cNvSpPr>
-          <p:nvPr>
-            <p:ph type="sldNum" sz="quarter" idx="12"/>
-          </p:nvPr>
-        </p:nvSpPr>
-        <p:spPr/>
-        <p:txBody>
-          <a:bodyPr/>
-          <a:lstStyle/>
-          <a:p>
-            <a:fld id="{467DF74C-0500-4CF2-8353-AE1D1480DAD0}" type="slidenum">
-              <a:rPr lang="ru-RU" smtClean="0"/>
-              <a:t>14</a:t>
-            </a:fld>
-            <a:endParaRPr lang="ru-RU"/>
-          </a:p>
-        </p:txBody>
-      </p:sp>
-    </p:spTree>
-    <p:extLst>
-      <p:ext uri="{BB962C8B-B14F-4D97-AF65-F5344CB8AC3E}">
-        <p14:creationId xmlns:p14="http://schemas.microsoft.com/office/powerpoint/2010/main" val="3392201360"/>
-      </p:ext>
-    </p:extLst>
-  </p:cSld>
-  <p:clrMapOvr>
-    <a:masterClrMapping/>
-  </p:clrMapOvr>
-</p:sld>
-</file>
-
-<file path=ppt/slides/slide15.xml><?xml version="1.0" encoding="utf-8"?>
-<p:sld xmlns:a="http://schemas.openxmlformats.org/drawingml/2006/main" xmlns:r="http://schemas.openxmlformats.org/officeDocument/2006/relationships" xmlns:p="http://schemas.openxmlformats.org/presentationml/2006/main">
-  <p:cSld>
-    <p:spTree>
-      <p:nvGrpSpPr>
-        <p:cNvPr id="1" name=""/>
-        <p:cNvGrpSpPr/>
-        <p:nvPr/>
-      </p:nvGrpSpPr>
-      <p:grpSpPr>
-        <a:xfrm>
-          <a:off x="0" y="0"/>
-          <a:ext cx="0" cy="0"/>
-          <a:chOff x="0" y="0"/>
-          <a:chExt cx="0" cy="0"/>
-        </a:xfrm>
-      </p:grpSpPr>
-      <p:sp>
-        <p:nvSpPr>
-          <p:cNvPr id="2" name="TextBox 1"/>
-          <p:cNvSpPr txBox="1"/>
-          <p:nvPr/>
-        </p:nvSpPr>
-        <p:spPr>
-          <a:xfrm>
-            <a:off x="1270163" y="-163824"/>
-            <a:ext cx="10414518" cy="1877437"/>
-          </a:xfrm>
-          <a:prstGeom prst="rect">
-            <a:avLst/>
-          </a:prstGeom>
-          <a:noFill/>
-        </p:spPr>
-        <p:txBody>
-          <a:bodyPr wrap="none" rtlCol="0">
-            <a:spAutoFit/>
-          </a:bodyPr>
-          <a:lstStyle/>
-          <a:p>
-            <a:r>
-              <a:rPr lang="ru-RU" sz="6800" dirty="0" smtClean="0"/>
-              <a:t>Проектирование</a:t>
-            </a:r>
-            <a:r>
-              <a:rPr lang="ru-RU" sz="6600" dirty="0" smtClean="0"/>
-              <a:t> библиотек</a:t>
-            </a:r>
-          </a:p>
-          <a:p>
-            <a:pPr algn="ctr"/>
-            <a:r>
-              <a:rPr lang="ru-RU" sz="4800" dirty="0" smtClean="0"/>
-              <a:t>ЗАЩИТА ОТ ПОМЕХ</a:t>
-            </a:r>
-            <a:endParaRPr lang="ru-RU" sz="4800" dirty="0"/>
-          </a:p>
-        </p:txBody>
-      </p:sp>
-      <p:sp>
-        <p:nvSpPr>
-          <p:cNvPr id="3" name="TextBox 2"/>
-          <p:cNvSpPr txBox="1"/>
-          <p:nvPr/>
-        </p:nvSpPr>
-        <p:spPr>
-          <a:xfrm>
-            <a:off x="1609859" y="2100702"/>
-            <a:ext cx="11182404" cy="3416320"/>
-          </a:xfrm>
-          <a:prstGeom prst="rect">
-            <a:avLst/>
-          </a:prstGeom>
-          <a:noFill/>
-        </p:spPr>
-        <p:txBody>
-          <a:bodyPr wrap="square" rtlCol="0">
-            <a:spAutoFit/>
-          </a:bodyPr>
-          <a:lstStyle/>
-          <a:p>
-            <a:r>
               <a:rPr lang="ru-RU" sz="5400" dirty="0"/>
-              <a:t>Насколько хорошо надо </a:t>
+              <a:t>Насколько </a:t>
             </a:r>
             <a:r>
               <a:rPr lang="ru-RU" sz="5400" dirty="0" smtClean="0"/>
-              <a:t>организовать или повысить </a:t>
+              <a:t>хорошо надо повысить </a:t>
             </a:r>
             <a:r>
               <a:rPr lang="ru-RU" sz="5400" dirty="0"/>
@@ -6905,7 +6120,7 @@
           <a:p>
             <a:fld id="{467DF74C-0500-4CF2-8353-AE1D1480DAD0}" type="slidenum">
               <a:rPr lang="ru-RU" smtClean="0"/>
-              <a:t>15</a:t>
+              <a:t>12</a:t>
             </a:fld>
             <a:endParaRPr lang="ru-RU"/>
           </a:p>
@@ -6924,7 +6139,7 @@
 </p:sld>
 </file>
 
-<file path=ppt/slides/slide16.xml><?xml version="1.0" encoding="utf-8"?>
+<file path=ppt/slides/slide13.xml><?xml version="1.0" encoding="utf-8"?>
 <p:sld xmlns:a="http://schemas.openxmlformats.org/drawingml/2006/main" xmlns:r="http://schemas.openxmlformats.org/officeDocument/2006/relationships" xmlns:p="http://schemas.openxmlformats.org/presentationml/2006/main">
   <p:cSld>
     <p:spTree>
@@ -6943,14 +6158,38 @@
       </p:grpSpPr>
       <p:sp>
         <p:nvSpPr>
+          <p:cNvPr id="2" name="Номер слайда 1"/>
+          <p:cNvSpPr>
+            <a:spLocks noGrp="1"/>
+          </p:cNvSpPr>
+          <p:nvPr>
+            <p:ph type="sldNum" sz="quarter" idx="12"/>
+          </p:nvPr>
+        </p:nvSpPr>
+        <p:spPr/>
+        <p:txBody>
+          <a:bodyPr/>
+          <a:lstStyle/>
+          <a:p>
+            <a:fld id="{467DF74C-0500-4CF2-8353-AE1D1480DAD0}" type="slidenum">
+              <a:rPr lang="ru-RU" smtClean="0"/>
+              <a:pPr/>
+              <a:t>13</a:t>
+            </a:fld>
+            <a:endParaRPr lang="ru-RU" dirty="0"/>
+          </a:p>
+        </p:txBody>
+      </p:sp>
+      <p:sp>
+        <p:nvSpPr>
           <p:cNvPr id="3" name="TextBox 2"/>
           <p:cNvSpPr txBox="1"/>
           <p:nvPr/>
         </p:nvSpPr>
         <p:spPr>
           <a:xfrm>
-            <a:off x="978795" y="528034"/>
-            <a:ext cx="10586433" cy="3877985"/>
+            <a:off x="797239" y="0"/>
+            <a:ext cx="11276228" cy="1446550"/>
           </a:xfrm>
           <a:prstGeom prst="rect">
             <a:avLst/>
@@ -6958,78 +6197,114 @@
           <a:noFill/>
         </p:spPr>
         <p:txBody>
-          <a:bodyPr wrap="square" rtlCol="0">
+          <a:bodyPr wrap="none" rtlCol="0">
             <a:spAutoFit/>
           </a:bodyPr>
           <a:lstStyle/>
           <a:p>
-            <a:r>
-              <a:rPr lang="ru-RU" sz="5400" b="1" dirty="0" smtClean="0"/>
-              <a:t>Источниками ошибок могут быть:</a:t>
-            </a:r>
-          </a:p>
-          <a:p>
-            <a:endParaRPr lang="ru-RU" sz="4800" dirty="0" smtClean="0"/>
-          </a:p>
-          <a:p>
-            <a:pPr marL="285750" indent="-285750">
-              <a:buFont typeface="Arial" panose="020B0604020202020204" pitchFamily="34" charset="0"/>
-              <a:buChar char="•"/>
-            </a:pPr>
-            <a:r>
-              <a:rPr lang="ru-RU" sz="4800" dirty="0" smtClean="0"/>
-              <a:t>метеоусловия </a:t>
-            </a:r>
-          </a:p>
-          <a:p>
-            <a:pPr marL="285750" indent="-285750">
-              <a:buFont typeface="Arial" panose="020B0604020202020204" pitchFamily="34" charset="0"/>
-              <a:buChar char="•"/>
-            </a:pPr>
-            <a:r>
-              <a:rPr lang="ru-RU" sz="4800" dirty="0" smtClean="0"/>
-              <a:t>взаимные помехи </a:t>
-            </a:r>
-          </a:p>
-          <a:p>
-            <a:pPr marL="285750" indent="-285750">
-              <a:buFont typeface="Arial" panose="020B0604020202020204" pitchFamily="34" charset="0"/>
-              <a:buChar char="•"/>
-            </a:pPr>
-            <a:r>
-              <a:rPr lang="ru-RU" sz="4800" dirty="0" smtClean="0"/>
-              <a:t>промышленные  помехи</a:t>
-            </a:r>
-          </a:p>
-        </p:txBody>
-      </p:sp>
-      <p:sp>
-        <p:nvSpPr>
-          <p:cNvPr id="2" name="Номер слайда 1"/>
-          <p:cNvSpPr>
-            <a:spLocks noGrp="1"/>
-          </p:cNvSpPr>
-          <p:nvPr>
-            <p:ph type="sldNum" sz="quarter" idx="12"/>
-          </p:nvPr>
-        </p:nvSpPr>
-        <p:spPr/>
-        <p:txBody>
-          <a:bodyPr/>
-          <a:lstStyle/>
-          <a:p>
-            <a:fld id="{467DF74C-0500-4CF2-8353-AE1D1480DAD0}" type="slidenum">
-              <a:rPr lang="ru-RU" smtClean="0"/>
-              <a:t>16</a:t>
-            </a:fld>
-            <a:endParaRPr lang="ru-RU"/>
+            <a:pPr algn="ctr"/>
+            <a:r>
+              <a:rPr lang="ru-RU" sz="4400" dirty="0" smtClean="0"/>
+              <a:t>Методология выбора метода обработки речи </a:t>
+            </a:r>
+          </a:p>
+          <a:p>
+            <a:pPr algn="ctr"/>
+            <a:r>
+              <a:rPr lang="ru-RU" sz="4400" dirty="0" smtClean="0"/>
+              <a:t>для передачи по каналу связи</a:t>
+            </a:r>
+            <a:endParaRPr lang="ru-RU" sz="4400" dirty="0"/>
+          </a:p>
+        </p:txBody>
+      </p:sp>
+      <p:sp>
+        <p:nvSpPr>
+          <p:cNvPr id="4" name="TextBox 3"/>
+          <p:cNvSpPr txBox="1"/>
+          <p:nvPr/>
+        </p:nvSpPr>
+        <p:spPr>
+          <a:xfrm>
+            <a:off x="316801" y="1894690"/>
+            <a:ext cx="11899091" cy="4031873"/>
+          </a:xfrm>
+          <a:prstGeom prst="rect">
+            <a:avLst/>
+          </a:prstGeom>
+          <a:noFill/>
+        </p:spPr>
+        <p:txBody>
+          <a:bodyPr wrap="none" rtlCol="0">
+            <a:spAutoFit/>
+          </a:bodyPr>
+          <a:lstStyle/>
+          <a:p>
+            <a:r>
+              <a:rPr lang="ru-RU" sz="3200" dirty="0" smtClean="0"/>
+              <a:t>1. Получить вероятность возникновения ошибки </a:t>
+            </a:r>
+          </a:p>
+          <a:p>
+            <a:r>
+              <a:rPr lang="ru-RU" sz="3200" dirty="0" smtClean="0"/>
+              <a:t>    в имеющемся канале связи.</a:t>
+            </a:r>
+          </a:p>
+          <a:p>
+            <a:r>
+              <a:rPr lang="ru-RU" sz="3200" dirty="0" smtClean="0"/>
+              <a:t>2. Сравнить пропускную способность канала связи и размер </a:t>
+            </a:r>
+          </a:p>
+          <a:p>
+            <a:r>
+              <a:rPr lang="ru-RU" sz="3200" dirty="0" smtClean="0"/>
+              <a:t>    полезной информации, который мы можем передать используя </a:t>
+            </a:r>
+          </a:p>
+          <a:p>
+            <a:r>
+              <a:rPr lang="ru-RU" sz="3200" dirty="0" smtClean="0"/>
+              <a:t>    различные комбинации помехоустойчивых кодеков.</a:t>
+            </a:r>
+          </a:p>
+          <a:p>
+            <a:r>
+              <a:rPr lang="ru-RU" sz="3200" dirty="0" smtClean="0"/>
+              <a:t>3. Исходя из размера полезной информации – выбрать речевой </a:t>
+            </a:r>
+          </a:p>
+          <a:p>
+            <a:r>
+              <a:rPr lang="ru-RU" sz="3200" dirty="0" smtClean="0"/>
+              <a:t>    кодек, удовлетворяющий требованиям по </a:t>
+            </a:r>
+            <a:r>
+              <a:rPr lang="en-US" sz="3200" dirty="0" smtClean="0"/>
+              <a:t>MOS </a:t>
+            </a:r>
+            <a:r>
+              <a:rPr lang="ru-RU" sz="3200" dirty="0" smtClean="0"/>
+              <a:t>или </a:t>
+            </a:r>
+          </a:p>
+          <a:p>
+            <a:r>
+              <a:rPr lang="ru-RU" sz="3200" dirty="0"/>
+              <a:t> </a:t>
+            </a:r>
+            <a:r>
+              <a:rPr lang="ru-RU" sz="3200" dirty="0" smtClean="0"/>
+              <a:t>   скорости работы.</a:t>
+            </a:r>
           </a:p>
         </p:txBody>
       </p:sp>
     </p:spTree>
     <p:extLst>
       <p:ext uri="{BB962C8B-B14F-4D97-AF65-F5344CB8AC3E}">
-        <p14:creationId xmlns:p14="http://schemas.microsoft.com/office/powerpoint/2010/main" val="577009092"/>
+        <p14:creationId xmlns:p14="http://schemas.microsoft.com/office/powerpoint/2010/main" val="1276533517"/>
       </p:ext>
     </p:extLst>
   </p:cSld>
@@ -7039,7 +6314,7 @@
 </p:sld>
 </file>
 
-<file path=ppt/slides/slide17.xml><?xml version="1.0" encoding="utf-8"?>
+<file path=ppt/slides/slide14.xml><?xml version="1.0" encoding="utf-8"?>
 <p:sld xmlns:a="http://schemas.openxmlformats.org/drawingml/2006/main" xmlns:r="http://schemas.openxmlformats.org/officeDocument/2006/relationships" xmlns:p="http://schemas.openxmlformats.org/presentationml/2006/main">
   <p:cSld>
     <p:spTree>
@@ -7058,14 +6333,37 @@
       </p:grpSpPr>
       <p:sp>
         <p:nvSpPr>
-          <p:cNvPr id="2" name="TextBox 1"/>
+          <p:cNvPr id="3" name="Номер слайда 2"/>
+          <p:cNvSpPr>
+            <a:spLocks noGrp="1"/>
+          </p:cNvSpPr>
+          <p:nvPr>
+            <p:ph type="sldNum" sz="quarter" idx="12"/>
+          </p:nvPr>
+        </p:nvSpPr>
+        <p:spPr/>
+        <p:txBody>
+          <a:bodyPr/>
+          <a:lstStyle/>
+          <a:p>
+            <a:fld id="{467DF74C-0500-4CF2-8353-AE1D1480DAD0}" type="slidenum">
+              <a:rPr lang="ru-RU" smtClean="0"/>
+              <a:t>14</a:t>
+            </a:fld>
+            <a:endParaRPr lang="ru-RU"/>
+          </a:p>
+        </p:txBody>
+      </p:sp>
+      <p:sp>
+        <p:nvSpPr>
+          <p:cNvPr id="4" name="TextBox 3"/>
           <p:cNvSpPr txBox="1"/>
           <p:nvPr/>
         </p:nvSpPr>
         <p:spPr>
           <a:xfrm>
-            <a:off x="4262908" y="1622738"/>
-            <a:ext cx="3318537" cy="3170099"/>
+            <a:off x="3863662" y="0"/>
+            <a:ext cx="3707490" cy="1138773"/>
           </a:xfrm>
           <a:prstGeom prst="rect">
             <a:avLst/>
@@ -7079,116 +6377,10 @@
           <a:lstStyle/>
           <a:p>
             <a:r>
-              <a:rPr lang="ru-RU" sz="20000" dirty="0" smtClean="0"/>
-              <a:t>1%</a:t>
-            </a:r>
-            <a:endParaRPr lang="ru-RU" sz="20000" dirty="0"/>
-          </a:p>
-        </p:txBody>
-      </p:sp>
-      <p:sp>
-        <p:nvSpPr>
-          <p:cNvPr id="3" name="Номер слайда 2"/>
-          <p:cNvSpPr>
-            <a:spLocks noGrp="1"/>
-          </p:cNvSpPr>
-          <p:nvPr>
-            <p:ph type="sldNum" sz="quarter" idx="12"/>
-          </p:nvPr>
-        </p:nvSpPr>
-        <p:spPr/>
-        <p:txBody>
-          <a:bodyPr/>
-          <a:lstStyle/>
-          <a:p>
-            <a:fld id="{467DF74C-0500-4CF2-8353-AE1D1480DAD0}" type="slidenum">
-              <a:rPr lang="ru-RU" smtClean="0"/>
-              <a:t>17</a:t>
-            </a:fld>
-            <a:endParaRPr lang="ru-RU"/>
-          </a:p>
-        </p:txBody>
-      </p:sp>
-    </p:spTree>
-    <p:extLst>
-      <p:ext uri="{BB962C8B-B14F-4D97-AF65-F5344CB8AC3E}">
-        <p14:creationId xmlns:p14="http://schemas.microsoft.com/office/powerpoint/2010/main" val="3757759644"/>
-      </p:ext>
-    </p:extLst>
-  </p:cSld>
-  <p:clrMapOvr>
-    <a:masterClrMapping/>
-  </p:clrMapOvr>
-</p:sld>
-</file>
-
-<file path=ppt/slides/slide18.xml><?xml version="1.0" encoding="utf-8"?>
-<p:sld xmlns:a="http://schemas.openxmlformats.org/drawingml/2006/main" xmlns:r="http://schemas.openxmlformats.org/officeDocument/2006/relationships" xmlns:p="http://schemas.openxmlformats.org/presentationml/2006/main">
-  <p:cSld>
-    <p:spTree>
-      <p:nvGrpSpPr>
-        <p:cNvPr id="1" name=""/>
-        <p:cNvGrpSpPr/>
-        <p:nvPr/>
-      </p:nvGrpSpPr>
-      <p:grpSpPr>
-        <a:xfrm>
-          <a:off x="0" y="0"/>
-          <a:ext cx="0" cy="0"/>
-          <a:chOff x="0" y="0"/>
-          <a:chExt cx="0" cy="0"/>
-        </a:xfrm>
-      </p:grpSpPr>
-      <p:sp>
-        <p:nvSpPr>
-          <p:cNvPr id="2" name="TextBox 1"/>
-          <p:cNvSpPr txBox="1"/>
-          <p:nvPr/>
-        </p:nvSpPr>
-        <p:spPr>
-          <a:xfrm>
-            <a:off x="2084438" y="2703871"/>
-            <a:ext cx="8975534" cy="1200329"/>
-          </a:xfrm>
-          <a:prstGeom prst="rect">
-            <a:avLst/>
-          </a:prstGeom>
-          <a:noFill/>
-        </p:spPr>
-        <p:txBody>
-          <a:bodyPr wrap="none" rtlCol="0">
-            <a:spAutoFit/>
-          </a:bodyPr>
-          <a:lstStyle/>
-          <a:p>
-            <a:r>
-              <a:rPr lang="ru-RU" sz="7200" dirty="0" smtClean="0"/>
-              <a:t>Спасибо за внимание!</a:t>
-            </a:r>
-            <a:endParaRPr lang="ru-RU" sz="7200" dirty="0"/>
-          </a:p>
-        </p:txBody>
-      </p:sp>
-      <p:sp>
-        <p:nvSpPr>
-          <p:cNvPr id="3" name="Номер слайда 2"/>
-          <p:cNvSpPr>
-            <a:spLocks noGrp="1"/>
-          </p:cNvSpPr>
-          <p:nvPr>
-            <p:ph type="sldNum" sz="quarter" idx="12"/>
-          </p:nvPr>
-        </p:nvSpPr>
-        <p:spPr/>
-        <p:txBody>
-          <a:bodyPr/>
-          <a:lstStyle/>
-          <a:p>
-            <a:fld id="{467DF74C-0500-4CF2-8353-AE1D1480DAD0}" type="slidenum">
-              <a:rPr lang="ru-RU" smtClean="0"/>
-              <a:t>18</a:t>
-            </a:fld>
-            <a:endParaRPr lang="ru-RU"/>
+              <a:rPr lang="ru-RU" sz="6800" b="1" dirty="0" smtClean="0"/>
+              <a:t>ВЫВОДЫ</a:t>
+            </a:r>
+            <a:endParaRPr lang="ru-RU" sz="6800" b="1" dirty="0"/>
           </a:p>
         </p:txBody>
       </p:sp>
@@ -7279,7 +6471,7 @@
         </p:nvSpPr>
         <p:spPr>
           <a:xfrm>
-            <a:off x="901521" y="2402849"/>
+            <a:off x="901519" y="2516926"/>
             <a:ext cx="10858793" cy="1446550"/>
           </a:xfrm>
           <a:prstGeom prst="rect">
@@ -7307,7 +6499,7 @@
             </a:pPr>
             <a:r>
               <a:rPr lang="ru-RU" sz="4400" dirty="0" smtClean="0"/>
-              <a:t>Канальное кодирование и интерливинг</a:t>
+              <a:t>Помехоустойчивое кодирование</a:t>
             </a:r>
             <a:endParaRPr lang="ru-RU" sz="4400" dirty="0"/>
           </a:p>
@@ -7343,35 +6535,26 @@
       </p:sp>
       <p:pic>
         <p:nvPicPr>
-          <p:cNvPr id="8" name="Рисунок 7"/>
-          <p:cNvPicPr/>
+          <p:cNvPr id="6" name="Рисунок 5"/>
+          <p:cNvPicPr>
+            <a:picLocks noChangeAspect="1"/>
+          </p:cNvPicPr>
           <p:nvPr/>
         </p:nvPicPr>
         <p:blipFill>
-          <a:blip r:embed="rId3">
-            <a:extLst>
-              <a:ext uri="{28A0092B-C50C-407E-A947-70E740481C1C}">
-                <a14:useLocalDpi xmlns:a14="http://schemas.microsoft.com/office/drawing/2010/main" val="0"/>
-              </a:ext>
-            </a:extLst>
-          </a:blip>
-          <a:srcRect/>
+          <a:blip r:embed="rId3"/>
           <a:stretch>
             <a:fillRect/>
           </a:stretch>
         </p:blipFill>
-        <p:spPr bwMode="auto">
+        <p:spPr>
           <a:xfrm>
-            <a:off x="901521" y="4060661"/>
-            <a:ext cx="10347050" cy="2339689"/>
+            <a:off x="528031" y="4077553"/>
+            <a:ext cx="10910899" cy="2426278"/>
           </a:xfrm>
           <a:prstGeom prst="rect">
             <a:avLst/>
           </a:prstGeom>
-          <a:noFill/>
-          <a:ln>
-            <a:noFill/>
-          </a:ln>
         </p:spPr>
       </p:pic>
     </p:spTree>
@@ -7422,7 +6605,7 @@
         </p:nvSpPr>
         <p:spPr>
           <a:xfrm>
-            <a:off x="6953233" y="201903"/>
+            <a:off x="7011681" y="108021"/>
             <a:ext cx="5061786" cy="4527413"/>
           </a:xfrm>
           <a:prstGeom prst="roundRect">
@@ -7467,7 +6650,7 @@
         </p:nvSpPr>
         <p:spPr>
           <a:xfrm>
-            <a:off x="240744" y="201903"/>
+            <a:off x="266502" y="108021"/>
             <a:ext cx="4485164" cy="4527413"/>
           </a:xfrm>
           <a:prstGeom prst="roundRect">
@@ -7512,7 +6695,7 @@
         </p:nvSpPr>
         <p:spPr>
           <a:xfrm>
-            <a:off x="516047" y="295784"/>
+            <a:off x="541805" y="201902"/>
             <a:ext cx="4209861" cy="4278094"/>
           </a:xfrm>
           <a:prstGeom prst="rect">
@@ -7554,7 +6737,7 @@
         </p:nvSpPr>
         <p:spPr>
           <a:xfrm>
-            <a:off x="7346523" y="357340"/>
+            <a:off x="7404971" y="263458"/>
             <a:ext cx="4541756" cy="4278094"/>
           </a:xfrm>
           <a:prstGeom prst="rect">
@@ -7617,7 +6800,7 @@
         </p:nvSpPr>
         <p:spPr>
           <a:xfrm>
-            <a:off x="891422" y="6302477"/>
+            <a:off x="891422" y="5987018"/>
             <a:ext cx="10996857" cy="369332"/>
           </a:xfrm>
           <a:prstGeom prst="rect">
@@ -7655,7 +6838,7 @@
         </p:nvSpPr>
         <p:spPr>
           <a:xfrm>
-            <a:off x="891422" y="5083277"/>
+            <a:off x="891422" y="4854575"/>
             <a:ext cx="10730307" cy="983226"/>
           </a:xfrm>
           <a:prstGeom prst="roundRect">
@@ -7902,7 +7085,7 @@
         </p:nvSpPr>
         <p:spPr>
           <a:xfrm>
-            <a:off x="957782" y="545904"/>
+            <a:off x="1060813" y="-193183"/>
             <a:ext cx="10541860" cy="1138773"/>
           </a:xfrm>
           <a:prstGeom prst="rect">
@@ -7932,8 +7115,8 @@
         </p:nvSpPr>
         <p:spPr>
           <a:xfrm>
-            <a:off x="1669960" y="2150771"/>
-            <a:ext cx="10522040" cy="3170099"/>
+            <a:off x="192705" y="992782"/>
+            <a:ext cx="6439914" cy="4647426"/>
           </a:xfrm>
           <a:prstGeom prst="rect">
             <a:avLst/>
@@ -7947,8 +7130,19 @@
           <a:lstStyle/>
           <a:p>
             <a:r>
-              <a:rPr lang="ru-RU" sz="4000" dirty="0" smtClean="0"/>
-              <a:t>Нам заранее известны не все требования:</a:t>
+              <a:rPr lang="ru-RU" sz="3600" dirty="0" smtClean="0"/>
+              <a:t>Нам заранее известны не </a:t>
+            </a:r>
+            <a:endParaRPr lang="ru-RU" sz="3600" dirty="0" smtClean="0"/>
+          </a:p>
+          <a:p>
+            <a:r>
+              <a:rPr lang="ru-RU" sz="3600" dirty="0" smtClean="0"/>
+              <a:t>все </a:t>
+            </a:r>
+            <a:r>
+              <a:rPr lang="ru-RU" sz="3600" dirty="0" smtClean="0"/>
+              <a:t>требования:</a:t>
             </a:r>
           </a:p>
           <a:p>
@@ -7957,7 +7151,7 @@
               <a:buChar char="•"/>
             </a:pPr>
             <a:r>
-              <a:rPr lang="ru-RU" sz="4000" dirty="0" smtClean="0"/>
+              <a:rPr lang="ru-RU" sz="3600" dirty="0" smtClean="0"/>
               <a:t>скорость передачи данных</a:t>
             </a:r>
           </a:p>
@@ -7967,8 +7161,41 @@
               <a:buChar char="•"/>
             </a:pPr>
             <a:r>
-              <a:rPr lang="ru-RU" sz="4000" dirty="0" smtClean="0"/>
-              <a:t>речевой кодек и его формат представления речевого сигнала</a:t>
+              <a:rPr lang="ru-RU" sz="3600" dirty="0" smtClean="0"/>
+              <a:t>речевой кодек и его </a:t>
+            </a:r>
+            <a:endParaRPr lang="ru-RU" sz="3600" dirty="0" smtClean="0"/>
+          </a:p>
+          <a:p>
+            <a:r>
+              <a:rPr lang="ru-RU" sz="3600" dirty="0"/>
+              <a:t> </a:t>
+            </a:r>
+            <a:r>
+              <a:rPr lang="ru-RU" sz="3600" dirty="0" smtClean="0"/>
+              <a:t>  </a:t>
+            </a:r>
+            <a:r>
+              <a:rPr lang="ru-RU" sz="3600" dirty="0" smtClean="0"/>
+              <a:t>формат представления </a:t>
+            </a:r>
+          </a:p>
+          <a:p>
+            <a:r>
+              <a:rPr lang="ru-RU" sz="3600" dirty="0"/>
+              <a:t> </a:t>
+            </a:r>
+            <a:r>
+              <a:rPr lang="ru-RU" sz="3600" dirty="0" smtClean="0"/>
+              <a:t>  </a:t>
+            </a:r>
+            <a:r>
+              <a:rPr lang="ru-RU" sz="3600" dirty="0" smtClean="0"/>
+              <a:t>речевого </a:t>
+            </a:r>
+            <a:r>
+              <a:rPr lang="ru-RU" sz="3600" dirty="0" smtClean="0"/>
+              <a:t>сигнала</a:t>
             </a:r>
           </a:p>
           <a:p>
@@ -7977,8 +7204,19 @@
               <a:buChar char="•"/>
             </a:pPr>
             <a:r>
-              <a:rPr lang="ru-RU" sz="4000" dirty="0" smtClean="0"/>
-              <a:t>вероятность ошибки в канале связи</a:t>
+              <a:rPr lang="ru-RU" sz="3600" dirty="0" smtClean="0"/>
+              <a:t>вероятность ошибки в </a:t>
+            </a:r>
+            <a:endParaRPr lang="ru-RU" sz="3600" dirty="0" smtClean="0"/>
+          </a:p>
+          <a:p>
+            <a:r>
+              <a:rPr lang="ru-RU" sz="3600" dirty="0" smtClean="0"/>
+              <a:t>   канале </a:t>
+            </a:r>
+            <a:r>
+              <a:rPr lang="ru-RU" sz="3600" dirty="0" smtClean="0"/>
+              <a:t>связи</a:t>
             </a:r>
           </a:p>
         </p:txBody>
@@ -8003,6 +7241,60 @@
               <a:t>5</a:t>
             </a:fld>
             <a:endParaRPr lang="ru-RU"/>
+          </a:p>
+        </p:txBody>
+      </p:sp>
+      <p:pic>
+        <p:nvPicPr>
+          <p:cNvPr id="6" name="Рисунок 5"/>
+          <p:cNvPicPr>
+            <a:picLocks noChangeAspect="1"/>
+          </p:cNvPicPr>
+          <p:nvPr/>
+        </p:nvPicPr>
+        <p:blipFill>
+          <a:blip r:embed="rId3"/>
+          <a:stretch>
+            <a:fillRect/>
+          </a:stretch>
+        </p:blipFill>
+        <p:spPr>
+          <a:xfrm>
+            <a:off x="6383107" y="1281976"/>
+            <a:ext cx="5219566" cy="5576024"/>
+          </a:xfrm>
+          <a:prstGeom prst="rect">
+            <a:avLst/>
+          </a:prstGeom>
+        </p:spPr>
+      </p:pic>
+      <p:sp>
+        <p:nvSpPr>
+          <p:cNvPr id="7" name="TextBox 6"/>
+          <p:cNvSpPr txBox="1"/>
+          <p:nvPr/>
+        </p:nvSpPr>
+        <p:spPr>
+          <a:xfrm>
+            <a:off x="6444574" y="992782"/>
+            <a:ext cx="3595664" cy="523220"/>
+          </a:xfrm>
+          <a:prstGeom prst="rect">
+            <a:avLst/>
+          </a:prstGeom>
+          <a:noFill/>
+        </p:spPr>
+        <p:txBody>
+          <a:bodyPr wrap="none" rtlCol="0">
+            <a:spAutoFit/>
+          </a:bodyPr>
+          <a:lstStyle/>
+          <a:p>
+            <a:r>
+              <a:rPr lang="ru-RU" sz="2800" b="1" dirty="0" smtClean="0"/>
+              <a:t>ПРОТОТИПИРОВАНИЕ</a:t>
+            </a:r>
+            <a:endParaRPr lang="ru-RU" sz="2800" b="1" dirty="0"/>
           </a:p>
         </p:txBody>
       </p:sp>
@@ -8036,40 +7328,16 @@
           <a:chExt cx="0" cy="0"/>
         </a:xfrm>
       </p:grpSpPr>
-      <p:pic>
-        <p:nvPicPr>
-          <p:cNvPr id="3" name="Рисунок 2"/>
-          <p:cNvPicPr>
-            <a:picLocks noChangeAspect="1"/>
-          </p:cNvPicPr>
+      <p:sp>
+        <p:nvSpPr>
+          <p:cNvPr id="2" name="TextBox 1"/>
+          <p:cNvSpPr txBox="1"/>
           <p:nvPr/>
-        </p:nvPicPr>
-        <p:blipFill>
-          <a:blip r:embed="rId3"/>
-          <a:stretch>
-            <a:fillRect/>
-          </a:stretch>
-        </p:blipFill>
+        </p:nvSpPr>
         <p:spPr>
           <a:xfrm>
-            <a:off x="902594" y="1114425"/>
-            <a:ext cx="10515600" cy="5743575"/>
-          </a:xfrm>
-          <a:prstGeom prst="rect">
-            <a:avLst/>
-          </a:prstGeom>
-        </p:spPr>
-      </p:pic>
-      <p:sp>
-        <p:nvSpPr>
-          <p:cNvPr id="4" name="TextBox 3"/>
-          <p:cNvSpPr txBox="1"/>
-          <p:nvPr/>
-        </p:nvSpPr>
-        <p:spPr>
-          <a:xfrm>
-            <a:off x="2395470" y="6429"/>
-            <a:ext cx="8231421" cy="1107996"/>
+            <a:off x="1283040" y="-170661"/>
+            <a:ext cx="10414518" cy="1877437"/>
           </a:xfrm>
           <a:prstGeom prst="rect">
             <a:avLst/>
@@ -8083,16 +7351,629 @@
           <a:lstStyle/>
           <a:p>
             <a:r>
-              <a:rPr lang="ru-RU" sz="6600" b="1" dirty="0" smtClean="0"/>
-              <a:t>ПРОТОТИПИРОВАНИЕ</a:t>
-            </a:r>
-            <a:endParaRPr lang="ru-RU" sz="6600" b="1" dirty="0"/>
-          </a:p>
-        </p:txBody>
-      </p:sp>
-      <p:sp>
-        <p:nvSpPr>
-          <p:cNvPr id="2" name="Номер слайда 1"/>
+              <a:rPr lang="ru-RU" sz="6800" dirty="0" smtClean="0"/>
+              <a:t>Проектирование</a:t>
+            </a:r>
+            <a:r>
+              <a:rPr lang="ru-RU" sz="6600" dirty="0" smtClean="0"/>
+              <a:t> библиотек</a:t>
+            </a:r>
+          </a:p>
+          <a:p>
+            <a:pPr algn="ctr"/>
+            <a:r>
+              <a:rPr lang="ru-RU" sz="4800" dirty="0" smtClean="0"/>
+              <a:t>РЕЧЕВОЙ СИГНАЛ</a:t>
+            </a:r>
+            <a:endParaRPr lang="ru-RU" sz="4800" dirty="0"/>
+          </a:p>
+        </p:txBody>
+      </p:sp>
+      <p:sp>
+        <p:nvSpPr>
+          <p:cNvPr id="4" name="TextBox 3"/>
+          <p:cNvSpPr txBox="1"/>
+          <p:nvPr/>
+        </p:nvSpPr>
+        <p:spPr>
+          <a:xfrm>
+            <a:off x="400737" y="1669106"/>
+            <a:ext cx="12488215" cy="5047536"/>
+          </a:xfrm>
+          <a:prstGeom prst="rect">
+            <a:avLst/>
+          </a:prstGeom>
+          <a:noFill/>
+        </p:spPr>
+        <p:txBody>
+          <a:bodyPr wrap="square" rtlCol="0">
+            <a:spAutoFit/>
+          </a:bodyPr>
+          <a:lstStyle/>
+          <a:p>
+            <a:r>
+              <a:rPr lang="en-US" sz="2300" dirty="0" err="1">
+                <a:solidFill>
+                  <a:srgbClr val="0070C0"/>
+                </a:solidFill>
+                <a:latin typeface="Courier New" panose="02070309020205020404" pitchFamily="49" charset="0"/>
+                <a:cs typeface="Courier New" panose="02070309020205020404" pitchFamily="49" charset="0"/>
+              </a:rPr>
+              <a:t>typedef</a:t>
+            </a:r>
+            <a:r>
+              <a:rPr lang="en-US" sz="2300" dirty="0">
+                <a:solidFill>
+                  <a:srgbClr val="0070C0"/>
+                </a:solidFill>
+                <a:latin typeface="Courier New" panose="02070309020205020404" pitchFamily="49" charset="0"/>
+                <a:cs typeface="Courier New" panose="02070309020205020404" pitchFamily="49" charset="0"/>
+              </a:rPr>
+              <a:t> </a:t>
+            </a:r>
+            <a:r>
+              <a:rPr lang="en-US" sz="2300" dirty="0" err="1">
+                <a:solidFill>
+                  <a:srgbClr val="0070C0"/>
+                </a:solidFill>
+                <a:latin typeface="Courier New" panose="02070309020205020404" pitchFamily="49" charset="0"/>
+                <a:cs typeface="Courier New" panose="02070309020205020404" pitchFamily="49" charset="0"/>
+              </a:rPr>
+              <a:t>struct</a:t>
+            </a:r>
+            <a:endParaRPr lang="en-US" sz="2300" dirty="0">
+              <a:solidFill>
+                <a:srgbClr val="0070C0"/>
+              </a:solidFill>
+              <a:latin typeface="Courier New" panose="02070309020205020404" pitchFamily="49" charset="0"/>
+              <a:cs typeface="Courier New" panose="02070309020205020404" pitchFamily="49" charset="0"/>
+            </a:endParaRPr>
+          </a:p>
+          <a:p>
+            <a:r>
+              <a:rPr lang="ru-RU" sz="2300" dirty="0">
+                <a:latin typeface="Courier New" panose="02070309020205020404" pitchFamily="49" charset="0"/>
+                <a:cs typeface="Courier New" panose="02070309020205020404" pitchFamily="49" charset="0"/>
+              </a:rPr>
+              <a:t>{</a:t>
+            </a:r>
+          </a:p>
+          <a:p>
+            <a:r>
+              <a:rPr lang="en-US" sz="2300" dirty="0">
+                <a:solidFill>
+                  <a:srgbClr val="0070C0"/>
+                </a:solidFill>
+                <a:latin typeface="Courier New" panose="02070309020205020404" pitchFamily="49" charset="0"/>
+                <a:cs typeface="Courier New" panose="02070309020205020404" pitchFamily="49" charset="0"/>
+              </a:rPr>
+              <a:t>short </a:t>
+            </a:r>
+            <a:r>
+              <a:rPr lang="en-US" sz="2300" dirty="0" err="1">
+                <a:solidFill>
+                  <a:srgbClr val="0070C0"/>
+                </a:solidFill>
+                <a:latin typeface="Courier New" panose="02070309020205020404" pitchFamily="49" charset="0"/>
+                <a:cs typeface="Courier New" panose="02070309020205020404" pitchFamily="49" charset="0"/>
+              </a:rPr>
+              <a:t>int</a:t>
+            </a:r>
+            <a:r>
+              <a:rPr lang="en-US" sz="2300" dirty="0">
+                <a:solidFill>
+                  <a:srgbClr val="0070C0"/>
+                </a:solidFill>
+                <a:latin typeface="Courier New" panose="02070309020205020404" pitchFamily="49" charset="0"/>
+                <a:cs typeface="Courier New" panose="02070309020205020404" pitchFamily="49" charset="0"/>
+              </a:rPr>
+              <a:t> </a:t>
+            </a:r>
+            <a:r>
+              <a:rPr lang="en-US" sz="2300" dirty="0" err="1">
+                <a:latin typeface="Courier New" panose="02070309020205020404" pitchFamily="49" charset="0"/>
+                <a:cs typeface="Courier New" panose="02070309020205020404" pitchFamily="49" charset="0"/>
+              </a:rPr>
+              <a:t>phoneme_number</a:t>
+            </a:r>
+            <a:r>
+              <a:rPr lang="en-US" sz="2300" dirty="0">
+                <a:latin typeface="Courier New" panose="02070309020205020404" pitchFamily="49" charset="0"/>
+                <a:cs typeface="Courier New" panose="02070309020205020404" pitchFamily="49" charset="0"/>
+              </a:rPr>
+              <a:t>; </a:t>
+            </a:r>
+            <a:r>
+              <a:rPr lang="ru-RU" sz="2300" dirty="0" smtClean="0">
+                <a:latin typeface="Courier New" panose="02070309020205020404" pitchFamily="49" charset="0"/>
+                <a:cs typeface="Courier New" panose="02070309020205020404" pitchFamily="49" charset="0"/>
+              </a:rPr>
+              <a:t>   </a:t>
+            </a:r>
+            <a:r>
+              <a:rPr lang="en-US" sz="2300" dirty="0" smtClean="0">
+                <a:latin typeface="Courier New" panose="02070309020205020404" pitchFamily="49" charset="0"/>
+                <a:cs typeface="Courier New" panose="02070309020205020404" pitchFamily="49" charset="0"/>
+              </a:rPr>
+              <a:t>//</a:t>
+            </a:r>
+            <a:r>
+              <a:rPr lang="en-US" sz="2300" b="1" dirty="0" err="1">
+                <a:latin typeface="Courier New" panose="02070309020205020404" pitchFamily="49" charset="0"/>
+                <a:cs typeface="Courier New" panose="02070309020205020404" pitchFamily="49" charset="0"/>
+              </a:rPr>
+              <a:t>Номер</a:t>
+            </a:r>
+            <a:r>
+              <a:rPr lang="en-US" sz="2300" b="1" dirty="0">
+                <a:latin typeface="Courier New" panose="02070309020205020404" pitchFamily="49" charset="0"/>
+                <a:cs typeface="Courier New" panose="02070309020205020404" pitchFamily="49" charset="0"/>
+              </a:rPr>
+              <a:t> </a:t>
+            </a:r>
+            <a:r>
+              <a:rPr lang="en-US" sz="2300" b="1" dirty="0" err="1" smtClean="0">
+                <a:latin typeface="Courier New" panose="02070309020205020404" pitchFamily="49" charset="0"/>
+                <a:cs typeface="Courier New" panose="02070309020205020404" pitchFamily="49" charset="0"/>
+              </a:rPr>
+              <a:t>фонемы</a:t>
+            </a:r>
+            <a:endParaRPr lang="en-US" sz="2300" b="1" dirty="0">
+              <a:latin typeface="Courier New" panose="02070309020205020404" pitchFamily="49" charset="0"/>
+              <a:cs typeface="Courier New" panose="02070309020205020404" pitchFamily="49" charset="0"/>
+            </a:endParaRPr>
+          </a:p>
+          <a:p>
+            <a:r>
+              <a:rPr lang="ru-RU" sz="2300" dirty="0" err="1">
+                <a:solidFill>
+                  <a:srgbClr val="0070C0"/>
+                </a:solidFill>
+                <a:latin typeface="Courier New" panose="02070309020205020404" pitchFamily="49" charset="0"/>
+                <a:cs typeface="Courier New" panose="02070309020205020404" pitchFamily="49" charset="0"/>
+              </a:rPr>
+              <a:t>int</a:t>
+            </a:r>
+            <a:r>
+              <a:rPr lang="ru-RU" sz="2300" dirty="0">
+                <a:solidFill>
+                  <a:srgbClr val="0070C0"/>
+                </a:solidFill>
+                <a:latin typeface="Courier New" panose="02070309020205020404" pitchFamily="49" charset="0"/>
+                <a:cs typeface="Courier New" panose="02070309020205020404" pitchFamily="49" charset="0"/>
+              </a:rPr>
+              <a:t> </a:t>
+            </a:r>
+            <a:r>
+              <a:rPr lang="ru-RU" sz="2300" dirty="0" err="1">
+                <a:latin typeface="Courier New" panose="02070309020205020404" pitchFamily="49" charset="0"/>
+                <a:cs typeface="Courier New" panose="02070309020205020404" pitchFamily="49" charset="0"/>
+              </a:rPr>
+              <a:t>shortTerm_energy</a:t>
+            </a:r>
+            <a:r>
+              <a:rPr lang="ru-RU" sz="2300" dirty="0">
+                <a:latin typeface="Courier New" panose="02070309020205020404" pitchFamily="49" charset="0"/>
+                <a:cs typeface="Courier New" panose="02070309020205020404" pitchFamily="49" charset="0"/>
+              </a:rPr>
+              <a:t>, </a:t>
+            </a:r>
+            <a:r>
+              <a:rPr lang="ru-RU" sz="2300" dirty="0" smtClean="0">
+                <a:latin typeface="Courier New" panose="02070309020205020404" pitchFamily="49" charset="0"/>
+                <a:cs typeface="Courier New" panose="02070309020205020404" pitchFamily="49" charset="0"/>
+              </a:rPr>
+              <a:t>       //</a:t>
+            </a:r>
+            <a:r>
+              <a:rPr lang="ru-RU" sz="2300" b="1" dirty="0">
+                <a:latin typeface="Courier New" panose="02070309020205020404" pitchFamily="49" charset="0"/>
+                <a:cs typeface="Courier New" panose="02070309020205020404" pitchFamily="49" charset="0"/>
+              </a:rPr>
+              <a:t>Кратковременная энергия речевого </a:t>
+            </a:r>
+            <a:r>
+              <a:rPr lang="ru-RU" sz="2300" b="1" dirty="0" smtClean="0">
+                <a:latin typeface="Courier New" panose="02070309020205020404" pitchFamily="49" charset="0"/>
+                <a:cs typeface="Courier New" panose="02070309020205020404" pitchFamily="49" charset="0"/>
+              </a:rPr>
+              <a:t>						   </a:t>
+            </a:r>
+            <a:r>
+              <a:rPr lang="ru-RU" sz="2300" dirty="0" smtClean="0">
+                <a:latin typeface="Courier New" panose="02070309020205020404" pitchFamily="49" charset="0"/>
+                <a:cs typeface="Courier New" panose="02070309020205020404" pitchFamily="49" charset="0"/>
+              </a:rPr>
+              <a:t>//</a:t>
+            </a:r>
+            <a:r>
+              <a:rPr lang="ru-RU" sz="2300" b="1" dirty="0" smtClean="0">
+                <a:latin typeface="Courier New" panose="02070309020205020404" pitchFamily="49" charset="0"/>
+                <a:cs typeface="Courier New" panose="02070309020205020404" pitchFamily="49" charset="0"/>
+              </a:rPr>
+              <a:t>сигнала</a:t>
+            </a:r>
+            <a:endParaRPr lang="ru-RU" sz="2300" dirty="0">
+              <a:latin typeface="Courier New" panose="02070309020205020404" pitchFamily="49" charset="0"/>
+              <a:cs typeface="Courier New" panose="02070309020205020404" pitchFamily="49" charset="0"/>
+            </a:endParaRPr>
+          </a:p>
+          <a:p>
+            <a:r>
+              <a:rPr lang="ru-RU" sz="2300" dirty="0">
+                <a:latin typeface="Courier New" panose="02070309020205020404" pitchFamily="49" charset="0"/>
+                <a:cs typeface="Courier New" panose="02070309020205020404" pitchFamily="49" charset="0"/>
+              </a:rPr>
+              <a:t> </a:t>
+            </a:r>
+            <a:r>
+              <a:rPr lang="ru-RU" sz="2300" dirty="0" smtClean="0">
+                <a:latin typeface="Courier New" panose="02070309020205020404" pitchFamily="49" charset="0"/>
+                <a:cs typeface="Courier New" panose="02070309020205020404" pitchFamily="49" charset="0"/>
+              </a:rPr>
+              <a:t>   </a:t>
+            </a:r>
+            <a:r>
+              <a:rPr lang="ru-RU" sz="2300" dirty="0" err="1" smtClean="0">
+                <a:latin typeface="Courier New" panose="02070309020205020404" pitchFamily="49" charset="0"/>
+                <a:cs typeface="Courier New" panose="02070309020205020404" pitchFamily="49" charset="0"/>
+              </a:rPr>
+              <a:t>instant_frequency</a:t>
+            </a:r>
+            <a:r>
+              <a:rPr lang="ru-RU" sz="2300" dirty="0">
+                <a:latin typeface="Courier New" panose="02070309020205020404" pitchFamily="49" charset="0"/>
+                <a:cs typeface="Courier New" panose="02070309020205020404" pitchFamily="49" charset="0"/>
+              </a:rPr>
+              <a:t>, </a:t>
+            </a:r>
+            <a:r>
+              <a:rPr lang="ru-RU" sz="2300" dirty="0" smtClean="0">
+                <a:latin typeface="Courier New" panose="02070309020205020404" pitchFamily="49" charset="0"/>
+                <a:cs typeface="Courier New" panose="02070309020205020404" pitchFamily="49" charset="0"/>
+              </a:rPr>
+              <a:t>      //</a:t>
+            </a:r>
+            <a:r>
+              <a:rPr lang="ru-RU" sz="2300" b="1" dirty="0">
+                <a:latin typeface="Courier New" panose="02070309020205020404" pitchFamily="49" charset="0"/>
+                <a:cs typeface="Courier New" panose="02070309020205020404" pitchFamily="49" charset="0"/>
+              </a:rPr>
+              <a:t>Мгновенная </a:t>
+            </a:r>
+            <a:r>
+              <a:rPr lang="ru-RU" sz="2300" b="1" dirty="0" smtClean="0">
+                <a:latin typeface="Courier New" panose="02070309020205020404" pitchFamily="49" charset="0"/>
+                <a:cs typeface="Courier New" panose="02070309020205020404" pitchFamily="49" charset="0"/>
+              </a:rPr>
+              <a:t>частота(число </a:t>
+            </a:r>
+            <a:r>
+              <a:rPr lang="ru-RU" sz="2300" b="1" dirty="0">
+                <a:latin typeface="Courier New" panose="02070309020205020404" pitchFamily="49" charset="0"/>
+                <a:cs typeface="Courier New" panose="02070309020205020404" pitchFamily="49" charset="0"/>
+              </a:rPr>
+              <a:t>нулей </a:t>
+            </a:r>
+            <a:r>
+              <a:rPr lang="ru-RU" sz="2300" b="1" dirty="0" smtClean="0">
+                <a:latin typeface="Courier New" panose="02070309020205020404" pitchFamily="49" charset="0"/>
+                <a:cs typeface="Courier New" panose="02070309020205020404" pitchFamily="49" charset="0"/>
+              </a:rPr>
+              <a:t>                  				        </a:t>
+            </a:r>
+            <a:r>
+              <a:rPr lang="ru-RU" sz="2300" dirty="0" smtClean="0">
+                <a:latin typeface="Courier New" panose="02070309020205020404" pitchFamily="49" charset="0"/>
+                <a:cs typeface="Courier New" panose="02070309020205020404" pitchFamily="49" charset="0"/>
+              </a:rPr>
+              <a:t>//</a:t>
+            </a:r>
+            <a:r>
+              <a:rPr lang="ru-RU" sz="2300" b="1" dirty="0" err="1" smtClean="0">
+                <a:latin typeface="Courier New" panose="02070309020205020404" pitchFamily="49" charset="0"/>
+                <a:cs typeface="Courier New" panose="02070309020205020404" pitchFamily="49" charset="0"/>
+              </a:rPr>
+              <a:t>интеснивности</a:t>
+            </a:r>
+            <a:r>
+              <a:rPr lang="ru-RU" sz="2300" b="1" dirty="0" smtClean="0">
+                <a:latin typeface="Courier New" panose="02070309020205020404" pitchFamily="49" charset="0"/>
+                <a:cs typeface="Courier New" panose="02070309020205020404" pitchFamily="49" charset="0"/>
+              </a:rPr>
+              <a:t>)</a:t>
+            </a:r>
+            <a:endParaRPr lang="ru-RU" sz="2300" dirty="0">
+              <a:latin typeface="Courier New" panose="02070309020205020404" pitchFamily="49" charset="0"/>
+              <a:cs typeface="Courier New" panose="02070309020205020404" pitchFamily="49" charset="0"/>
+            </a:endParaRPr>
+          </a:p>
+          <a:p>
+            <a:r>
+              <a:rPr lang="ru-RU" sz="2300" dirty="0" smtClean="0">
+                <a:latin typeface="Courier New" panose="02070309020205020404" pitchFamily="49" charset="0"/>
+                <a:cs typeface="Courier New" panose="02070309020205020404" pitchFamily="49" charset="0"/>
+              </a:rPr>
+              <a:t>    </a:t>
+            </a:r>
+            <a:r>
+              <a:rPr lang="ru-RU" sz="2300" dirty="0" err="1" smtClean="0">
+                <a:latin typeface="Courier New" panose="02070309020205020404" pitchFamily="49" charset="0"/>
+                <a:cs typeface="Courier New" panose="02070309020205020404" pitchFamily="49" charset="0"/>
+              </a:rPr>
+              <a:t>formanta</a:t>
+            </a:r>
+            <a:r>
+              <a:rPr lang="ru-RU" sz="2300" dirty="0">
+                <a:latin typeface="Courier New" panose="02070309020205020404" pitchFamily="49" charset="0"/>
+                <a:cs typeface="Courier New" panose="02070309020205020404" pitchFamily="49" charset="0"/>
+              </a:rPr>
+              <a:t>, </a:t>
+            </a:r>
+            <a:r>
+              <a:rPr lang="ru-RU" sz="2300" dirty="0" smtClean="0">
+                <a:latin typeface="Courier New" panose="02070309020205020404" pitchFamily="49" charset="0"/>
+                <a:cs typeface="Courier New" panose="02070309020205020404" pitchFamily="49" charset="0"/>
+              </a:rPr>
+              <a:t>               //</a:t>
+            </a:r>
+            <a:r>
+              <a:rPr lang="ru-RU" sz="2300" b="1" dirty="0" smtClean="0">
+                <a:latin typeface="Courier New" panose="02070309020205020404" pitchFamily="49" charset="0"/>
+                <a:cs typeface="Courier New" panose="02070309020205020404" pitchFamily="49" charset="0"/>
+              </a:rPr>
+              <a:t>Форманта </a:t>
+            </a:r>
+            <a:r>
+              <a:rPr lang="ru-RU" sz="2300" b="1" dirty="0">
+                <a:latin typeface="Courier New" panose="02070309020205020404" pitchFamily="49" charset="0"/>
+                <a:cs typeface="Courier New" panose="02070309020205020404" pitchFamily="49" charset="0"/>
+              </a:rPr>
+              <a:t>(концентрация энергии в </a:t>
+            </a:r>
+            <a:r>
+              <a:rPr lang="ru-RU" sz="2300" b="1" dirty="0" smtClean="0">
+                <a:latin typeface="Courier New" panose="02070309020205020404" pitchFamily="49" charset="0"/>
+                <a:cs typeface="Courier New" panose="02070309020205020404" pitchFamily="49" charset="0"/>
+              </a:rPr>
+              <a:t>						   </a:t>
+            </a:r>
+            <a:r>
+              <a:rPr lang="ru-RU" sz="2300" dirty="0" smtClean="0">
+                <a:latin typeface="Courier New" panose="02070309020205020404" pitchFamily="49" charset="0"/>
+                <a:cs typeface="Courier New" panose="02070309020205020404" pitchFamily="49" charset="0"/>
+              </a:rPr>
+              <a:t>//</a:t>
+            </a:r>
+            <a:r>
+              <a:rPr lang="ru-RU" sz="2300" b="1" dirty="0" smtClean="0">
+                <a:latin typeface="Courier New" panose="02070309020205020404" pitchFamily="49" charset="0"/>
+                <a:cs typeface="Courier New" panose="02070309020205020404" pitchFamily="49" charset="0"/>
+              </a:rPr>
+              <a:t>ограниченной частотной </a:t>
+            </a:r>
+            <a:r>
+              <a:rPr lang="ru-RU" sz="2300" b="1" dirty="0">
+                <a:latin typeface="Courier New" panose="02070309020205020404" pitchFamily="49" charset="0"/>
+                <a:cs typeface="Courier New" panose="02070309020205020404" pitchFamily="49" charset="0"/>
+              </a:rPr>
+              <a:t>области</a:t>
+            </a:r>
+            <a:r>
+              <a:rPr lang="ru-RU" sz="2300" b="1" dirty="0" smtClean="0">
+                <a:latin typeface="Courier New" panose="02070309020205020404" pitchFamily="49" charset="0"/>
+                <a:cs typeface="Courier New" panose="02070309020205020404" pitchFamily="49" charset="0"/>
+              </a:rPr>
+              <a:t>)</a:t>
+            </a:r>
+            <a:endParaRPr lang="ru-RU" sz="2300" b="1" dirty="0">
+              <a:latin typeface="Courier New" panose="02070309020205020404" pitchFamily="49" charset="0"/>
+              <a:cs typeface="Courier New" panose="02070309020205020404" pitchFamily="49" charset="0"/>
+            </a:endParaRPr>
+          </a:p>
+          <a:p>
+            <a:r>
+              <a:rPr lang="ru-RU" sz="2300" dirty="0">
+                <a:latin typeface="Courier New" panose="02070309020205020404" pitchFamily="49" charset="0"/>
+                <a:cs typeface="Courier New" panose="02070309020205020404" pitchFamily="49" charset="0"/>
+              </a:rPr>
+              <a:t> </a:t>
+            </a:r>
+            <a:r>
+              <a:rPr lang="ru-RU" sz="2300" dirty="0" smtClean="0">
+                <a:latin typeface="Courier New" panose="02070309020205020404" pitchFamily="49" charset="0"/>
+                <a:cs typeface="Courier New" panose="02070309020205020404" pitchFamily="49" charset="0"/>
+              </a:rPr>
+              <a:t>   </a:t>
+            </a:r>
+            <a:r>
+              <a:rPr lang="en-US" sz="2300" dirty="0" err="1" smtClean="0">
+                <a:latin typeface="Courier New" panose="02070309020205020404" pitchFamily="49" charset="0"/>
+                <a:cs typeface="Courier New" panose="02070309020205020404" pitchFamily="49" charset="0"/>
+              </a:rPr>
+              <a:t>LP_coefficients</a:t>
+            </a:r>
+            <a:r>
+              <a:rPr lang="en-US" sz="2300" dirty="0" smtClean="0">
+                <a:latin typeface="Courier New" panose="02070309020205020404" pitchFamily="49" charset="0"/>
+                <a:cs typeface="Courier New" panose="02070309020205020404" pitchFamily="49" charset="0"/>
+              </a:rPr>
+              <a:t>[7</a:t>
+            </a:r>
+            <a:r>
+              <a:rPr lang="en-US" sz="2300" dirty="0">
+                <a:latin typeface="Courier New" panose="02070309020205020404" pitchFamily="49" charset="0"/>
+                <a:cs typeface="Courier New" panose="02070309020205020404" pitchFamily="49" charset="0"/>
+              </a:rPr>
+              <a:t>], </a:t>
+            </a:r>
+            <a:r>
+              <a:rPr lang="ru-RU" sz="2300" dirty="0" smtClean="0">
+                <a:latin typeface="Courier New" panose="02070309020205020404" pitchFamily="49" charset="0"/>
+                <a:cs typeface="Courier New" panose="02070309020205020404" pitchFamily="49" charset="0"/>
+              </a:rPr>
+              <a:t>     </a:t>
+            </a:r>
+            <a:r>
+              <a:rPr lang="en-US" sz="2300" dirty="0" smtClean="0">
+                <a:latin typeface="Courier New" panose="02070309020205020404" pitchFamily="49" charset="0"/>
+                <a:cs typeface="Courier New" panose="02070309020205020404" pitchFamily="49" charset="0"/>
+              </a:rPr>
+              <a:t>//</a:t>
+            </a:r>
+            <a:r>
+              <a:rPr lang="ru-RU" sz="2300" b="1" dirty="0">
+                <a:latin typeface="Courier New" panose="02070309020205020404" pitchFamily="49" charset="0"/>
+                <a:cs typeface="Courier New" panose="02070309020205020404" pitchFamily="49" charset="0"/>
+              </a:rPr>
+              <a:t>Коэффициенты линейного предсказания</a:t>
+            </a:r>
+          </a:p>
+          <a:p>
+            <a:r>
+              <a:rPr lang="ru-RU" sz="2300" dirty="0" smtClean="0">
+                <a:latin typeface="Courier New" panose="02070309020205020404" pitchFamily="49" charset="0"/>
+                <a:cs typeface="Courier New" panose="02070309020205020404" pitchFamily="49" charset="0"/>
+              </a:rPr>
+              <a:t>    </a:t>
+            </a:r>
+            <a:r>
+              <a:rPr lang="ru-RU" sz="2300" dirty="0" err="1" smtClean="0">
+                <a:latin typeface="Courier New" panose="02070309020205020404" pitchFamily="49" charset="0"/>
+                <a:cs typeface="Courier New" panose="02070309020205020404" pitchFamily="49" charset="0"/>
+              </a:rPr>
+              <a:t>energy_distribution</a:t>
+            </a:r>
+            <a:r>
+              <a:rPr lang="ru-RU" sz="2300" dirty="0" smtClean="0">
+                <a:latin typeface="Courier New" panose="02070309020205020404" pitchFamily="49" charset="0"/>
+                <a:cs typeface="Courier New" panose="02070309020205020404" pitchFamily="49" charset="0"/>
+              </a:rPr>
+              <a:t>[30], //</a:t>
+            </a:r>
+            <a:r>
+              <a:rPr lang="ru-RU" sz="2300" b="1" dirty="0">
+                <a:latin typeface="Courier New" panose="02070309020205020404" pitchFamily="49" charset="0"/>
+                <a:cs typeface="Courier New" panose="02070309020205020404" pitchFamily="49" charset="0"/>
+              </a:rPr>
+              <a:t>Распределение энергии сигнала по </a:t>
+            </a:r>
+            <a:r>
+              <a:rPr lang="ru-RU" sz="2300" b="1" dirty="0" smtClean="0">
+                <a:latin typeface="Courier New" panose="02070309020205020404" pitchFamily="49" charset="0"/>
+                <a:cs typeface="Courier New" panose="02070309020205020404" pitchFamily="49" charset="0"/>
+              </a:rPr>
+              <a:t>						   </a:t>
+            </a:r>
+            <a:r>
+              <a:rPr lang="ru-RU" sz="2300" dirty="0" smtClean="0">
+                <a:latin typeface="Courier New" panose="02070309020205020404" pitchFamily="49" charset="0"/>
+                <a:cs typeface="Courier New" panose="02070309020205020404" pitchFamily="49" charset="0"/>
+              </a:rPr>
+              <a:t>//</a:t>
+            </a:r>
+            <a:r>
+              <a:rPr lang="ru-RU" sz="2300" b="1" dirty="0" smtClean="0">
+                <a:latin typeface="Courier New" panose="02070309020205020404" pitchFamily="49" charset="0"/>
+                <a:cs typeface="Courier New" panose="02070309020205020404" pitchFamily="49" charset="0"/>
+              </a:rPr>
+              <a:t>частотным группам</a:t>
+            </a:r>
+            <a:endParaRPr lang="ru-RU" sz="2300" b="1" dirty="0">
+              <a:latin typeface="Courier New" panose="02070309020205020404" pitchFamily="49" charset="0"/>
+              <a:cs typeface="Courier New" panose="02070309020205020404" pitchFamily="49" charset="0"/>
+            </a:endParaRPr>
+          </a:p>
+          <a:p>
+            <a:r>
+              <a:rPr lang="ru-RU" sz="2300" dirty="0" smtClean="0">
+                <a:latin typeface="Courier New" panose="02070309020205020404" pitchFamily="49" charset="0"/>
+                <a:cs typeface="Courier New" panose="02070309020205020404" pitchFamily="49" charset="0"/>
+              </a:rPr>
+              <a:t>    </a:t>
+            </a:r>
+            <a:r>
+              <a:rPr lang="en-US" sz="2300" dirty="0" err="1" smtClean="0">
+                <a:latin typeface="Courier New" panose="02070309020205020404" pitchFamily="49" charset="0"/>
+                <a:cs typeface="Courier New" panose="02070309020205020404" pitchFamily="49" charset="0"/>
+              </a:rPr>
+              <a:t>pause_duration</a:t>
+            </a:r>
+            <a:r>
+              <a:rPr lang="en-US" sz="2300" dirty="0">
+                <a:latin typeface="Courier New" panose="02070309020205020404" pitchFamily="49" charset="0"/>
+                <a:cs typeface="Courier New" panose="02070309020205020404" pitchFamily="49" charset="0"/>
+              </a:rPr>
+              <a:t>; </a:t>
+            </a:r>
+            <a:r>
+              <a:rPr lang="ru-RU" sz="2300" dirty="0" smtClean="0">
+                <a:latin typeface="Courier New" panose="02070309020205020404" pitchFamily="49" charset="0"/>
+                <a:cs typeface="Courier New" panose="02070309020205020404" pitchFamily="49" charset="0"/>
+              </a:rPr>
+              <a:t>         </a:t>
+            </a:r>
+            <a:r>
+              <a:rPr lang="en-US" sz="2300" dirty="0" smtClean="0">
+                <a:latin typeface="Courier New" panose="02070309020205020404" pitchFamily="49" charset="0"/>
+                <a:cs typeface="Courier New" panose="02070309020205020404" pitchFamily="49" charset="0"/>
+              </a:rPr>
+              <a:t>//</a:t>
+            </a:r>
+            <a:r>
+              <a:rPr lang="ru-RU" sz="2300" b="1" dirty="0">
+                <a:latin typeface="Courier New" panose="02070309020205020404" pitchFamily="49" charset="0"/>
+                <a:cs typeface="Courier New" panose="02070309020205020404" pitchFamily="49" charset="0"/>
+              </a:rPr>
+              <a:t>Длительность </a:t>
+            </a:r>
+            <a:r>
+              <a:rPr lang="ru-RU" sz="2300" b="1" dirty="0" smtClean="0">
+                <a:latin typeface="Courier New" panose="02070309020205020404" pitchFamily="49" charset="0"/>
+                <a:cs typeface="Courier New" panose="02070309020205020404" pitchFamily="49" charset="0"/>
+              </a:rPr>
+              <a:t>пауз</a:t>
+            </a:r>
+            <a:endParaRPr lang="ru-RU" sz="2300" dirty="0">
+              <a:latin typeface="Courier New" panose="02070309020205020404" pitchFamily="49" charset="0"/>
+              <a:cs typeface="Courier New" panose="02070309020205020404" pitchFamily="49" charset="0"/>
+            </a:endParaRPr>
+          </a:p>
+          <a:p>
+            <a:r>
+              <a:rPr lang="en-US" sz="2300" dirty="0">
+                <a:latin typeface="Courier New" panose="02070309020205020404" pitchFamily="49" charset="0"/>
+                <a:cs typeface="Courier New" panose="02070309020205020404" pitchFamily="49" charset="0"/>
+              </a:rPr>
+              <a:t>} </a:t>
+            </a:r>
+            <a:r>
+              <a:rPr lang="en-US" sz="2300" b="1" dirty="0" err="1">
+                <a:solidFill>
+                  <a:srgbClr val="00B050"/>
+                </a:solidFill>
+                <a:latin typeface="Courier New" panose="02070309020205020404" pitchFamily="49" charset="0"/>
+                <a:cs typeface="Courier New" panose="02070309020205020404" pitchFamily="49" charset="0"/>
+              </a:rPr>
+              <a:t>Voice_type</a:t>
+            </a:r>
+            <a:r>
+              <a:rPr lang="en-US" sz="2300" dirty="0">
+                <a:latin typeface="Courier New" panose="02070309020205020404" pitchFamily="49" charset="0"/>
+                <a:cs typeface="Courier New" panose="02070309020205020404" pitchFamily="49" charset="0"/>
+              </a:rPr>
+              <a:t>;</a:t>
+            </a:r>
+            <a:endParaRPr lang="ru-RU" sz="2300" dirty="0">
+              <a:latin typeface="Courier New" panose="02070309020205020404" pitchFamily="49" charset="0"/>
+              <a:cs typeface="Courier New" panose="02070309020205020404" pitchFamily="49" charset="0"/>
+            </a:endParaRPr>
+          </a:p>
+        </p:txBody>
+      </p:sp>
+      <p:sp>
+        <p:nvSpPr>
+          <p:cNvPr id="3" name="Номер слайда 2"/>
           <p:cNvSpPr>
             <a:spLocks noGrp="1"/>
           </p:cNvSpPr>
@@ -8116,7 +7997,7 @@
     </p:spTree>
     <p:extLst>
       <p:ext uri="{BB962C8B-B14F-4D97-AF65-F5344CB8AC3E}">
-        <p14:creationId xmlns:p14="http://schemas.microsoft.com/office/powerpoint/2010/main" val="3936231768"/>
+        <p14:creationId xmlns:p14="http://schemas.microsoft.com/office/powerpoint/2010/main" val="331960909"/>
       </p:ext>
     </p:extLst>
   </p:cSld>
@@ -8145,14 +8026,192 @@
       </p:grpSpPr>
       <p:sp>
         <p:nvSpPr>
-          <p:cNvPr id="2" name="TextBox 1"/>
+          <p:cNvPr id="2" name="Прямоугольник 1"/>
+          <p:cNvSpPr/>
+          <p:nvPr/>
+        </p:nvSpPr>
+        <p:spPr>
+          <a:xfrm>
+            <a:off x="599051" y="1626247"/>
+            <a:ext cx="11762706" cy="4154984"/>
+          </a:xfrm>
+          <a:prstGeom prst="rect">
+            <a:avLst/>
+          </a:prstGeom>
+        </p:spPr>
+        <p:txBody>
+          <a:bodyPr wrap="square">
+            <a:spAutoFit/>
+          </a:bodyPr>
+          <a:lstStyle/>
+          <a:p>
+            <a:r>
+              <a:rPr lang="ru-RU" sz="4400" dirty="0"/>
+              <a:t>Существует </a:t>
+            </a:r>
+            <a:r>
+              <a:rPr lang="ru-RU" sz="4400" b="1" dirty="0">
+                <a:solidFill>
+                  <a:srgbClr val="FF0000"/>
+                </a:solidFill>
+              </a:rPr>
+              <a:t>множество</a:t>
+            </a:r>
+            <a:r>
+              <a:rPr lang="ru-RU" sz="4400" dirty="0">
+                <a:solidFill>
+                  <a:srgbClr val="FF0000"/>
+                </a:solidFill>
+              </a:rPr>
+              <a:t> </a:t>
+            </a:r>
+            <a:r>
+              <a:rPr lang="ru-RU" sz="4400" dirty="0"/>
+              <a:t>речевых </a:t>
+            </a:r>
+            <a:r>
+              <a:rPr lang="ru-RU" sz="4400" dirty="0" smtClean="0"/>
+              <a:t>кодеков</a:t>
+            </a:r>
+            <a:r>
+              <a:rPr lang="en-US" sz="4400" dirty="0" smtClean="0"/>
+              <a:t>; </a:t>
+            </a:r>
+            <a:r>
+              <a:rPr lang="ru-RU" sz="4400" dirty="0" smtClean="0"/>
+              <a:t>наиболее распространены:</a:t>
+            </a:r>
+            <a:endParaRPr lang="en-US" sz="4400" dirty="0"/>
+          </a:p>
+          <a:p>
+            <a:pPr marL="571500" indent="-571500">
+              <a:buFont typeface="Arial" panose="020B0604020202020204" pitchFamily="34" charset="0"/>
+              <a:buChar char="•"/>
+            </a:pPr>
+            <a:r>
+              <a:rPr lang="ru-RU" sz="4400" dirty="0"/>
+              <a:t>кодеки по стандарту от </a:t>
+            </a:r>
+            <a:r>
+              <a:rPr lang="en-US" sz="4400" dirty="0"/>
+              <a:t>ITU-T</a:t>
+            </a:r>
+            <a:r>
+              <a:rPr lang="ru-RU" sz="4400" dirty="0"/>
+              <a:t> (</a:t>
+            </a:r>
+            <a:r>
+              <a:rPr lang="en-US" sz="4400" dirty="0"/>
+              <a:t>G.711, G.726</a:t>
+            </a:r>
+            <a:r>
+              <a:rPr lang="ru-RU" sz="4400" dirty="0" smtClean="0"/>
+              <a:t>…) </a:t>
+            </a:r>
+          </a:p>
+          <a:p>
+            <a:pPr marL="571500" indent="-571500">
+              <a:buFont typeface="Arial" panose="020B0604020202020204" pitchFamily="34" charset="0"/>
+              <a:buChar char="•"/>
+            </a:pPr>
+            <a:r>
+              <a:rPr lang="ru-RU" sz="4400" dirty="0" smtClean="0"/>
+              <a:t>стандарт </a:t>
+            </a:r>
+            <a:r>
+              <a:rPr lang="en-US" sz="4400" dirty="0"/>
+              <a:t>GSM (Full </a:t>
+            </a:r>
+            <a:r>
+              <a:rPr lang="en-US" sz="4400" dirty="0" smtClean="0"/>
+              <a:t>rate</a:t>
+            </a:r>
+            <a:r>
+              <a:rPr lang="en-US" sz="4400" dirty="0"/>
+              <a:t>, Half rate</a:t>
+            </a:r>
+            <a:r>
+              <a:rPr lang="en-US" sz="4400" dirty="0" smtClean="0"/>
+              <a:t>…)</a:t>
+            </a:r>
+            <a:endParaRPr lang="ru-RU" sz="4400" dirty="0" smtClean="0"/>
+          </a:p>
+          <a:p>
+            <a:pPr marL="571500" indent="-571500">
+              <a:buFont typeface="Arial" panose="020B0604020202020204" pitchFamily="34" charset="0"/>
+              <a:buChar char="•"/>
+            </a:pPr>
+            <a:r>
+              <a:rPr lang="en-US" sz="4400" dirty="0" err="1" smtClean="0"/>
+              <a:t>iLBC</a:t>
+            </a:r>
+            <a:r>
+              <a:rPr lang="en-US" sz="4400" dirty="0" smtClean="0"/>
+              <a:t> (</a:t>
+            </a:r>
+            <a:r>
+              <a:rPr lang="ru-RU" sz="4400" dirty="0" smtClean="0"/>
+              <a:t>кодек для </a:t>
+            </a:r>
+            <a:r>
+              <a:rPr lang="en-US" sz="4400" dirty="0" smtClean="0"/>
+              <a:t>IP-</a:t>
+            </a:r>
+            <a:r>
+              <a:rPr lang="ru-RU" sz="4400" dirty="0" smtClean="0"/>
+              <a:t>телефонии</a:t>
+            </a:r>
+            <a:r>
+              <a:rPr lang="ru-RU" sz="4400" dirty="0" smtClean="0"/>
+              <a:t>)</a:t>
+            </a:r>
+          </a:p>
+          <a:p>
+            <a:pPr marL="571500" indent="-571500">
+              <a:buFont typeface="Arial" panose="020B0604020202020204" pitchFamily="34" charset="0"/>
+              <a:buChar char="•"/>
+            </a:pPr>
+            <a:r>
+              <a:rPr lang="ru-RU" sz="4400" dirty="0" smtClean="0"/>
+              <a:t>…</a:t>
+            </a:r>
+            <a:endParaRPr lang="ru-RU" sz="4400" dirty="0" smtClean="0"/>
+          </a:p>
+        </p:txBody>
+      </p:sp>
+      <p:sp>
+        <p:nvSpPr>
+          <p:cNvPr id="3" name="Номер слайда 2"/>
+          <p:cNvSpPr>
+            <a:spLocks noGrp="1"/>
+          </p:cNvSpPr>
+          <p:nvPr>
+            <p:ph type="sldNum" sz="quarter" idx="12"/>
+          </p:nvPr>
+        </p:nvSpPr>
+        <p:spPr/>
+        <p:txBody>
+          <a:bodyPr/>
+          <a:lstStyle/>
+          <a:p>
+            <a:fld id="{467DF74C-0500-4CF2-8353-AE1D1480DAD0}" type="slidenum">
+              <a:rPr lang="ru-RU" smtClean="0"/>
+              <a:t>7</a:t>
+            </a:fld>
+            <a:endParaRPr lang="ru-RU"/>
+          </a:p>
+        </p:txBody>
+      </p:sp>
+      <p:sp>
+        <p:nvSpPr>
+          <p:cNvPr id="5" name="TextBox 4"/>
           <p:cNvSpPr txBox="1"/>
           <p:nvPr/>
         </p:nvSpPr>
         <p:spPr>
           <a:xfrm>
-            <a:off x="1283041" y="261179"/>
-            <a:ext cx="10414518" cy="1877437"/>
+            <a:off x="599051" y="-251190"/>
+            <a:ext cx="11423192" cy="1877437"/>
           </a:xfrm>
           <a:prstGeom prst="rect">
             <a:avLst/>
@@ -8165,191 +8224,34 @@
           </a:bodyPr>
           <a:lstStyle/>
           <a:p>
+            <a:pPr algn="ctr"/>
             <a:r>
               <a:rPr lang="ru-RU" sz="6800" dirty="0" smtClean="0"/>
-              <a:t>Проектирование</a:t>
-            </a:r>
-            <a:r>
-              <a:rPr lang="ru-RU" sz="6600" dirty="0" smtClean="0"/>
-              <a:t> библиотек</a:t>
+              <a:t>Проектирование </a:t>
+            </a:r>
+            <a:r>
+              <a:rPr lang="ru-RU" sz="6800" dirty="0" smtClean="0"/>
+              <a:t>библиотек</a:t>
             </a:r>
           </a:p>
           <a:p>
             <a:pPr algn="ctr"/>
             <a:r>
+              <a:rPr lang="ru-RU" sz="4800" dirty="0"/>
+              <a:t>ВЫБОР СТРУКТУРЫ ДЛЯ РЕЧЕВОГО </a:t>
+            </a:r>
+            <a:r>
               <a:rPr lang="ru-RU" sz="4800" dirty="0" smtClean="0"/>
-              <a:t>РЕЧЕВОЙ СИГНАЛ</a:t>
+              <a:t>КОДЕКА</a:t>
             </a:r>
             <a:endParaRPr lang="ru-RU" sz="4800" dirty="0"/>
-          </a:p>
-        </p:txBody>
-      </p:sp>
-      <p:sp>
-        <p:nvSpPr>
-          <p:cNvPr id="4" name="TextBox 3"/>
-          <p:cNvSpPr txBox="1"/>
-          <p:nvPr/>
-        </p:nvSpPr>
-        <p:spPr>
-          <a:xfrm>
-            <a:off x="246192" y="2288711"/>
-            <a:ext cx="12488215" cy="4801314"/>
-          </a:xfrm>
-          <a:prstGeom prst="rect">
-            <a:avLst/>
-          </a:prstGeom>
-          <a:noFill/>
-        </p:spPr>
-        <p:txBody>
-          <a:bodyPr wrap="square" rtlCol="0">
-            <a:spAutoFit/>
-          </a:bodyPr>
-          <a:lstStyle/>
-          <a:p>
-            <a:pPr marL="571500" indent="-571500">
-              <a:buFont typeface="Arial" panose="020B0604020202020204" pitchFamily="34" charset="0"/>
-              <a:buChar char="•"/>
-            </a:pPr>
-            <a:r>
-              <a:rPr lang="ru-RU" sz="3600" dirty="0" smtClean="0"/>
-              <a:t>кратковременная </a:t>
-            </a:r>
-            <a:r>
-              <a:rPr lang="ru-RU" sz="3600" dirty="0"/>
-              <a:t>энергия речевого сигнала;</a:t>
-            </a:r>
-          </a:p>
-          <a:p>
-            <a:pPr marL="571500" indent="-571500">
-              <a:buFont typeface="Arial" panose="020B0604020202020204" pitchFamily="34" charset="0"/>
-              <a:buChar char="•"/>
-            </a:pPr>
-            <a:r>
-              <a:rPr lang="ru-RU" sz="3600" dirty="0" smtClean="0"/>
-              <a:t>число </a:t>
-            </a:r>
-            <a:r>
-              <a:rPr lang="ru-RU" sz="3600" dirty="0"/>
-              <a:t>нулей интенсивности (мгновенная частота);</a:t>
-            </a:r>
-          </a:p>
-          <a:p>
-            <a:pPr marL="571500" indent="-571500">
-              <a:buFont typeface="Arial" panose="020B0604020202020204" pitchFamily="34" charset="0"/>
-              <a:buChar char="•"/>
-            </a:pPr>
-            <a:r>
-              <a:rPr lang="ru-RU" sz="3600" dirty="0" smtClean="0"/>
-              <a:t>форманты </a:t>
-            </a:r>
-            <a:r>
-              <a:rPr lang="ru-RU" sz="3600" dirty="0"/>
-              <a:t>речевого сигнала (концентрация энергии в </a:t>
-            </a:r>
-            <a:r>
-              <a:rPr lang="ru-RU" sz="3600" dirty="0" smtClean="0"/>
-              <a:t>ограниченной частотной </a:t>
-            </a:r>
-            <a:r>
-              <a:rPr lang="ru-RU" sz="3600" dirty="0"/>
-              <a:t>области);</a:t>
-            </a:r>
-          </a:p>
-          <a:p>
-            <a:pPr marL="571500" indent="-571500">
-              <a:buFont typeface="Arial" panose="020B0604020202020204" pitchFamily="34" charset="0"/>
-              <a:buChar char="•"/>
-            </a:pPr>
-            <a:r>
-              <a:rPr lang="ru-RU" sz="3600" dirty="0" smtClean="0"/>
-              <a:t>коэффициенты </a:t>
-            </a:r>
-            <a:r>
-              <a:rPr lang="ru-RU" sz="3600" dirty="0"/>
-              <a:t>линейного предсказания </a:t>
-            </a:r>
-            <a:endParaRPr lang="ru-RU" sz="3600" dirty="0" smtClean="0"/>
-          </a:p>
-          <a:p>
-            <a:pPr marL="571500" indent="-571500">
-              <a:buFont typeface="Arial" panose="020B0604020202020204" pitchFamily="34" charset="0"/>
-              <a:buChar char="•"/>
-            </a:pPr>
-            <a:r>
-              <a:rPr lang="ru-RU" sz="3600" dirty="0" smtClean="0"/>
-              <a:t>распределение </a:t>
-            </a:r>
-            <a:r>
-              <a:rPr lang="ru-RU" sz="3600" dirty="0"/>
-              <a:t>энергии сигнала по частотным </a:t>
-            </a:r>
-            <a:r>
-              <a:rPr lang="ru-RU" sz="3600" dirty="0" smtClean="0"/>
-              <a:t>группам;</a:t>
-            </a:r>
-          </a:p>
-          <a:p>
-            <a:pPr marL="571500" indent="-571500">
-              <a:buFont typeface="Arial" panose="020B0604020202020204" pitchFamily="34" charset="0"/>
-              <a:buChar char="•"/>
-            </a:pPr>
-            <a:r>
-              <a:rPr lang="ru-RU" sz="3600" dirty="0" smtClean="0"/>
-              <a:t>длительность пауз</a:t>
-            </a:r>
-            <a:r>
-              <a:rPr lang="ru-RU" sz="3600" dirty="0"/>
-              <a:t>;</a:t>
-            </a:r>
-            <a:endParaRPr lang="ru-RU" sz="3600" dirty="0" smtClean="0"/>
-          </a:p>
-          <a:p>
-            <a:pPr marL="571500" indent="-571500">
-              <a:buFont typeface="Arial" panose="020B0604020202020204" pitchFamily="34" charset="0"/>
-              <a:buChar char="•"/>
-            </a:pPr>
-            <a:r>
-              <a:rPr lang="ru-RU" sz="3600" dirty="0" smtClean="0"/>
-              <a:t>…</a:t>
-            </a:r>
-            <a:endParaRPr lang="ru-RU" sz="3600" dirty="0"/>
-          </a:p>
-          <a:p>
-            <a:pPr marL="285750" indent="-285750">
-              <a:buFont typeface="Arial" panose="020B0604020202020204" pitchFamily="34" charset="0"/>
-              <a:buChar char="•"/>
-            </a:pPr>
-            <a:endParaRPr lang="ru-RU" dirty="0"/>
-          </a:p>
-        </p:txBody>
-      </p:sp>
-      <p:sp>
-        <p:nvSpPr>
-          <p:cNvPr id="3" name="Номер слайда 2"/>
-          <p:cNvSpPr>
-            <a:spLocks noGrp="1"/>
-          </p:cNvSpPr>
-          <p:nvPr>
-            <p:ph type="sldNum" sz="quarter" idx="12"/>
-          </p:nvPr>
-        </p:nvSpPr>
-        <p:spPr/>
-        <p:txBody>
-          <a:bodyPr/>
-          <a:lstStyle/>
-          <a:p>
-            <a:fld id="{467DF74C-0500-4CF2-8353-AE1D1480DAD0}" type="slidenum">
-              <a:rPr lang="ru-RU" smtClean="0"/>
-              <a:t>7</a:t>
-            </a:fld>
-            <a:endParaRPr lang="ru-RU"/>
           </a:p>
         </p:txBody>
       </p:sp>
     </p:spTree>
     <p:extLst>
       <p:ext uri="{BB962C8B-B14F-4D97-AF65-F5344CB8AC3E}">
-        <p14:creationId xmlns:p14="http://schemas.microsoft.com/office/powerpoint/2010/main" val="331960909"/>
+        <p14:creationId xmlns:p14="http://schemas.microsoft.com/office/powerpoint/2010/main" val="2046280975"/>
       </p:ext>
     </p:extLst>
   </p:cSld>
@@ -8378,170 +8280,87 @@
       </p:grpSpPr>
       <p:sp>
         <p:nvSpPr>
-          <p:cNvPr id="2" name="Прямоугольник 1"/>
-          <p:cNvSpPr/>
+          <p:cNvPr id="2" name="Номер слайда 1"/>
+          <p:cNvSpPr>
+            <a:spLocks noGrp="1"/>
+          </p:cNvSpPr>
+          <p:nvPr>
+            <p:ph type="sldNum" sz="quarter" idx="12"/>
+          </p:nvPr>
+        </p:nvSpPr>
+        <p:spPr/>
+        <p:txBody>
+          <a:bodyPr/>
+          <a:lstStyle/>
+          <a:p>
+            <a:fld id="{467DF74C-0500-4CF2-8353-AE1D1480DAD0}" type="slidenum">
+              <a:rPr lang="ru-RU" smtClean="0"/>
+              <a:pPr/>
+              <a:t>8</a:t>
+            </a:fld>
+            <a:endParaRPr lang="ru-RU" dirty="0"/>
+          </a:p>
+        </p:txBody>
+      </p:sp>
+      <p:sp>
+        <p:nvSpPr>
+          <p:cNvPr id="3" name="TextBox 2"/>
+          <p:cNvSpPr txBox="1"/>
           <p:nvPr/>
         </p:nvSpPr>
         <p:spPr>
           <a:xfrm>
-            <a:off x="429294" y="1160918"/>
-            <a:ext cx="11762706" cy="4832092"/>
+            <a:off x="241871" y="180304"/>
+            <a:ext cx="11682173" cy="707886"/>
+          </a:xfrm>
+          <a:prstGeom prst="rect">
+            <a:avLst/>
+          </a:prstGeom>
+          <a:noFill/>
+        </p:spPr>
+        <p:txBody>
+          <a:bodyPr wrap="none" rtlCol="0">
+            <a:spAutoFit/>
+          </a:bodyPr>
+          <a:lstStyle/>
+          <a:p>
+            <a:pPr algn="ctr"/>
+            <a:r>
+              <a:rPr lang="ru-RU" sz="4000" b="1" dirty="0" smtClean="0"/>
+              <a:t>ПРЕДЛАГАЕМАЯ СТРУКТУРА ДЛЯ РЕЧЕВОГО КОДЕРА</a:t>
+            </a:r>
+            <a:endParaRPr lang="ru-RU" sz="4000" b="1" dirty="0"/>
+          </a:p>
+        </p:txBody>
+      </p:sp>
+      <p:pic>
+        <p:nvPicPr>
+          <p:cNvPr id="7" name="Рисунок 6"/>
+          <p:cNvPicPr>
+            <a:picLocks noChangeAspect="1"/>
+          </p:cNvPicPr>
+          <p:nvPr/>
+        </p:nvPicPr>
+        <p:blipFill>
+          <a:blip r:embed="rId3"/>
+          <a:stretch>
+            <a:fillRect/>
+          </a:stretch>
+        </p:blipFill>
+        <p:spPr>
+          <a:xfrm>
+            <a:off x="1857167" y="890564"/>
+            <a:ext cx="8844700" cy="5648348"/>
           </a:xfrm>
           <a:prstGeom prst="rect">
             <a:avLst/>
           </a:prstGeom>
         </p:spPr>
-        <p:txBody>
-          <a:bodyPr wrap="square">
-            <a:spAutoFit/>
-          </a:bodyPr>
-          <a:lstStyle/>
-          <a:p>
-            <a:r>
-              <a:rPr lang="ru-RU" sz="4400" dirty="0"/>
-              <a:t>Существует множество речевых </a:t>
-            </a:r>
-            <a:r>
-              <a:rPr lang="ru-RU" sz="4400" dirty="0" smtClean="0"/>
-              <a:t>кодеков</a:t>
-            </a:r>
-            <a:r>
-              <a:rPr lang="en-US" sz="4400" dirty="0" smtClean="0"/>
-              <a:t>; </a:t>
-            </a:r>
-            <a:r>
-              <a:rPr lang="ru-RU" sz="4400" dirty="0" smtClean="0"/>
-              <a:t>наиболее распространены:</a:t>
-            </a:r>
-            <a:endParaRPr lang="en-US" sz="4400" dirty="0"/>
-          </a:p>
-          <a:p>
-            <a:pPr marL="571500" indent="-571500">
-              <a:buFont typeface="Arial" panose="020B0604020202020204" pitchFamily="34" charset="0"/>
-              <a:buChar char="•"/>
-            </a:pPr>
-            <a:r>
-              <a:rPr lang="ru-RU" sz="4400" dirty="0"/>
-              <a:t>кодеки по стандарту от </a:t>
-            </a:r>
-            <a:r>
-              <a:rPr lang="en-US" sz="4400" dirty="0"/>
-              <a:t>ITU-T</a:t>
-            </a:r>
-            <a:r>
-              <a:rPr lang="ru-RU" sz="4400" dirty="0"/>
-              <a:t> (</a:t>
-            </a:r>
-            <a:r>
-              <a:rPr lang="en-US" sz="4400" dirty="0"/>
-              <a:t>G.711, G.726</a:t>
-            </a:r>
-            <a:r>
-              <a:rPr lang="ru-RU" sz="4400" dirty="0" smtClean="0"/>
-              <a:t>…) </a:t>
-            </a:r>
-          </a:p>
-          <a:p>
-            <a:pPr marL="571500" indent="-571500">
-              <a:buFont typeface="Arial" panose="020B0604020202020204" pitchFamily="34" charset="0"/>
-              <a:buChar char="•"/>
-            </a:pPr>
-            <a:r>
-              <a:rPr lang="ru-RU" sz="4400" dirty="0" smtClean="0"/>
-              <a:t>стандарт </a:t>
-            </a:r>
-            <a:r>
-              <a:rPr lang="en-US" sz="4400" dirty="0"/>
-              <a:t>GSM (</a:t>
-            </a:r>
-            <a:r>
-              <a:rPr lang="en-US" sz="4400"/>
-              <a:t>Full </a:t>
-            </a:r>
-            <a:r>
-              <a:rPr lang="en-US" sz="4400" smtClean="0"/>
-              <a:t>rate</a:t>
-            </a:r>
-            <a:r>
-              <a:rPr lang="en-US" sz="4400" dirty="0"/>
-              <a:t>, Half rate</a:t>
-            </a:r>
-            <a:r>
-              <a:rPr lang="en-US" sz="4400" dirty="0" smtClean="0"/>
-              <a:t>…)</a:t>
-            </a:r>
-            <a:endParaRPr lang="ru-RU" sz="4400" dirty="0" smtClean="0"/>
-          </a:p>
-          <a:p>
-            <a:pPr marL="571500" indent="-571500">
-              <a:buFont typeface="Arial" panose="020B0604020202020204" pitchFamily="34" charset="0"/>
-              <a:buChar char="•"/>
-            </a:pPr>
-            <a:r>
-              <a:rPr lang="en-US" sz="4400" dirty="0" err="1" smtClean="0"/>
-              <a:t>iLBC</a:t>
-            </a:r>
-            <a:r>
-              <a:rPr lang="en-US" sz="4400" dirty="0" smtClean="0"/>
-              <a:t> (</a:t>
-            </a:r>
-            <a:r>
-              <a:rPr lang="ru-RU" sz="4400" dirty="0" smtClean="0"/>
-              <a:t>кодек для </a:t>
-            </a:r>
-            <a:r>
-              <a:rPr lang="en-US" sz="4400" dirty="0" smtClean="0"/>
-              <a:t>IP-</a:t>
-            </a:r>
-            <a:r>
-              <a:rPr lang="ru-RU" sz="4400" dirty="0" smtClean="0"/>
-              <a:t>телефонии)</a:t>
-            </a:r>
-            <a:endParaRPr lang="en-US" sz="4400" dirty="0"/>
-          </a:p>
-          <a:p>
-            <a:pPr marL="571500" indent="-571500">
-              <a:buFont typeface="Arial" panose="020B0604020202020204" pitchFamily="34" charset="0"/>
-              <a:buChar char="•"/>
-            </a:pPr>
-            <a:r>
-              <a:rPr lang="en-US" sz="4400" dirty="0"/>
-              <a:t>…</a:t>
-            </a:r>
-            <a:endParaRPr lang="ru-RU" sz="4400" dirty="0"/>
-          </a:p>
-          <a:p>
-            <a:endParaRPr lang="ru-RU" sz="4400" dirty="0"/>
-          </a:p>
-        </p:txBody>
-      </p:sp>
-      <p:sp>
-        <p:nvSpPr>
-          <p:cNvPr id="3" name="Номер слайда 2"/>
-          <p:cNvSpPr>
-            <a:spLocks noGrp="1"/>
-          </p:cNvSpPr>
-          <p:nvPr>
-            <p:ph type="sldNum" sz="quarter" idx="12"/>
-          </p:nvPr>
-        </p:nvSpPr>
-        <p:spPr/>
-        <p:txBody>
-          <a:bodyPr/>
-          <a:lstStyle/>
-          <a:p>
-            <a:fld id="{467DF74C-0500-4CF2-8353-AE1D1480DAD0}" type="slidenum">
-              <a:rPr lang="ru-RU" smtClean="0"/>
-              <a:t>8</a:t>
-            </a:fld>
-            <a:endParaRPr lang="ru-RU"/>
-          </a:p>
-        </p:txBody>
-      </p:sp>
+      </p:pic>
     </p:spTree>
     <p:extLst>
       <p:ext uri="{BB962C8B-B14F-4D97-AF65-F5344CB8AC3E}">
-        <p14:creationId xmlns:p14="http://schemas.microsoft.com/office/powerpoint/2010/main" val="2046280975"/>
+        <p14:creationId xmlns:p14="http://schemas.microsoft.com/office/powerpoint/2010/main" val="3629272050"/>
       </p:ext>
     </p:extLst>
   </p:cSld>
@@ -8568,160 +8387,70 @@
           <a:chExt cx="0" cy="0"/>
         </a:xfrm>
       </p:grpSpPr>
-      <p:sp>
-        <p:nvSpPr>
-          <p:cNvPr id="4" name="TextBox 3"/>
-          <p:cNvSpPr txBox="1"/>
+      <p:pic>
+        <p:nvPicPr>
+          <p:cNvPr id="7" name="Рисунок 6"/>
+          <p:cNvPicPr>
+            <a:picLocks noChangeAspect="1"/>
+          </p:cNvPicPr>
           <p:nvPr/>
-        </p:nvSpPr>
+        </p:nvPicPr>
+        <p:blipFill>
+          <a:blip r:embed="rId3"/>
+          <a:stretch>
+            <a:fillRect/>
+          </a:stretch>
+        </p:blipFill>
         <p:spPr>
           <a:xfrm>
-            <a:off x="1880315" y="1979604"/>
-            <a:ext cx="12556902" cy="3416320"/>
+            <a:off x="438082" y="419838"/>
+            <a:ext cx="11096955" cy="5826416"/>
           </a:xfrm>
           <a:prstGeom prst="rect">
             <a:avLst/>
           </a:prstGeom>
-          <a:noFill/>
         </p:spPr>
-        <p:txBody>
-          <a:bodyPr wrap="square" rtlCol="0">
-            <a:spAutoFit/>
-          </a:bodyPr>
-          <a:lstStyle/>
-          <a:p>
-            <a:r>
-              <a:rPr lang="ru-RU" sz="3600" dirty="0" smtClean="0"/>
-              <a:t>Существует </a:t>
-            </a:r>
-            <a:r>
-              <a:rPr lang="ru-RU" sz="3600" dirty="0"/>
-              <a:t>множество </a:t>
-            </a:r>
-            <a:r>
-              <a:rPr lang="ru-RU" sz="3600" dirty="0" smtClean="0"/>
-              <a:t>речевых кодеков:</a:t>
-            </a:r>
-            <a:endParaRPr lang="en-US" sz="3600" dirty="0" smtClean="0"/>
-          </a:p>
-          <a:p>
-            <a:pPr marL="571500" indent="-571500">
-              <a:buFont typeface="Arial" panose="020B0604020202020204" pitchFamily="34" charset="0"/>
-              <a:buChar char="•"/>
-            </a:pPr>
-            <a:r>
-              <a:rPr lang="ru-RU" sz="3600" dirty="0" smtClean="0"/>
-              <a:t>кодеки по стандарту от </a:t>
-            </a:r>
-            <a:r>
-              <a:rPr lang="en-US" sz="3600" dirty="0" smtClean="0"/>
-              <a:t>ITU-T</a:t>
-            </a:r>
-            <a:r>
-              <a:rPr lang="ru-RU" sz="3600" dirty="0" smtClean="0"/>
-              <a:t> (</a:t>
-            </a:r>
-            <a:r>
-              <a:rPr lang="en-US" sz="3600" dirty="0" smtClean="0"/>
-              <a:t>G.711, G.726</a:t>
-            </a:r>
-            <a:r>
-              <a:rPr lang="ru-RU" sz="3600" dirty="0" smtClean="0"/>
-              <a:t>…)</a:t>
-            </a:r>
-            <a:endParaRPr lang="en-US" sz="3600" dirty="0" smtClean="0"/>
-          </a:p>
-          <a:p>
-            <a:pPr marL="571500" indent="-571500">
-              <a:buFont typeface="Arial" panose="020B0604020202020204" pitchFamily="34" charset="0"/>
-              <a:buChar char="•"/>
-            </a:pPr>
-            <a:r>
-              <a:rPr lang="ru-RU" sz="3600" dirty="0" smtClean="0"/>
-              <a:t>стандарт </a:t>
-            </a:r>
-            <a:r>
-              <a:rPr lang="en-US" sz="3600" dirty="0" smtClean="0"/>
-              <a:t>GSM </a:t>
-            </a:r>
-            <a:r>
-              <a:rPr lang="ru-RU" sz="3600" dirty="0" smtClean="0"/>
-              <a:t>(</a:t>
-            </a:r>
-            <a:r>
-              <a:rPr lang="en-US" sz="3600" dirty="0" smtClean="0"/>
-              <a:t>Full rate, Half rate</a:t>
-            </a:r>
-            <a:r>
-              <a:rPr lang="ru-RU" sz="3600" dirty="0" smtClean="0"/>
-              <a:t>…)</a:t>
-            </a:r>
-            <a:endParaRPr lang="en-US" sz="3600" dirty="0" smtClean="0"/>
-          </a:p>
-          <a:p>
-            <a:pPr marL="571500" indent="-571500">
-              <a:buFont typeface="Arial" panose="020B0604020202020204" pitchFamily="34" charset="0"/>
-              <a:buChar char="•"/>
-            </a:pPr>
-            <a:r>
-              <a:rPr lang="en-US" sz="3600" dirty="0" err="1" smtClean="0"/>
-              <a:t>iLBC</a:t>
-            </a:r>
-            <a:r>
-              <a:rPr lang="en-US" sz="3600" dirty="0" smtClean="0"/>
-              <a:t> </a:t>
-            </a:r>
-            <a:r>
-              <a:rPr lang="en-US" sz="3600" dirty="0" smtClean="0"/>
-              <a:t>(</a:t>
-            </a:r>
-            <a:r>
-              <a:rPr lang="ru-RU" sz="3600" dirty="0" smtClean="0"/>
-              <a:t>кодек для </a:t>
-            </a:r>
-            <a:r>
-              <a:rPr lang="en-US" sz="3600" dirty="0" smtClean="0"/>
-              <a:t>IP-</a:t>
-            </a:r>
-            <a:r>
-              <a:rPr lang="ru-RU" sz="3600" dirty="0" smtClean="0"/>
-              <a:t>телефонии)</a:t>
-            </a:r>
-            <a:endParaRPr lang="en-US" sz="3600" dirty="0" smtClean="0"/>
-          </a:p>
-          <a:p>
-            <a:pPr marL="571500" indent="-571500">
-              <a:buFont typeface="Arial" panose="020B0604020202020204" pitchFamily="34" charset="0"/>
-              <a:buChar char="•"/>
-            </a:pPr>
-            <a:r>
-              <a:rPr lang="en-US" sz="3600" dirty="0" smtClean="0"/>
-              <a:t>…</a:t>
-            </a:r>
-            <a:endParaRPr lang="ru-RU" sz="3600" dirty="0"/>
-          </a:p>
-          <a:p>
-            <a:endParaRPr lang="ru-RU" sz="3600" dirty="0" smtClean="0"/>
-          </a:p>
-        </p:txBody>
-      </p:sp>
-      <p:sp>
-        <p:nvSpPr>
-          <p:cNvPr id="3" name="Скругленный прямоугольник 2"/>
+      </p:pic>
+      <p:sp>
+        <p:nvSpPr>
+          <p:cNvPr id="2" name="Номер слайда 1"/>
+          <p:cNvSpPr>
+            <a:spLocks noGrp="1"/>
+          </p:cNvSpPr>
+          <p:nvPr>
+            <p:ph type="sldNum" sz="quarter" idx="12"/>
+          </p:nvPr>
+        </p:nvSpPr>
+        <p:spPr/>
+        <p:txBody>
+          <a:bodyPr/>
+          <a:lstStyle/>
+          <a:p>
+            <a:fld id="{467DF74C-0500-4CF2-8353-AE1D1480DAD0}" type="slidenum">
+              <a:rPr lang="ru-RU" smtClean="0"/>
+              <a:t>9</a:t>
+            </a:fld>
+            <a:endParaRPr lang="ru-RU" dirty="0"/>
+          </a:p>
+        </p:txBody>
+      </p:sp>
+      <p:sp>
+        <p:nvSpPr>
+          <p:cNvPr id="10" name="Скругленный прямоугольник 9"/>
           <p:cNvSpPr/>
           <p:nvPr/>
         </p:nvSpPr>
         <p:spPr>
           <a:xfrm>
-            <a:off x="334373" y="110097"/>
-            <a:ext cx="11629623" cy="6246253"/>
+            <a:off x="237782" y="310994"/>
+            <a:ext cx="11732654" cy="6091707"/>
           </a:xfrm>
           <a:prstGeom prst="roundRect">
             <a:avLst/>
           </a:prstGeom>
           <a:solidFill>
             <a:schemeClr val="accent1">
-              <a:alpha val="93000"/>
+              <a:alpha val="89000"/>
             </a:schemeClr>
           </a:solidFill>
         </p:spPr>
@@ -8745,50 +8474,66 @@
           <a:bodyPr rtlCol="0" anchor="ctr"/>
           <a:lstStyle/>
           <a:p>
-            <a:pPr algn="ctr"/>
-            <a:r>
-              <a:rPr lang="ru-RU" sz="12000" b="1" dirty="0" smtClean="0">
+            <a:pPr lvl="0"/>
+            <a:r>
+              <a:rPr lang="ru-RU" sz="5400" dirty="0"/>
+              <a:t>Используя интерфейс, мы можем </a:t>
+            </a:r>
+            <a:r>
+              <a:rPr lang="ru-RU" sz="5400" dirty="0" smtClean="0"/>
+              <a:t>рассказать</a:t>
+            </a:r>
+            <a:r>
+              <a:rPr lang="ru-RU" sz="5400" dirty="0"/>
+              <a:t>, </a:t>
+            </a:r>
+            <a:r>
+              <a:rPr lang="ru-RU" sz="5400" b="1" dirty="0">
                 <a:solidFill>
-                  <a:schemeClr val="bg1"/>
+                  <a:srgbClr val="FF0000"/>
                 </a:solidFill>
               </a:rPr>
-              <a:t>СТОП!</a:t>
-            </a:r>
-            <a:endParaRPr lang="ru-RU" sz="12000" b="1" dirty="0">
-              <a:solidFill>
-                <a:schemeClr val="bg1"/>
-              </a:solidFill>
-            </a:endParaRPr>
-          </a:p>
-        </p:txBody>
-      </p:sp>
-      <p:sp>
-        <p:nvSpPr>
-          <p:cNvPr id="2" name="Номер слайда 1"/>
-          <p:cNvSpPr>
-            <a:spLocks noGrp="1"/>
-          </p:cNvSpPr>
-          <p:nvPr>
-            <p:ph type="sldNum" sz="quarter" idx="12"/>
-          </p:nvPr>
-        </p:nvSpPr>
-        <p:spPr/>
-        <p:txBody>
-          <a:bodyPr/>
-          <a:lstStyle/>
-          <a:p>
-            <a:fld id="{467DF74C-0500-4CF2-8353-AE1D1480DAD0}" type="slidenum">
-              <a:rPr lang="ru-RU" smtClean="0"/>
-              <a:t>9</a:t>
-            </a:fld>
-            <a:endParaRPr lang="ru-RU" dirty="0"/>
+              <a:t>какие</a:t>
+            </a:r>
+            <a:r>
+              <a:rPr lang="ru-RU" sz="5400" dirty="0">
+                <a:solidFill>
+                  <a:srgbClr val="FF0000"/>
+                </a:solidFill>
+              </a:rPr>
+              <a:t> </a:t>
+            </a:r>
+            <a:r>
+              <a:rPr lang="ru-RU" sz="5400" dirty="0"/>
+              <a:t>действия должен уметь выполнять данный алгоритм и, следовательно, </a:t>
+            </a:r>
+            <a:r>
+              <a:rPr lang="ru-RU" sz="5400" b="1" dirty="0">
+                <a:solidFill>
+                  <a:srgbClr val="FF0000"/>
+                </a:solidFill>
+              </a:rPr>
+              <a:t>что</a:t>
+            </a:r>
+            <a:r>
+              <a:rPr lang="ru-RU" sz="5400" dirty="0">
+                <a:solidFill>
+                  <a:srgbClr val="FF0000"/>
+                </a:solidFill>
+              </a:rPr>
+              <a:t> </a:t>
+            </a:r>
+            <a:r>
+              <a:rPr lang="ru-RU" sz="5400" dirty="0"/>
+              <a:t>в данной функции должно быть реализовано.</a:t>
+            </a:r>
           </a:p>
         </p:txBody>
       </p:sp>
     </p:spTree>
     <p:extLst>
       <p:ext uri="{BB962C8B-B14F-4D97-AF65-F5344CB8AC3E}">
-        <p14:creationId xmlns:p14="http://schemas.microsoft.com/office/powerpoint/2010/main" val="4059416044"/>
+        <p14:creationId xmlns:p14="http://schemas.microsoft.com/office/powerpoint/2010/main" val="3327599666"/>
       </p:ext>
     </p:extLst>
   </p:cSld>

</xml_diff>

<commit_message>
Add new option of presentation
</commit_message>
<xml_diff>
--- a/Презентация бакалаврской SPEECH.pptx
+++ b/Презентация бакалаврской SPEECH.pptx
@@ -210,7 +210,7 @@
           <a:p>
             <a:fld id="{6B464B02-90B2-4731-B2BE-E94748D81C5F}" type="datetimeFigureOut">
               <a:rPr lang="ru-RU" smtClean="0"/>
-              <a:t>06.06.2016</a:t>
+              <a:t>07.06.2016</a:t>
             </a:fld>
             <a:endParaRPr lang="ru-RU"/>
           </a:p>
@@ -547,19 +547,11 @@
             </a:r>
             <a:r>
               <a:rPr lang="en-US" baseline="0" dirty="0" smtClean="0"/>
-              <a:t>Siri, </a:t>
-            </a:r>
-            <a:r>
-              <a:rPr lang="en-US" baseline="0" dirty="0" smtClean="0"/>
-              <a:t>Cortana</a:t>
+              <a:t>Siri, Cortana</a:t>
             </a:r>
             <a:r>
               <a:rPr lang="ru-RU" baseline="0" dirty="0" smtClean="0"/>
-              <a:t>, Дуся) </a:t>
-            </a:r>
-            <a:r>
-              <a:rPr lang="ru-RU" baseline="0" dirty="0" smtClean="0"/>
-              <a:t>и голосовые меню </a:t>
+              <a:t>, Дуся) и голосовые меню </a:t>
             </a:r>
             <a:r>
               <a:rPr lang="en-US" baseline="0" dirty="0" smtClean="0"/>
@@ -575,11 +567,7 @@
             </a:r>
             <a:r>
               <a:rPr lang="ru-RU" baseline="0" dirty="0" smtClean="0"/>
-              <a:t>В их основе </a:t>
-            </a:r>
-            <a:r>
-              <a:rPr lang="ru-RU" baseline="0" dirty="0" smtClean="0"/>
-              <a:t>зачастую лежит не только распознавание речи, но и её передача для последующей обработки. </a:t>
+              <a:t>В их основе зачастую лежит не только распознавание речи, но и её передача для последующей обработки. </a:t>
             </a:r>
             <a:r>
               <a:rPr lang="en-US" baseline="0" dirty="0" smtClean="0"/>
@@ -635,19 +623,7 @@
                 <a:ea typeface="+mn-ea"/>
                 <a:cs typeface="+mn-cs"/>
               </a:rPr>
-              <a:t> </a:t>
-            </a:r>
-            <a:r>
-              <a:rPr lang="ru-RU" sz="1200" kern="1200" baseline="0" dirty="0" smtClean="0">
-                <a:solidFill>
-                  <a:schemeClr val="tx1"/>
-                </a:solidFill>
-                <a:effectLst/>
-                <a:latin typeface="+mn-lt"/>
-                <a:ea typeface="+mn-ea"/>
-                <a:cs typeface="+mn-cs"/>
-              </a:rPr>
-              <a:t>из главных проблем наряду с распознаванием речи – это то, что </a:t>
+              <a:t> из главных проблем наряду с распознаванием речи – это то, что </a:t>
             </a:r>
             <a:r>
               <a:rPr lang="ru-RU" sz="1200" kern="1200" dirty="0" smtClean="0">
@@ -880,31 +856,7 @@
           <a:p>
             <a:r>
               <a:rPr lang="ru-RU" baseline="0" dirty="0" smtClean="0"/>
-              <a:t>В ходе исследования </a:t>
-            </a:r>
-            <a:r>
-              <a:rPr lang="ru-RU" baseline="0" dirty="0" smtClean="0"/>
-              <a:t>из всех рассмотренных методов помехоустойчивого </a:t>
-            </a:r>
-            <a:r>
-              <a:rPr lang="ru-RU" baseline="0" dirty="0" smtClean="0"/>
-              <a:t>кодирования были выбраны и реализованы следующие методы, </a:t>
-            </a:r>
-            <a:r>
-              <a:rPr lang="ru-RU" baseline="0" dirty="0" smtClean="0"/>
-              <a:t>т.к. </a:t>
-            </a:r>
-            <a:r>
-              <a:rPr lang="ru-RU" baseline="0" dirty="0" smtClean="0"/>
-              <a:t>они отвечали </a:t>
-            </a:r>
-            <a:r>
-              <a:rPr lang="ru-RU" baseline="0" dirty="0" smtClean="0"/>
-              <a:t>следующим критериям: могут находить и исправлять ошибки; простота реализации; применяются в существующих каналах связи</a:t>
-            </a:r>
-            <a:r>
-              <a:rPr lang="ru-RU" baseline="0" dirty="0" smtClean="0"/>
-              <a:t>.</a:t>
+              <a:t>В ходе исследования из всех рассмотренных методов помехоустойчивого кодирования были выбраны и реализованы следующие методы, т.к. они отвечали следующим критериям: могут находить и исправлять ошибки; простота реализации; применяются в существующих каналах связи.</a:t>
             </a:r>
           </a:p>
           <a:p>
@@ -1016,15 +968,7 @@
             </a:r>
             <a:r>
               <a:rPr lang="ru-RU" baseline="0" dirty="0" smtClean="0"/>
-              <a:t>Ранее уже проводились исследования, связанные </a:t>
-            </a:r>
-            <a:r>
-              <a:rPr lang="ru-RU" baseline="0" dirty="0" smtClean="0"/>
-              <a:t>с расчётом вероятности возникновения ошибки в канале связи (источники (с 13 по 16) указаны в бакалаврской работе; в частности, данные исследования проводились академией Федеральной Службы Охраны РФ в 2013 году). </a:t>
-            </a:r>
-            <a:r>
-              <a:rPr lang="ru-RU" baseline="0" dirty="0" smtClean="0"/>
-              <a:t> После изучения данных исследований, стало известно, что вероятность возникновения ошибки в канале связи составляет около 1% (с округлением в большую сторону).</a:t>
+              <a:t>Ранее уже проводились исследования, связанные с расчётом вероятности возникновения ошибки в канале связи (источники (с 13 по 16) указаны в бакалаврской работе; в частности, данные исследования проводились академией Федеральной Службы Охраны РФ в 2013 году).  После изучения данных исследований, стало известно, что вероятность возникновения ошибки в канале связи составляет около 1% (с округлением в большую сторону).</a:t>
             </a:r>
             <a:endParaRPr lang="ru-RU" dirty="0"/>
           </a:p>
@@ -1125,15 +1069,7 @@
             </a:pPr>
             <a:r>
               <a:rPr lang="ru-RU" baseline="0" dirty="0" smtClean="0"/>
-              <a:t>Сначала </a:t>
-            </a:r>
-            <a:r>
-              <a:rPr lang="ru-RU" baseline="0" smtClean="0"/>
-              <a:t>предлагается получить </a:t>
-            </a:r>
-            <a:r>
-              <a:rPr lang="ru-RU" baseline="0" dirty="0" smtClean="0"/>
-              <a:t>вероятность возникновения ошибки в имеющемся канале связи (рассчитать или узнать её, если данная информация имеется в спецификации к каналу связи/была рассчитана ранее).</a:t>
+              <a:t>Сначала предлагается получить вероятность возникновения ошибки в имеющемся канале связи (рассчитать или узнать её, если данная информация имеется в спецификации к каналу связи/была рассчитана ранее).</a:t>
             </a:r>
           </a:p>
           <a:p>
@@ -1159,7 +1095,7 @@
             </a:pPr>
             <a:r>
               <a:rPr lang="ru-RU" baseline="0" dirty="0" smtClean="0"/>
-              <a:t>В зависимости от доступного размера для полезной информации, можно определится с кодеком: просто передача фонемы, передача основных параметров речевого сигнала или же полный набор параметров.</a:t>
+              <a:t>В зависимости от доступного размера для полезной информации, можно определится с кодеком: просто передача № фонемы, передача основных параметров речевого сигнала или же полный набор параметров.</a:t>
             </a:r>
             <a:endParaRPr lang="ru-RU" dirty="0"/>
           </a:p>
@@ -1245,6 +1181,20 @@
           <a:bodyPr/>
           <a:lstStyle/>
           <a:p>
+            <a:r>
+              <a:rPr lang="ru-RU" dirty="0" smtClean="0"/>
+              <a:t>В ходе бакалаврской</a:t>
+            </a:r>
+            <a:r>
+              <a:rPr lang="ru-RU" baseline="0" dirty="0" smtClean="0"/>
+              <a:t> работы было сделано следующее (показать на слайд).</a:t>
+            </a:r>
+          </a:p>
+          <a:p>
+            <a:r>
+              <a:rPr lang="ru-RU" baseline="0" dirty="0" smtClean="0"/>
+              <a:t>Следует заметить: на фоне иных существующих методов выбора речевого кодека (экспертное оценивание проектных решений, или метод, в основе которого лежит согласование алгоритма речевого кодирования с цифровым каналом связи) предложенный метод является более гибким.</a:t>
+            </a:r>
             <a:endParaRPr lang="ru-RU" dirty="0"/>
           </a:p>
         </p:txBody>
@@ -1335,19 +1285,7 @@
             </a:r>
             <a:r>
               <a:rPr lang="ru-RU" baseline="0" dirty="0" smtClean="0"/>
-              <a:t> </a:t>
-            </a:r>
-            <a:r>
-              <a:rPr lang="ru-RU" baseline="0" dirty="0" smtClean="0"/>
-              <a:t>наиболее распространённую последовательность </a:t>
-            </a:r>
-            <a:r>
-              <a:rPr lang="ru-RU" baseline="0" dirty="0" smtClean="0"/>
-              <a:t>обработки речевого сигнала при кодировании (при декодировании всё происходит в обратном порядке). </a:t>
-            </a:r>
-            <a:r>
-              <a:rPr lang="ru-RU" baseline="0" dirty="0" smtClean="0"/>
-              <a:t>Следует заметить, что в отдельных случаях можно отказаться от некоторых этапов в помехоустойчивом кодировании. </a:t>
+              <a:t> наиболее распространённую последовательность обработки речевого сигнала при кодировании (при декодировании всё происходит в обратном порядке). Следует заметить, что в отдельных случаях можно отказаться от некоторых этапов в помехоустойчивом кодировании. </a:t>
             </a:r>
             <a:r>
               <a:rPr lang="en-US" baseline="0" dirty="0" smtClean="0"/>
@@ -1377,31 +1315,7 @@
                 <a:ea typeface="+mn-ea"/>
                 <a:cs typeface="+mn-cs"/>
               </a:rPr>
-              <a:t>Речевое кодирование не является помехоустойчивым, поэтому данные с речевого кодера поступают на </a:t>
-            </a:r>
-            <a:r>
-              <a:rPr lang="ru-RU" sz="1200" kern="1200" dirty="0" smtClean="0">
-                <a:solidFill>
-                  <a:schemeClr val="tx1"/>
-                </a:solidFill>
-                <a:effectLst/>
-                <a:latin typeface="+mn-lt"/>
-                <a:ea typeface="+mn-ea"/>
-                <a:cs typeface="+mn-cs"/>
-              </a:rPr>
-              <a:t>канальный. </a:t>
-            </a:r>
-            <a:r>
-              <a:rPr lang="ru-RU" sz="1200" kern="1200" dirty="0" smtClean="0">
-                <a:solidFill>
-                  <a:schemeClr val="tx1"/>
-                </a:solidFill>
-                <a:effectLst/>
-                <a:latin typeface="+mn-lt"/>
-                <a:ea typeface="+mn-ea"/>
-                <a:cs typeface="+mn-cs"/>
-              </a:rPr>
-              <a:t>Его задача – сделать передаваемую информацию помехоустойчивой, т.е. дать возможность приёмнику обнаружить (и, в некоторых случаях, исправить) ошибки, которые возникают при передаче информации. Помимо этого, канальное кодирование может выполнять такие функции, как добавление управляющей информации и шифрование.</a:t>
+              <a:t>Речевое кодирование не является помехоустойчивым, поэтому данные с речевого кодера поступают на канальный. Его задача – сделать передаваемую информацию помехоустойчивой, т.е. дать возможность приёмнику обнаружить (и, в некоторых случаях, исправить) ошибки, которые возникают при передаче информации. Помимо этого, канальное кодирование может выполнять такие функции, как добавление управляющей информации и шифрование.</a:t>
             </a:r>
             <a:endParaRPr lang="en-US" baseline="0" dirty="0" smtClean="0"/>
           </a:p>
@@ -1522,13 +1436,8 @@
             </a:r>
             <a:r>
               <a:rPr lang="ru-RU" baseline="0" dirty="0" smtClean="0"/>
-              <a:t>, в свою очередь, определяет параметры фильтра для синтеза речевого сигнала (что позволяет сделать передаваемый сигнал более похожим на речь </a:t>
-            </a:r>
-            <a:r>
-              <a:rPr lang="ru-RU" baseline="0" dirty="0" smtClean="0"/>
-              <a:t>человека-источника: тон, интонация, тембр).</a:t>
-            </a:r>
-            <a:endParaRPr lang="ru-RU" baseline="0" dirty="0" smtClean="0"/>
+              <a:t>, в свою очередь, определяет параметры фильтра для синтеза речевого сигнала (что позволяет сделать передаваемый сигнал более похожим на речь человека-источника: тон, интонация, тембр).</a:t>
+            </a:r>
           </a:p>
           <a:p>
             <a:endParaRPr lang="ru-RU" baseline="0" dirty="0" smtClean="0"/>
@@ -1729,19 +1638,7 @@
           <a:p>
             <a:r>
               <a:rPr lang="ru-RU" sz="1200" dirty="0" smtClean="0"/>
-              <a:t>Область применения – всюду, где требуется </a:t>
-            </a:r>
-            <a:r>
-              <a:rPr lang="ru-RU" sz="1200" dirty="0" smtClean="0"/>
-              <a:t>обрабатывать и передавать речевой </a:t>
-            </a:r>
-            <a:r>
-              <a:rPr lang="ru-RU" sz="1200" dirty="0" smtClean="0"/>
-              <a:t>сигнал </a:t>
-            </a:r>
-            <a:r>
-              <a:rPr lang="ru-RU" sz="1200" dirty="0" smtClean="0"/>
-              <a:t>(помимо упомянутых</a:t>
+              <a:t>Область применения – всюду, где требуется обрабатывать и передавать речевой сигнал (помимо упомянутых</a:t>
             </a:r>
             <a:r>
               <a:rPr lang="ru-RU" sz="1200" baseline="0" dirty="0" smtClean="0"/>
@@ -1749,17 +1646,8 @@
             </a:r>
             <a:r>
               <a:rPr lang="ru-RU" sz="1200" dirty="0" smtClean="0"/>
-              <a:t>голосовой </a:t>
-            </a:r>
-            <a:r>
-              <a:rPr lang="ru-RU" sz="1200" dirty="0" smtClean="0"/>
-              <a:t>чат в играх, беспроводные усилители </a:t>
-            </a:r>
-            <a:r>
-              <a:rPr lang="ru-RU" sz="1200" dirty="0" smtClean="0"/>
-              <a:t>звука). </a:t>
-            </a:r>
-            <a:endParaRPr lang="ru-RU" sz="1200" dirty="0" smtClean="0"/>
+              <a:t>голосовой чат в играх, беспроводные усилители звука). </a:t>
+            </a:r>
           </a:p>
           <a:p>
             <a:r>
@@ -1778,11 +1666,7 @@
             </a:r>
             <a:r>
               <a:rPr lang="ru-RU" sz="1200" baseline="0" dirty="0" smtClean="0"/>
-              <a:t> разрабатывались исходя из того, что их можно использовать независимо друг от друга (в случае несовпадения формата входных данных предлагается применять паттерн адаптер</a:t>
-            </a:r>
-            <a:r>
-              <a:rPr lang="ru-RU" sz="1200" baseline="0" dirty="0" smtClean="0"/>
-              <a:t>).</a:t>
+              <a:t> разрабатывались исходя из того, что их можно использовать независимо друг от друга (в случае несовпадения формата входных данных предлагается применять паттерн адаптер).</a:t>
             </a:r>
           </a:p>
         </p:txBody>
@@ -2128,15 +2012,7 @@
             </a:r>
             <a:r>
               <a:rPr lang="ru-RU" baseline="0" dirty="0" smtClean="0"/>
-              <a:t> кодеков, наиболее популярные </a:t>
-            </a:r>
-            <a:r>
-              <a:rPr lang="ru-RU" baseline="0" dirty="0" smtClean="0"/>
-              <a:t>приведены </a:t>
-            </a:r>
-            <a:r>
-              <a:rPr lang="ru-RU" baseline="0" dirty="0" smtClean="0"/>
-              <a:t>на слайде (</a:t>
+              <a:t> кодеков, наиболее популярные приведены на слайде (</a:t>
             </a:r>
             <a:r>
               <a:rPr lang="ru-RU" dirty="0" smtClean="0"/>
@@ -2329,11 +2205,7 @@
             </a:pPr>
             <a:r>
               <a:rPr lang="ru-RU" dirty="0" smtClean="0"/>
-              <a:t>Изучив структуры существующих речевых кодеров, было замечено, что </a:t>
-            </a:r>
-            <a:r>
-              <a:rPr lang="ru-RU" dirty="0" smtClean="0"/>
-              <a:t>существующие речевые кодеки отличаются только форматом представления данных и алгоритмами расчёта параметров речевого сигнала, имея при этом общую структуру.</a:t>
+              <a:t>Изучив структуры существующих речевых кодеров, было замечено, что существующие речевые кодеки отличаются только форматом представления данных и алгоритмами расчёта параметров речевого сигнала, имея при этом общую структуру.</a:t>
             </a:r>
           </a:p>
           <a:p>
@@ -2641,7 +2513,7 @@
           <a:p>
             <a:fld id="{35808EDE-81D6-4ED2-9EC2-EE12FAFD0105}" type="datetime1">
               <a:rPr lang="ru-RU" smtClean="0"/>
-              <a:t>06.06.2016</a:t>
+              <a:t>07.06.2016</a:t>
             </a:fld>
             <a:endParaRPr lang="ru-RU"/>
           </a:p>
@@ -2811,7 +2683,7 @@
           <a:p>
             <a:fld id="{8D7E723E-B8D7-44C7-B10B-5D871445047E}" type="datetime1">
               <a:rPr lang="ru-RU" smtClean="0"/>
-              <a:t>06.06.2016</a:t>
+              <a:t>07.06.2016</a:t>
             </a:fld>
             <a:endParaRPr lang="ru-RU"/>
           </a:p>
@@ -2991,7 +2863,7 @@
           <a:p>
             <a:fld id="{661058EC-A844-46A5-8F45-75E4678C8451}" type="datetime1">
               <a:rPr lang="ru-RU" smtClean="0"/>
-              <a:t>06.06.2016</a:t>
+              <a:t>07.06.2016</a:t>
             </a:fld>
             <a:endParaRPr lang="ru-RU"/>
           </a:p>
@@ -3161,7 +3033,7 @@
           <a:p>
             <a:fld id="{325B380F-5040-4154-A79A-EABE362B581A}" type="datetime1">
               <a:rPr lang="ru-RU" smtClean="0"/>
-              <a:t>06.06.2016</a:t>
+              <a:t>07.06.2016</a:t>
             </a:fld>
             <a:endParaRPr lang="ru-RU"/>
           </a:p>
@@ -3417,7 +3289,7 @@
           <a:p>
             <a:fld id="{F19E9547-32E0-41CA-94F8-41F0343CA97C}" type="datetime1">
               <a:rPr lang="ru-RU" smtClean="0"/>
-              <a:t>06.06.2016</a:t>
+              <a:t>07.06.2016</a:t>
             </a:fld>
             <a:endParaRPr lang="ru-RU"/>
           </a:p>
@@ -3649,7 +3521,7 @@
           <a:p>
             <a:fld id="{DCCF254F-F95D-4A5D-B936-645B632A5E26}" type="datetime1">
               <a:rPr lang="ru-RU" smtClean="0"/>
-              <a:t>06.06.2016</a:t>
+              <a:t>07.06.2016</a:t>
             </a:fld>
             <a:endParaRPr lang="ru-RU"/>
           </a:p>
@@ -4016,7 +3888,7 @@
           <a:p>
             <a:fld id="{67620C0F-32BC-42B2-9D92-E998672D5657}" type="datetime1">
               <a:rPr lang="ru-RU" smtClean="0"/>
-              <a:t>06.06.2016</a:t>
+              <a:t>07.06.2016</a:t>
             </a:fld>
             <a:endParaRPr lang="ru-RU"/>
           </a:p>
@@ -4134,7 +4006,7 @@
           <a:p>
             <a:fld id="{8188979D-7E5B-4655-A00A-039012B814B1}" type="datetime1">
               <a:rPr lang="ru-RU" smtClean="0"/>
-              <a:t>06.06.2016</a:t>
+              <a:t>07.06.2016</a:t>
             </a:fld>
             <a:endParaRPr lang="ru-RU"/>
           </a:p>
@@ -4229,7 +4101,7 @@
           <a:p>
             <a:fld id="{85DE12EB-D260-4F93-BE2B-7843578B1D1C}" type="datetime1">
               <a:rPr lang="ru-RU" smtClean="0"/>
-              <a:t>06.06.2016</a:t>
+              <a:t>07.06.2016</a:t>
             </a:fld>
             <a:endParaRPr lang="ru-RU"/>
           </a:p>
@@ -4516,7 +4388,7 @@
           <a:p>
             <a:fld id="{D4631A5B-4F88-4815-9FD1-043099A21EC2}" type="datetime1">
               <a:rPr lang="ru-RU" smtClean="0"/>
-              <a:t>06.06.2016</a:t>
+              <a:t>07.06.2016</a:t>
             </a:fld>
             <a:endParaRPr lang="ru-RU"/>
           </a:p>
@@ -4769,7 +4641,7 @@
           <a:p>
             <a:fld id="{6CBADF4A-3D61-495C-8A0C-D9B091AC4C9E}" type="datetime1">
               <a:rPr lang="ru-RU" smtClean="0"/>
-              <a:t>06.06.2016</a:t>
+              <a:t>07.06.2016</a:t>
             </a:fld>
             <a:endParaRPr lang="ru-RU"/>
           </a:p>
@@ -4982,7 +4854,7 @@
           <a:p>
             <a:fld id="{9ECFCDF8-316B-4DE3-A74A-EE5DDE0B2E76}" type="datetime1">
               <a:rPr lang="ru-RU" smtClean="0"/>
-              <a:t>06.06.2016</a:t>
+              <a:t>07.06.2016</a:t>
             </a:fld>
             <a:endParaRPr lang="ru-RU"/>
           </a:p>
@@ -5807,11 +5679,7 @@
             <a:pPr algn="ctr"/>
             <a:r>
               <a:rPr lang="ru-RU" sz="4400" dirty="0" smtClean="0"/>
-              <a:t>ЗАЩИТА ОТ </a:t>
-            </a:r>
-            <a:r>
-              <a:rPr lang="ru-RU" sz="4400" dirty="0" smtClean="0"/>
-              <a:t>ПОМЕХ: ПРЕДЛАГАЕМЫЕ МЕТОДЫ</a:t>
+              <a:t>ЗАЩИТА ОТ ПОМЕХ: ПРЕДЛАГАЕМЫЕ МЕТОДЫ</a:t>
             </a:r>
             <a:endParaRPr lang="ru-RU" sz="4400" dirty="0"/>
           </a:p>
@@ -6362,8 +6230,8 @@
         </p:nvSpPr>
         <p:spPr>
           <a:xfrm>
-            <a:off x="3863662" y="0"/>
-            <a:ext cx="3707490" cy="1138773"/>
+            <a:off x="3702520" y="-141668"/>
+            <a:ext cx="4891916" cy="1384995"/>
           </a:xfrm>
           <a:prstGeom prst="rect">
             <a:avLst/>
@@ -6376,11 +6244,93 @@
           </a:bodyPr>
           <a:lstStyle/>
           <a:p>
-            <a:r>
-              <a:rPr lang="ru-RU" sz="6800" b="1" dirty="0" smtClean="0"/>
-              <a:t>ВЫВОДЫ</a:t>
-            </a:r>
-            <a:endParaRPr lang="ru-RU" sz="6800" b="1" dirty="0"/>
+            <a:pPr algn="ctr"/>
+            <a:r>
+              <a:rPr lang="ru-RU" sz="4800" b="1" dirty="0" smtClean="0"/>
+              <a:t>ЗАКЛЮЧЕНИЕ</a:t>
+            </a:r>
+          </a:p>
+          <a:p>
+            <a:pPr algn="ctr"/>
+            <a:r>
+              <a:rPr lang="ru-RU" sz="3600" b="1" dirty="0" smtClean="0"/>
+              <a:t>ПРОДЕЛАННАЯ РАБОТА</a:t>
+            </a:r>
+            <a:endParaRPr lang="ru-RU" sz="3600" b="1" dirty="0"/>
+          </a:p>
+        </p:txBody>
+      </p:sp>
+      <p:sp>
+        <p:nvSpPr>
+          <p:cNvPr id="2" name="TextBox 1"/>
+          <p:cNvSpPr txBox="1"/>
+          <p:nvPr/>
+        </p:nvSpPr>
+        <p:spPr>
+          <a:xfrm>
+            <a:off x="1151475" y="1212275"/>
+            <a:ext cx="9994005" cy="5509200"/>
+          </a:xfrm>
+          <a:prstGeom prst="rect">
+            <a:avLst/>
+          </a:prstGeom>
+          <a:noFill/>
+        </p:spPr>
+        <p:txBody>
+          <a:bodyPr wrap="square" rtlCol="0">
+            <a:spAutoFit/>
+          </a:bodyPr>
+          <a:lstStyle/>
+          <a:p>
+            <a:pPr marL="514350" indent="-514350">
+              <a:buFont typeface="+mj-lt"/>
+              <a:buAutoNum type="arabicPeriod"/>
+            </a:pPr>
+            <a:r>
+              <a:rPr lang="ru-RU" sz="3200" dirty="0" smtClean="0"/>
+              <a:t>Проведены исследования существующих речевых    кодеков и выявлена общая для них структура.</a:t>
+            </a:r>
+          </a:p>
+          <a:p>
+            <a:pPr marL="514350" indent="-514350">
+              <a:buFont typeface="+mj-lt"/>
+              <a:buAutoNum type="arabicPeriod"/>
+            </a:pPr>
+            <a:r>
+              <a:rPr lang="ru-RU" sz="3200" dirty="0" smtClean="0"/>
+              <a:t>Рассмотрены различные методы помехоустойчивого кодирования и среди них выбраны методы, отвечающие заданным критериям.</a:t>
+            </a:r>
+          </a:p>
+          <a:p>
+            <a:pPr marL="514350" indent="-514350">
+              <a:buFont typeface="+mj-lt"/>
+              <a:buAutoNum type="arabicPeriod"/>
+            </a:pPr>
+            <a:r>
+              <a:rPr lang="ru-RU" sz="3200" dirty="0" smtClean="0"/>
+              <a:t>Проведено тестирование помехоустойчивого кодирования с помощью обратных функций.</a:t>
+            </a:r>
+          </a:p>
+          <a:p>
+            <a:pPr marL="514350" indent="-514350">
+              <a:buFont typeface="+mj-lt"/>
+              <a:buAutoNum type="arabicPeriod"/>
+            </a:pPr>
+            <a:r>
+              <a:rPr lang="ru-RU" sz="3200" dirty="0" smtClean="0"/>
+              <a:t>Созданы библиотеки для обработки речевого сигнала и помехоустойчивого кодирования.</a:t>
+            </a:r>
+          </a:p>
+          <a:p>
+            <a:pPr marL="514350" indent="-514350">
+              <a:buFont typeface="+mj-lt"/>
+              <a:buAutoNum type="arabicPeriod"/>
+            </a:pPr>
+            <a:r>
+              <a:rPr lang="ru-RU" sz="3200" dirty="0" smtClean="0"/>
+              <a:t>Предложена методология выбора метода обработки речи для передачи по каналу связи.</a:t>
+            </a:r>
+            <a:endParaRPr lang="ru-RU" sz="3200" dirty="0"/>
           </a:p>
         </p:txBody>
       </p:sp>
@@ -7133,16 +7083,11 @@
               <a:rPr lang="ru-RU" sz="3600" dirty="0" smtClean="0"/>
               <a:t>Нам заранее известны не </a:t>
             </a:r>
-            <a:endParaRPr lang="ru-RU" sz="3600" dirty="0" smtClean="0"/>
           </a:p>
           <a:p>
             <a:r>
               <a:rPr lang="ru-RU" sz="3600" dirty="0" smtClean="0"/>
-              <a:t>все </a:t>
-            </a:r>
-            <a:r>
-              <a:rPr lang="ru-RU" sz="3600" dirty="0" smtClean="0"/>
-              <a:t>требования:</a:t>
+              <a:t>все требования:</a:t>
             </a:r>
           </a:p>
           <a:p>
@@ -7164,7 +7109,6 @@
               <a:rPr lang="ru-RU" sz="3600" dirty="0" smtClean="0"/>
               <a:t>речевой кодек и его </a:t>
             </a:r>
-            <a:endParaRPr lang="ru-RU" sz="3600" dirty="0" smtClean="0"/>
           </a:p>
           <a:p>
             <a:r>
@@ -7173,11 +7117,7 @@
             </a:r>
             <a:r>
               <a:rPr lang="ru-RU" sz="3600" dirty="0" smtClean="0"/>
-              <a:t>  </a:t>
-            </a:r>
-            <a:r>
-              <a:rPr lang="ru-RU" sz="3600" dirty="0" smtClean="0"/>
-              <a:t>формат представления </a:t>
+              <a:t>  формат представления </a:t>
             </a:r>
           </a:p>
           <a:p>
@@ -7187,15 +7127,7 @@
             </a:r>
             <a:r>
               <a:rPr lang="ru-RU" sz="3600" dirty="0" smtClean="0"/>
-              <a:t>  </a:t>
-            </a:r>
-            <a:r>
-              <a:rPr lang="ru-RU" sz="3600" dirty="0" smtClean="0"/>
-              <a:t>речевого </a:t>
-            </a:r>
-            <a:r>
-              <a:rPr lang="ru-RU" sz="3600" dirty="0" smtClean="0"/>
-              <a:t>сигнала</a:t>
+              <a:t>  речевого сигнала</a:t>
             </a:r>
           </a:p>
           <a:p>
@@ -7207,16 +7139,11 @@
               <a:rPr lang="ru-RU" sz="3600" dirty="0" smtClean="0"/>
               <a:t>вероятность ошибки в </a:t>
             </a:r>
-            <a:endParaRPr lang="ru-RU" sz="3600" dirty="0" smtClean="0"/>
           </a:p>
           <a:p>
             <a:r>
               <a:rPr lang="ru-RU" sz="3600" dirty="0" smtClean="0"/>
-              <a:t>   канале </a:t>
-            </a:r>
-            <a:r>
-              <a:rPr lang="ru-RU" sz="3600" dirty="0" smtClean="0"/>
-              <a:t>связи</a:t>
+              <a:t>   канале связи</a:t>
             </a:r>
           </a:p>
         </p:txBody>
@@ -8159,11 +8086,7 @@
             </a:r>
             <a:r>
               <a:rPr lang="ru-RU" sz="4400" dirty="0" smtClean="0"/>
-              <a:t>телефонии</a:t>
-            </a:r>
-            <a:r>
-              <a:rPr lang="ru-RU" sz="4400" dirty="0" smtClean="0"/>
-              <a:t>)</a:t>
+              <a:t>телефонии)</a:t>
             </a:r>
           </a:p>
           <a:p>
@@ -8175,7 +8098,6 @@
               <a:rPr lang="ru-RU" sz="4400" dirty="0" smtClean="0"/>
               <a:t>…</a:t>
             </a:r>
-            <a:endParaRPr lang="ru-RU" sz="4400" dirty="0" smtClean="0"/>
           </a:p>
         </p:txBody>
       </p:sp>
@@ -8227,11 +8149,7 @@
             <a:pPr algn="ctr"/>
             <a:r>
               <a:rPr lang="ru-RU" sz="6800" dirty="0" smtClean="0"/>
-              <a:t>Проектирование </a:t>
-            </a:r>
-            <a:r>
-              <a:rPr lang="ru-RU" sz="6800" dirty="0" smtClean="0"/>
-              <a:t>библиотек</a:t>
+              <a:t>Проектирование библиотек</a:t>
             </a:r>
           </a:p>
           <a:p>

</xml_diff>